<commit_message>
Removed duplicated statement from image type slides.
</commit_message>
<xml_diff>
--- a/slides/advanced_part3.pptx
+++ b/slides/advanced_part3.pptx
@@ -271,7 +271,7 @@
           <a:p>
             <a:fld id="{154B9960-65DD-7948-AAE5-CA021B06E14D}" type="datetimeFigureOut">
               <a:rPr lang="en-US" smtClean="0"/>
-              <a:t>07/05/15</a:t>
+              <a:t>09/05/15</a:t>
             </a:fld>
             <a:endParaRPr lang="en-GB"/>
           </a:p>
@@ -1582,7 +1582,7 @@
           <a:p>
             <a:fld id="{D96F9273-1B51-1D4D-B007-2EA617412104}" type="datetimeFigureOut">
               <a:rPr lang="en-US" smtClean="0"/>
-              <a:t>07/05/15</a:t>
+              <a:t>09/05/15</a:t>
             </a:fld>
             <a:endParaRPr lang="en-GB"/>
           </a:p>
@@ -1752,7 +1752,7 @@
           <a:p>
             <a:fld id="{D96F9273-1B51-1D4D-B007-2EA617412104}" type="datetimeFigureOut">
               <a:rPr lang="en-US" smtClean="0"/>
-              <a:t>07/05/15</a:t>
+              <a:t>09/05/15</a:t>
             </a:fld>
             <a:endParaRPr lang="en-GB"/>
           </a:p>
@@ -1932,7 +1932,7 @@
           <a:p>
             <a:fld id="{D96F9273-1B51-1D4D-B007-2EA617412104}" type="datetimeFigureOut">
               <a:rPr lang="en-US" smtClean="0"/>
-              <a:t>07/05/15</a:t>
+              <a:t>09/05/15</a:t>
             </a:fld>
             <a:endParaRPr lang="en-GB"/>
           </a:p>
@@ -2102,7 +2102,7 @@
           <a:p>
             <a:fld id="{D96F9273-1B51-1D4D-B007-2EA617412104}" type="datetimeFigureOut">
               <a:rPr lang="en-US" smtClean="0"/>
-              <a:t>07/05/15</a:t>
+              <a:t>09/05/15</a:t>
             </a:fld>
             <a:endParaRPr lang="en-GB"/>
           </a:p>
@@ -2348,7 +2348,7 @@
           <a:p>
             <a:fld id="{D96F9273-1B51-1D4D-B007-2EA617412104}" type="datetimeFigureOut">
               <a:rPr lang="en-US" smtClean="0"/>
-              <a:t>07/05/15</a:t>
+              <a:t>09/05/15</a:t>
             </a:fld>
             <a:endParaRPr lang="en-GB"/>
           </a:p>
@@ -2636,7 +2636,7 @@
           <a:p>
             <a:fld id="{D96F9273-1B51-1D4D-B007-2EA617412104}" type="datetimeFigureOut">
               <a:rPr lang="en-US" smtClean="0"/>
-              <a:t>07/05/15</a:t>
+              <a:t>09/05/15</a:t>
             </a:fld>
             <a:endParaRPr lang="en-GB"/>
           </a:p>
@@ -3058,7 +3058,7 @@
           <a:p>
             <a:fld id="{D96F9273-1B51-1D4D-B007-2EA617412104}" type="datetimeFigureOut">
               <a:rPr lang="en-US" smtClean="0"/>
-              <a:t>07/05/15</a:t>
+              <a:t>09/05/15</a:t>
             </a:fld>
             <a:endParaRPr lang="en-GB"/>
           </a:p>
@@ -3176,7 +3176,7 @@
           <a:p>
             <a:fld id="{D96F9273-1B51-1D4D-B007-2EA617412104}" type="datetimeFigureOut">
               <a:rPr lang="en-US" smtClean="0"/>
-              <a:t>07/05/15</a:t>
+              <a:t>09/05/15</a:t>
             </a:fld>
             <a:endParaRPr lang="en-GB"/>
           </a:p>
@@ -3271,7 +3271,7 @@
           <a:p>
             <a:fld id="{D96F9273-1B51-1D4D-B007-2EA617412104}" type="datetimeFigureOut">
               <a:rPr lang="en-US" smtClean="0"/>
-              <a:t>07/05/15</a:t>
+              <a:t>09/05/15</a:t>
             </a:fld>
             <a:endParaRPr lang="en-GB"/>
           </a:p>
@@ -3548,7 +3548,7 @@
           <a:p>
             <a:fld id="{D96F9273-1B51-1D4D-B007-2EA617412104}" type="datetimeFigureOut">
               <a:rPr lang="en-US" smtClean="0"/>
-              <a:t>07/05/15</a:t>
+              <a:t>09/05/15</a:t>
             </a:fld>
             <a:endParaRPr lang="en-GB"/>
           </a:p>
@@ -3801,7 +3801,7 @@
           <a:p>
             <a:fld id="{D96F9273-1B51-1D4D-B007-2EA617412104}" type="datetimeFigureOut">
               <a:rPr lang="en-US" smtClean="0"/>
-              <a:t>07/05/15</a:t>
+              <a:t>09/05/15</a:t>
             </a:fld>
             <a:endParaRPr lang="en-GB"/>
           </a:p>
@@ -4014,7 +4014,7 @@
           <a:p>
             <a:fld id="{D96F9273-1B51-1D4D-B007-2EA617412104}" type="datetimeFigureOut">
               <a:rPr lang="en-US" smtClean="0"/>
-              <a:t>07/05/15</a:t>
+              <a:t>09/05/15</a:t>
             </a:fld>
             <a:endParaRPr lang="en-GB"/>
           </a:p>
@@ -43771,36 +43771,10 @@
               <a:t> </a:t>
             </a:r>
             <a:r>
-              <a:rPr lang="en-GB" dirty="0"/>
+              <a:rPr lang="en-GB" dirty="0" smtClean="0"/>
               <a:t>parameter</a:t>
             </a:r>
-          </a:p>
-          <a:p>
-            <a:pPr marL="285750" indent="-285750">
-              <a:buFont typeface="Arial"/>
-              <a:buChar char="•"/>
-            </a:pPr>
-            <a:r>
-              <a:rPr lang="en-GB" dirty="0"/>
-              <a:t>A list of image formats supported by the target device can be queried with </a:t>
-            </a:r>
-            <a:r>
-              <a:rPr lang="en-GB" b="1" dirty="0" err="1" smtClean="0">
-                <a:solidFill>
-                  <a:srgbClr val="3366FF"/>
-                </a:solidFill>
-                <a:latin typeface="Courier New"/>
-                <a:cs typeface="Courier New"/>
-              </a:rPr>
-              <a:t>getSupportedImageFormats</a:t>
-            </a:r>
-            <a:endParaRPr lang="en-GB" b="1" dirty="0">
-              <a:solidFill>
-                <a:srgbClr val="3366FF"/>
-              </a:solidFill>
-              <a:latin typeface="Courier New"/>
-              <a:cs typeface="Courier New"/>
-            </a:endParaRPr>
+            <a:endParaRPr lang="en-GB" dirty="0"/>
           </a:p>
         </p:txBody>
       </p:sp>

</xml_diff>

<commit_message>
General improvements to image type slides.
</commit_message>
<xml_diff>
--- a/slides/advanced_part3.pptx
+++ b/slides/advanced_part3.pptx
@@ -619,6 +619,527 @@
     <p:extLst>
       <p:ext uri="{BB962C8B-B14F-4D97-AF65-F5344CB8AC3E}">
         <p14:creationId xmlns:p14="http://schemas.microsoft.com/office/powerpoint/2010/main" val="767422648"/>
+      </p:ext>
+    </p:extLst>
+  </p:cSld>
+  <p:clrMapOvr>
+    <a:masterClrMapping/>
+  </p:clrMapOvr>
+</p:notes>
+</file>
+
+<file path=ppt/notesSlides/notesSlide10.xml><?xml version="1.0" encoding="utf-8"?>
+<p:notes xmlns:a="http://schemas.openxmlformats.org/drawingml/2006/main" xmlns:r="http://schemas.openxmlformats.org/officeDocument/2006/relationships" xmlns:p="http://schemas.openxmlformats.org/presentationml/2006/main">
+  <p:cSld>
+    <p:spTree>
+      <p:nvGrpSpPr>
+        <p:cNvPr id="1" name=""/>
+        <p:cNvGrpSpPr/>
+        <p:nvPr/>
+      </p:nvGrpSpPr>
+      <p:grpSpPr>
+        <a:xfrm>
+          <a:off x="0" y="0"/>
+          <a:ext cx="0" cy="0"/>
+          <a:chOff x="0" y="0"/>
+          <a:chExt cx="0" cy="0"/>
+        </a:xfrm>
+      </p:grpSpPr>
+      <p:sp>
+        <p:nvSpPr>
+          <p:cNvPr id="2" name="Slide Image Placeholder 1"/>
+          <p:cNvSpPr>
+            <a:spLocks noGrp="1" noRot="1" noChangeAspect="1"/>
+          </p:cNvSpPr>
+          <p:nvPr>
+            <p:ph type="sldImg"/>
+          </p:nvPr>
+        </p:nvSpPr>
+        <p:spPr/>
+      </p:sp>
+      <p:sp>
+        <p:nvSpPr>
+          <p:cNvPr id="3" name="Notes Placeholder 2"/>
+          <p:cNvSpPr>
+            <a:spLocks noGrp="1"/>
+          </p:cNvSpPr>
+          <p:nvPr>
+            <p:ph type="body" idx="1"/>
+          </p:nvPr>
+        </p:nvSpPr>
+        <p:spPr/>
+        <p:txBody>
+          <a:bodyPr/>
+          <a:lstStyle/>
+          <a:p>
+            <a:r>
+              <a:rPr lang="en-GB" dirty="0" smtClean="0"/>
+              <a:t>Intel Xeon Phi is only platform we’ve come across that doesn’t support images</a:t>
+            </a:r>
+          </a:p>
+          <a:p>
+            <a:r>
+              <a:rPr lang="en-GB" dirty="0" smtClean="0"/>
+              <a:t>As well as being faster on many devices, also more convenient</a:t>
+            </a:r>
+            <a:r>
+              <a:rPr lang="en-GB" baseline="0" dirty="0" smtClean="0"/>
+              <a:t> (bounds checking, normalization, interpolation)</a:t>
+            </a:r>
+            <a:endParaRPr lang="en-GB" dirty="0"/>
+          </a:p>
+        </p:txBody>
+      </p:sp>
+      <p:sp>
+        <p:nvSpPr>
+          <p:cNvPr id="4" name="Slide Number Placeholder 3"/>
+          <p:cNvSpPr>
+            <a:spLocks noGrp="1"/>
+          </p:cNvSpPr>
+          <p:nvPr>
+            <p:ph type="sldNum" sz="quarter" idx="10"/>
+          </p:nvPr>
+        </p:nvSpPr>
+        <p:spPr/>
+        <p:txBody>
+          <a:bodyPr/>
+          <a:lstStyle/>
+          <a:p>
+            <a:fld id="{09586968-7D7C-644F-B08A-4E148D7B3FC9}" type="slidenum">
+              <a:rPr lang="en-GB" smtClean="0"/>
+              <a:t>74</a:t>
+            </a:fld>
+            <a:endParaRPr lang="en-GB"/>
+          </a:p>
+        </p:txBody>
+      </p:sp>
+    </p:spTree>
+    <p:extLst>
+      <p:ext uri="{BB962C8B-B14F-4D97-AF65-F5344CB8AC3E}">
+        <p14:creationId xmlns:p14="http://schemas.microsoft.com/office/powerpoint/2010/main" val="1455476205"/>
+      </p:ext>
+    </p:extLst>
+  </p:cSld>
+  <p:clrMapOvr>
+    <a:masterClrMapping/>
+  </p:clrMapOvr>
+</p:notes>
+</file>
+
+<file path=ppt/notesSlides/notesSlide11.xml><?xml version="1.0" encoding="utf-8"?>
+<p:notes xmlns:a="http://schemas.openxmlformats.org/drawingml/2006/main" xmlns:r="http://schemas.openxmlformats.org/officeDocument/2006/relationships" xmlns:p="http://schemas.openxmlformats.org/presentationml/2006/main">
+  <p:cSld>
+    <p:spTree>
+      <p:nvGrpSpPr>
+        <p:cNvPr id="1" name=""/>
+        <p:cNvGrpSpPr/>
+        <p:nvPr/>
+      </p:nvGrpSpPr>
+      <p:grpSpPr>
+        <a:xfrm>
+          <a:off x="0" y="0"/>
+          <a:ext cx="0" cy="0"/>
+          <a:chOff x="0" y="0"/>
+          <a:chExt cx="0" cy="0"/>
+        </a:xfrm>
+      </p:grpSpPr>
+      <p:sp>
+        <p:nvSpPr>
+          <p:cNvPr id="2" name="Slide Image Placeholder 1"/>
+          <p:cNvSpPr>
+            <a:spLocks noGrp="1" noRot="1" noChangeAspect="1"/>
+          </p:cNvSpPr>
+          <p:nvPr>
+            <p:ph type="sldImg"/>
+          </p:nvPr>
+        </p:nvSpPr>
+        <p:spPr/>
+      </p:sp>
+      <p:sp>
+        <p:nvSpPr>
+          <p:cNvPr id="3" name="Notes Placeholder 2"/>
+          <p:cNvSpPr>
+            <a:spLocks noGrp="1"/>
+          </p:cNvSpPr>
+          <p:nvPr>
+            <p:ph type="body" idx="1"/>
+          </p:nvPr>
+        </p:nvSpPr>
+        <p:spPr/>
+        <p:txBody>
+          <a:bodyPr/>
+          <a:lstStyle/>
+          <a:p>
+            <a:r>
+              <a:rPr lang="en-GB" dirty="0" smtClean="0"/>
+              <a:t>OpenCL</a:t>
+            </a:r>
+            <a:r>
+              <a:rPr lang="en-GB" baseline="0" dirty="0" smtClean="0"/>
+              <a:t> 1.2 introduced 1D images as well</a:t>
+            </a:r>
+            <a:endParaRPr lang="en-GB" dirty="0"/>
+          </a:p>
+        </p:txBody>
+      </p:sp>
+      <p:sp>
+        <p:nvSpPr>
+          <p:cNvPr id="4" name="Slide Number Placeholder 3"/>
+          <p:cNvSpPr>
+            <a:spLocks noGrp="1"/>
+          </p:cNvSpPr>
+          <p:nvPr>
+            <p:ph type="sldNum" sz="quarter" idx="10"/>
+          </p:nvPr>
+        </p:nvSpPr>
+        <p:spPr/>
+        <p:txBody>
+          <a:bodyPr/>
+          <a:lstStyle/>
+          <a:p>
+            <a:fld id="{09586968-7D7C-644F-B08A-4E148D7B3FC9}" type="slidenum">
+              <a:rPr lang="en-GB" smtClean="0"/>
+              <a:t>75</a:t>
+            </a:fld>
+            <a:endParaRPr lang="en-GB"/>
+          </a:p>
+        </p:txBody>
+      </p:sp>
+    </p:spTree>
+    <p:extLst>
+      <p:ext uri="{BB962C8B-B14F-4D97-AF65-F5344CB8AC3E}">
+        <p14:creationId xmlns:p14="http://schemas.microsoft.com/office/powerpoint/2010/main" val="1548980618"/>
+      </p:ext>
+    </p:extLst>
+  </p:cSld>
+  <p:clrMapOvr>
+    <a:masterClrMapping/>
+  </p:clrMapOvr>
+</p:notes>
+</file>
+
+<file path=ppt/notesSlides/notesSlide12.xml><?xml version="1.0" encoding="utf-8"?>
+<p:notes xmlns:a="http://schemas.openxmlformats.org/drawingml/2006/main" xmlns:r="http://schemas.openxmlformats.org/officeDocument/2006/relationships" xmlns:p="http://schemas.openxmlformats.org/presentationml/2006/main">
+  <p:cSld>
+    <p:spTree>
+      <p:nvGrpSpPr>
+        <p:cNvPr id="1" name=""/>
+        <p:cNvGrpSpPr/>
+        <p:nvPr/>
+      </p:nvGrpSpPr>
+      <p:grpSpPr>
+        <a:xfrm>
+          <a:off x="0" y="0"/>
+          <a:ext cx="0" cy="0"/>
+          <a:chOff x="0" y="0"/>
+          <a:chExt cx="0" cy="0"/>
+        </a:xfrm>
+      </p:grpSpPr>
+      <p:sp>
+        <p:nvSpPr>
+          <p:cNvPr id="2" name="Slide Image Placeholder 1"/>
+          <p:cNvSpPr>
+            <a:spLocks noGrp="1" noRot="1" noChangeAspect="1"/>
+          </p:cNvSpPr>
+          <p:nvPr>
+            <p:ph type="sldImg"/>
+          </p:nvPr>
+        </p:nvSpPr>
+        <p:spPr/>
+      </p:sp>
+      <p:sp>
+        <p:nvSpPr>
+          <p:cNvPr id="3" name="Notes Placeholder 2"/>
+          <p:cNvSpPr>
+            <a:spLocks noGrp="1"/>
+          </p:cNvSpPr>
+          <p:nvPr>
+            <p:ph type="body" idx="1"/>
+          </p:nvPr>
+        </p:nvSpPr>
+        <p:spPr/>
+        <p:txBody>
+          <a:bodyPr/>
+          <a:lstStyle/>
+          <a:p>
+            <a:r>
+              <a:rPr lang="en-GB" dirty="0" smtClean="0"/>
+              <a:t>Not all combinations of</a:t>
+            </a:r>
+            <a:r>
+              <a:rPr lang="en-GB" baseline="0" dirty="0" smtClean="0"/>
+              <a:t> data-type/channel order are valid (see table in spec)</a:t>
+            </a:r>
+          </a:p>
+          <a:p>
+            <a:r>
+              <a:rPr lang="en-GB" baseline="0" dirty="0" smtClean="0"/>
+              <a:t>Min requirement is for CL_RGBA with the UNORM, SIGNED, UNSIGNED and *_FLOAT types, and CL_BGRA with CL_UNORM_INT8</a:t>
+            </a:r>
+          </a:p>
+          <a:p>
+            <a:r>
+              <a:rPr lang="en-GB" baseline="0" dirty="0" smtClean="0"/>
+              <a:t>CL_*x variants affect border </a:t>
+            </a:r>
+            <a:r>
+              <a:rPr lang="en-GB" baseline="0" dirty="0" err="1" smtClean="0"/>
+              <a:t>color</a:t>
+            </a:r>
+            <a:r>
+              <a:rPr lang="en-GB" baseline="0" dirty="0" smtClean="0"/>
+              <a:t> when clamping out-of-range </a:t>
+            </a:r>
+            <a:r>
+              <a:rPr lang="en-GB" baseline="0" dirty="0" err="1" smtClean="0"/>
+              <a:t>coords</a:t>
+            </a:r>
+            <a:r>
+              <a:rPr lang="en-GB" baseline="0" dirty="0" smtClean="0"/>
+              <a:t> – x means alpha is 0, otherwise 1</a:t>
+            </a:r>
+          </a:p>
+          <a:p>
+            <a:r>
+              <a:rPr lang="en-GB" baseline="0" dirty="0" smtClean="0"/>
+              <a:t>INTENSITY </a:t>
+            </a:r>
+            <a:r>
+              <a:rPr lang="en-GB" baseline="0" dirty="0" err="1" smtClean="0"/>
+              <a:t>vs</a:t>
+            </a:r>
+            <a:r>
+              <a:rPr lang="en-GB" baseline="0" dirty="0" smtClean="0"/>
+              <a:t> LUMINANCE – also affects border </a:t>
+            </a:r>
+            <a:r>
+              <a:rPr lang="en-GB" baseline="0" dirty="0" err="1" smtClean="0"/>
+              <a:t>color</a:t>
+            </a:r>
+            <a:r>
+              <a:rPr lang="en-GB" baseline="0" dirty="0" smtClean="0"/>
+              <a:t> (INTENSITY means alpha is 0, otherwise 1)</a:t>
+            </a:r>
+          </a:p>
+          <a:p>
+            <a:endParaRPr lang="en-GB" dirty="0"/>
+          </a:p>
+        </p:txBody>
+      </p:sp>
+      <p:sp>
+        <p:nvSpPr>
+          <p:cNvPr id="4" name="Slide Number Placeholder 3"/>
+          <p:cNvSpPr>
+            <a:spLocks noGrp="1"/>
+          </p:cNvSpPr>
+          <p:nvPr>
+            <p:ph type="sldNum" sz="quarter" idx="10"/>
+          </p:nvPr>
+        </p:nvSpPr>
+        <p:spPr/>
+        <p:txBody>
+          <a:bodyPr/>
+          <a:lstStyle/>
+          <a:p>
+            <a:fld id="{09586968-7D7C-644F-B08A-4E148D7B3FC9}" type="slidenum">
+              <a:rPr lang="en-GB" smtClean="0"/>
+              <a:t>77</a:t>
+            </a:fld>
+            <a:endParaRPr lang="en-GB"/>
+          </a:p>
+        </p:txBody>
+      </p:sp>
+    </p:spTree>
+    <p:extLst>
+      <p:ext uri="{BB962C8B-B14F-4D97-AF65-F5344CB8AC3E}">
+        <p14:creationId xmlns:p14="http://schemas.microsoft.com/office/powerpoint/2010/main" val="1497800764"/>
+      </p:ext>
+    </p:extLst>
+  </p:cSld>
+  <p:clrMapOvr>
+    <a:masterClrMapping/>
+  </p:clrMapOvr>
+</p:notes>
+</file>
+
+<file path=ppt/notesSlides/notesSlide13.xml><?xml version="1.0" encoding="utf-8"?>
+<p:notes xmlns:a="http://schemas.openxmlformats.org/drawingml/2006/main" xmlns:r="http://schemas.openxmlformats.org/officeDocument/2006/relationships" xmlns:p="http://schemas.openxmlformats.org/presentationml/2006/main">
+  <p:cSld>
+    <p:spTree>
+      <p:nvGrpSpPr>
+        <p:cNvPr id="1" name=""/>
+        <p:cNvGrpSpPr/>
+        <p:nvPr/>
+      </p:nvGrpSpPr>
+      <p:grpSpPr>
+        <a:xfrm>
+          <a:off x="0" y="0"/>
+          <a:ext cx="0" cy="0"/>
+          <a:chOff x="0" y="0"/>
+          <a:chExt cx="0" cy="0"/>
+        </a:xfrm>
+      </p:grpSpPr>
+      <p:sp>
+        <p:nvSpPr>
+          <p:cNvPr id="2" name="Slide Image Placeholder 1"/>
+          <p:cNvSpPr>
+            <a:spLocks noGrp="1" noRot="1" noChangeAspect="1"/>
+          </p:cNvSpPr>
+          <p:nvPr>
+            <p:ph type="sldImg"/>
+          </p:nvPr>
+        </p:nvSpPr>
+        <p:spPr/>
+      </p:sp>
+      <p:sp>
+        <p:nvSpPr>
+          <p:cNvPr id="3" name="Notes Placeholder 2"/>
+          <p:cNvSpPr>
+            <a:spLocks noGrp="1"/>
+          </p:cNvSpPr>
+          <p:nvPr>
+            <p:ph type="body" idx="1"/>
+          </p:nvPr>
+        </p:nvSpPr>
+        <p:spPr/>
+        <p:txBody>
+          <a:bodyPr/>
+          <a:lstStyle/>
+          <a:p>
+            <a:r>
+              <a:rPr lang="en-GB" dirty="0" smtClean="0"/>
+              <a:t>OpenCL 2.0 introduced </a:t>
+            </a:r>
+            <a:r>
+              <a:rPr lang="en-GB" b="1" dirty="0" err="1" smtClean="0">
+                <a:latin typeface="Courier New"/>
+                <a:cs typeface="Courier New"/>
+              </a:rPr>
+              <a:t>read_write</a:t>
+            </a:r>
+            <a:r>
+              <a:rPr lang="en-GB" dirty="0" smtClean="0"/>
+              <a:t> attribute for images</a:t>
+            </a:r>
+            <a:endParaRPr lang="en-GB" dirty="0"/>
+          </a:p>
+        </p:txBody>
+      </p:sp>
+      <p:sp>
+        <p:nvSpPr>
+          <p:cNvPr id="4" name="Slide Number Placeholder 3"/>
+          <p:cNvSpPr>
+            <a:spLocks noGrp="1"/>
+          </p:cNvSpPr>
+          <p:nvPr>
+            <p:ph type="sldNum" sz="quarter" idx="10"/>
+          </p:nvPr>
+        </p:nvSpPr>
+        <p:spPr/>
+        <p:txBody>
+          <a:bodyPr/>
+          <a:lstStyle/>
+          <a:p>
+            <a:fld id="{09586968-7D7C-644F-B08A-4E148D7B3FC9}" type="slidenum">
+              <a:rPr lang="en-GB" smtClean="0"/>
+              <a:t>78</a:t>
+            </a:fld>
+            <a:endParaRPr lang="en-GB"/>
+          </a:p>
+        </p:txBody>
+      </p:sp>
+    </p:spTree>
+    <p:extLst>
+      <p:ext uri="{BB962C8B-B14F-4D97-AF65-F5344CB8AC3E}">
+        <p14:creationId xmlns:p14="http://schemas.microsoft.com/office/powerpoint/2010/main" val="399853659"/>
+      </p:ext>
+    </p:extLst>
+  </p:cSld>
+  <p:clrMapOvr>
+    <a:masterClrMapping/>
+  </p:clrMapOvr>
+</p:notes>
+</file>
+
+<file path=ppt/notesSlides/notesSlide14.xml><?xml version="1.0" encoding="utf-8"?>
+<p:notes xmlns:a="http://schemas.openxmlformats.org/drawingml/2006/main" xmlns:r="http://schemas.openxmlformats.org/officeDocument/2006/relationships" xmlns:p="http://schemas.openxmlformats.org/presentationml/2006/main">
+  <p:cSld>
+    <p:spTree>
+      <p:nvGrpSpPr>
+        <p:cNvPr id="1" name=""/>
+        <p:cNvGrpSpPr/>
+        <p:nvPr/>
+      </p:nvGrpSpPr>
+      <p:grpSpPr>
+        <a:xfrm>
+          <a:off x="0" y="0"/>
+          <a:ext cx="0" cy="0"/>
+          <a:chOff x="0" y="0"/>
+          <a:chExt cx="0" cy="0"/>
+        </a:xfrm>
+      </p:grpSpPr>
+      <p:sp>
+        <p:nvSpPr>
+          <p:cNvPr id="2" name="Slide Image Placeholder 1"/>
+          <p:cNvSpPr>
+            <a:spLocks noGrp="1" noRot="1" noChangeAspect="1"/>
+          </p:cNvSpPr>
+          <p:nvPr>
+            <p:ph type="sldImg"/>
+          </p:nvPr>
+        </p:nvSpPr>
+        <p:spPr/>
+      </p:sp>
+      <p:sp>
+        <p:nvSpPr>
+          <p:cNvPr id="3" name="Notes Placeholder 2"/>
+          <p:cNvSpPr>
+            <a:spLocks noGrp="1"/>
+          </p:cNvSpPr>
+          <p:nvPr>
+            <p:ph type="body" idx="1"/>
+          </p:nvPr>
+        </p:nvSpPr>
+        <p:spPr/>
+        <p:txBody>
+          <a:bodyPr/>
+          <a:lstStyle/>
+          <a:p>
+            <a:r>
+              <a:rPr lang="en-GB" dirty="0" smtClean="0"/>
+              <a:t>Declaring the sample inside the OpenCL program may be faster – compiler can optimize</a:t>
+            </a:r>
+            <a:endParaRPr lang="en-GB" dirty="0"/>
+          </a:p>
+        </p:txBody>
+      </p:sp>
+      <p:sp>
+        <p:nvSpPr>
+          <p:cNvPr id="4" name="Slide Number Placeholder 3"/>
+          <p:cNvSpPr>
+            <a:spLocks noGrp="1"/>
+          </p:cNvSpPr>
+          <p:nvPr>
+            <p:ph type="sldNum" sz="quarter" idx="10"/>
+          </p:nvPr>
+        </p:nvSpPr>
+        <p:spPr/>
+        <p:txBody>
+          <a:bodyPr/>
+          <a:lstStyle/>
+          <a:p>
+            <a:fld id="{09586968-7D7C-644F-B08A-4E148D7B3FC9}" type="slidenum">
+              <a:rPr lang="en-GB" smtClean="0"/>
+              <a:t>79</a:t>
+            </a:fld>
+            <a:endParaRPr lang="en-GB"/>
+          </a:p>
+        </p:txBody>
+      </p:sp>
+    </p:spTree>
+    <p:extLst>
+      <p:ext uri="{BB962C8B-B14F-4D97-AF65-F5344CB8AC3E}">
+        <p14:creationId xmlns:p14="http://schemas.microsoft.com/office/powerpoint/2010/main" val="400922365"/>
       </p:ext>
     </p:extLst>
   </p:cSld>
@@ -43601,7 +44122,16 @@
                 <a:latin typeface="Courier New"/>
                 <a:cs typeface="Courier New"/>
               </a:rPr>
-              <a:t>Image2D </a:t>
+              <a:t>Image2D</a:t>
+            </a:r>
+            <a:r>
+              <a:rPr lang="en-GB" b="1" dirty="0">
+                <a:solidFill>
+                  <a:srgbClr val="3366FF"/>
+                </a:solidFill>
+                <a:cs typeface="Courier New"/>
+              </a:rPr>
+              <a:t> </a:t>
             </a:r>
             <a:r>
               <a:rPr lang="en-GB" dirty="0"/>
@@ -43615,7 +44145,17 @@
                 <a:latin typeface="Courier New"/>
                 <a:cs typeface="Courier New"/>
               </a:rPr>
-              <a:t>Image3D </a:t>
+              <a:t>Image3D</a:t>
+            </a:r>
+            <a:r>
+              <a:rPr lang="en-GB" b="1" dirty="0">
+                <a:solidFill>
+                  <a:srgbClr val="3366FF"/>
+                </a:solidFill>
+                <a:latin typeface="Calibri"/>
+                <a:cs typeface="Calibri"/>
+              </a:rPr>
+              <a:t> </a:t>
             </a:r>
             <a:r>
               <a:rPr lang="en-GB" dirty="0"/>
@@ -43707,7 +44247,23 @@
               <a:rPr lang="en-GB" dirty="0" smtClean="0"/>
               <a:t>functions</a:t>
             </a:r>
-            <a:endParaRPr lang="en-GB" dirty="0"/>
+          </a:p>
+          <a:p>
+            <a:pPr marL="285750" indent="-285750">
+              <a:buFont typeface="Arial"/>
+              <a:buChar char="•"/>
+            </a:pPr>
+            <a:r>
+              <a:rPr lang="en-GB" dirty="0" smtClean="0"/>
+              <a:t>Can also copy between buffers and images</a:t>
+            </a:r>
+            <a:endParaRPr lang="en-GB" b="1" dirty="0">
+              <a:solidFill>
+                <a:srgbClr val="3366FF"/>
+              </a:solidFill>
+              <a:latin typeface="Courier New"/>
+              <a:cs typeface="Courier New"/>
+            </a:endParaRPr>
           </a:p>
           <a:p>
             <a:pPr marL="285750" indent="-285750">
@@ -43812,7 +44368,17 @@
                 <a:latin typeface="Courier New"/>
                 <a:cs typeface="Courier New"/>
               </a:rPr>
-              <a:t>Image </a:t>
+              <a:t>Image</a:t>
+            </a:r>
+            <a:r>
+              <a:rPr lang="en-GB" sz="1200" b="1" dirty="0" smtClean="0">
+                <a:solidFill>
+                  <a:srgbClr val="3366FF"/>
+                </a:solidFill>
+                <a:latin typeface="Calibri"/>
+                <a:cs typeface="Calibri"/>
+              </a:rPr>
+              <a:t> </a:t>
             </a:r>
             <a:r>
               <a:rPr lang="en-GB" sz="1200" dirty="0" smtClean="0">
@@ -45074,7 +45640,7 @@
         <p:spPr>
           <a:xfrm>
             <a:off x="1436414" y="6297448"/>
-            <a:ext cx="4923380" cy="369332"/>
+            <a:ext cx="5962915" cy="369332"/>
           </a:xfrm>
           <a:prstGeom prst="rect">
             <a:avLst/>
@@ -45089,15 +45655,23 @@
           <a:p>
             <a:r>
               <a:rPr lang="en-US" dirty="0" smtClean="0"/>
-              <a:t>Note: the sampler-less reads are </a:t>
-            </a:r>
-            <a:r>
-              <a:rPr lang="en-US" dirty="0" err="1" smtClean="0"/>
-              <a:t>OpenCL</a:t>
+              <a:t>Note: </a:t>
             </a:r>
             <a:r>
               <a:rPr lang="en-US" dirty="0" smtClean="0"/>
-              <a:t> 1.2+ only</a:t>
+              <a:t>these </a:t>
+            </a:r>
+            <a:r>
+              <a:rPr lang="en-US" dirty="0" smtClean="0"/>
+              <a:t>sampler-less </a:t>
+            </a:r>
+            <a:r>
+              <a:rPr lang="en-US" dirty="0" smtClean="0"/>
+              <a:t>read functions </a:t>
+            </a:r>
+            <a:r>
+              <a:rPr lang="en-US" dirty="0" smtClean="0"/>
+              <a:t>are OpenCL 1.2+ only</a:t>
             </a:r>
             <a:endParaRPr lang="en-US" dirty="0"/>
           </a:p>

</xml_diff>

<commit_message>
Added more presenter notes, minor tweak to constant memory slide.
</commit_message>
<xml_diff>
--- a/slides/advanced_part3.pptx
+++ b/slides/advanced_part3.pptx
@@ -674,24 +674,11 @@
           <a:p>
             <a:r>
               <a:rPr lang="en-GB" dirty="0" smtClean="0"/>
-              <a:t>Example of the barriers which can speed up code by making a barrier between accessing different bits of memory. </a:t>
-            </a:r>
-          </a:p>
-          <a:p>
-            <a:endParaRPr lang="en-GB" dirty="0" smtClean="0"/>
-          </a:p>
-          <a:p>
-            <a:r>
-              <a:rPr lang="en-GB" dirty="0" smtClean="0"/>
-              <a:t>From the </a:t>
-            </a:r>
-            <a:r>
-              <a:rPr lang="en-GB" dirty="0" err="1" smtClean="0"/>
-              <a:t>CloverLeaf</a:t>
-            </a:r>
-            <a:r>
-              <a:rPr lang="en-GB" dirty="0" smtClean="0"/>
-              <a:t> benchmark (2D structured grid code for Hydrodynamics).</a:t>
+              <a:t>Still have</a:t>
+            </a:r>
+            <a:r>
+              <a:rPr lang="en-GB" baseline="0" dirty="0" smtClean="0"/>
+              <a:t> to expose the implementation decisions in your code though (e.g. via command-line options)</a:t>
             </a:r>
             <a:endParaRPr lang="en-GB" dirty="0"/>
           </a:p>
@@ -712,10 +699,9 @@
           <a:bodyPr/>
           <a:lstStyle/>
           <a:p>
-            <a:fld id="{9B3F2D69-97A9-4C41-91BD-6A22F8270148}" type="slidenum">
+            <a:fld id="{09586968-7D7C-644F-B08A-4E148D7B3FC9}" type="slidenum">
               <a:rPr lang="en-GB" smtClean="0"/>
-              <a:pPr/>
-              <a:t>64</a:t>
+              <a:t>61</a:t>
             </a:fld>
             <a:endParaRPr lang="en-GB"/>
           </a:p>
@@ -724,7 +710,7 @@
     </p:spTree>
     <p:extLst>
       <p:ext uri="{BB962C8B-B14F-4D97-AF65-F5344CB8AC3E}">
-        <p14:creationId xmlns:p14="http://schemas.microsoft.com/office/powerpoint/2010/main" val="941717049"/>
+        <p14:creationId xmlns:p14="http://schemas.microsoft.com/office/powerpoint/2010/main" val="1145895828"/>
       </p:ext>
     </p:extLst>
   </p:cSld>
@@ -778,30 +764,29 @@
           <a:bodyPr/>
           <a:lstStyle/>
           <a:p>
-            <a:pPr marL="0" marR="0" indent="0" algn="l" defTabSz="457200" rtl="0" eaLnBrk="1" fontAlgn="auto" latinLnBrk="0" hangingPunct="1">
-              <a:lnSpc>
-                <a:spcPct val="100000"/>
-              </a:lnSpc>
-              <a:spcBef>
-                <a:spcPts val="0"/>
-              </a:spcBef>
-              <a:spcAft>
-                <a:spcPts val="0"/>
-              </a:spcAft>
-              <a:buClrTx/>
-              <a:buSzTx/>
-              <a:buFontTx/>
-              <a:buNone/>
-              <a:tabLst/>
-              <a:defRPr/>
-            </a:pPr>
-            <a:r>
-              <a:rPr lang="en-US" dirty="0" smtClean="0"/>
-              <a:t>Mask 0 if a &lt;= b </a:t>
-            </a:r>
-          </a:p>
-          <a:p>
-            <a:endParaRPr lang="en-US" dirty="0"/>
+            <a:r>
+              <a:rPr lang="en-GB" dirty="0" smtClean="0"/>
+              <a:t>Barriers between code for better cache use </a:t>
+            </a:r>
+            <a:r>
+              <a:rPr lang="en-GB" dirty="0" err="1" smtClean="0"/>
+              <a:t>etc</a:t>
+            </a:r>
+            <a:endParaRPr lang="en-GB" dirty="0" smtClean="0"/>
+          </a:p>
+          <a:p>
+            <a:endParaRPr lang="en-GB" dirty="0" smtClean="0"/>
+          </a:p>
+          <a:p>
+            <a:r>
+              <a:rPr lang="en-GB" dirty="0" smtClean="0"/>
+              <a:t>Architecture dependent, may not always</a:t>
+            </a:r>
+            <a:r>
+              <a:rPr lang="en-GB" baseline="0" dirty="0" smtClean="0"/>
+              <a:t> be useful</a:t>
+            </a:r>
+            <a:endParaRPr lang="en-GB" dirty="0"/>
           </a:p>
         </p:txBody>
       </p:sp>
@@ -820,9 +805,10 @@
           <a:bodyPr/>
           <a:lstStyle/>
           <a:p>
-            <a:fld id="{09586968-7D7C-644F-B08A-4E148D7B3FC9}" type="slidenum">
+            <a:fld id="{9B3F2D69-97A9-4C41-91BD-6A22F8270148}" type="slidenum">
               <a:rPr lang="en-GB" smtClean="0"/>
-              <a:t>70</a:t>
+              <a:pPr/>
+              <a:t>63</a:t>
             </a:fld>
             <a:endParaRPr lang="en-GB"/>
           </a:p>
@@ -831,7 +817,7 @@
     </p:spTree>
     <p:extLst>
       <p:ext uri="{BB962C8B-B14F-4D97-AF65-F5344CB8AC3E}">
-        <p14:creationId xmlns:p14="http://schemas.microsoft.com/office/powerpoint/2010/main" val="4019362909"/>
+        <p14:creationId xmlns:p14="http://schemas.microsoft.com/office/powerpoint/2010/main" val="80389277"/>
       </p:ext>
     </p:extLst>
   </p:cSld>
@@ -887,17 +873,24 @@
           <a:p>
             <a:r>
               <a:rPr lang="en-GB" dirty="0" smtClean="0"/>
-              <a:t>Intel Xeon Phi is only platform we’ve come across that doesn’t support images</a:t>
-            </a:r>
+              <a:t>Example of the barriers which can speed up code by making a barrier between accessing different bits of memory. </a:t>
+            </a:r>
+          </a:p>
+          <a:p>
+            <a:endParaRPr lang="en-GB" dirty="0" smtClean="0"/>
           </a:p>
           <a:p>
             <a:r>
               <a:rPr lang="en-GB" dirty="0" smtClean="0"/>
-              <a:t>As well as being faster on many devices, also more convenient</a:t>
-            </a:r>
-            <a:r>
-              <a:rPr lang="en-GB" baseline="0" dirty="0" smtClean="0"/>
-              <a:t> (bounds checking, normalization, interpolation)</a:t>
+              <a:t>From the </a:t>
+            </a:r>
+            <a:r>
+              <a:rPr lang="en-GB" dirty="0" err="1" smtClean="0"/>
+              <a:t>CloverLeaf</a:t>
+            </a:r>
+            <a:r>
+              <a:rPr lang="en-GB" dirty="0" smtClean="0"/>
+              <a:t> benchmark (2D structured grid code for Hydrodynamics).</a:t>
             </a:r>
             <a:endParaRPr lang="en-GB" dirty="0"/>
           </a:p>
@@ -918,9 +911,10 @@
           <a:bodyPr/>
           <a:lstStyle/>
           <a:p>
-            <a:fld id="{09586968-7D7C-644F-B08A-4E148D7B3FC9}" type="slidenum">
+            <a:fld id="{9B3F2D69-97A9-4C41-91BD-6A22F8270148}" type="slidenum">
               <a:rPr lang="en-GB" smtClean="0"/>
-              <a:t>74</a:t>
+              <a:pPr/>
+              <a:t>64</a:t>
             </a:fld>
             <a:endParaRPr lang="en-GB"/>
           </a:p>
@@ -929,7 +923,7 @@
     </p:spTree>
     <p:extLst>
       <p:ext uri="{BB962C8B-B14F-4D97-AF65-F5344CB8AC3E}">
-        <p14:creationId xmlns:p14="http://schemas.microsoft.com/office/powerpoint/2010/main" val="1455476205"/>
+        <p14:creationId xmlns:p14="http://schemas.microsoft.com/office/powerpoint/2010/main" val="941717049"/>
       </p:ext>
     </p:extLst>
   </p:cSld>
@@ -985,11 +979,31 @@
           <a:p>
             <a:r>
               <a:rPr lang="en-GB" dirty="0" smtClean="0"/>
-              <a:t>OpenCL</a:t>
+              <a:t>All standard math functions (</a:t>
+            </a:r>
+            <a:r>
+              <a:rPr lang="en-GB" dirty="0" err="1" smtClean="0"/>
+              <a:t>sqrt</a:t>
+            </a:r>
+            <a:r>
+              <a:rPr lang="en-GB" dirty="0" smtClean="0"/>
+              <a:t>, sin</a:t>
             </a:r>
             <a:r>
               <a:rPr lang="en-GB" baseline="0" dirty="0" smtClean="0"/>
-              <a:t> 1.2 introduced 1D images as well</a:t>
+              <a:t> </a:t>
+            </a:r>
+            <a:r>
+              <a:rPr lang="en-GB" baseline="0" dirty="0" err="1" smtClean="0"/>
+              <a:t>etc</a:t>
+            </a:r>
+            <a:r>
+              <a:rPr lang="en-GB" dirty="0" smtClean="0"/>
+              <a:t>) work on these</a:t>
+            </a:r>
+            <a:r>
+              <a:rPr lang="en-GB" baseline="0" dirty="0" smtClean="0"/>
+              <a:t> vector types (component-wise)</a:t>
             </a:r>
             <a:endParaRPr lang="en-GB" dirty="0"/>
           </a:p>
@@ -1012,7 +1026,7 @@
           <a:p>
             <a:fld id="{09586968-7D7C-644F-B08A-4E148D7B3FC9}" type="slidenum">
               <a:rPr lang="en-GB" smtClean="0"/>
-              <a:t>75</a:t>
+              <a:t>65</a:t>
             </a:fld>
             <a:endParaRPr lang="en-GB"/>
           </a:p>
@@ -1021,7 +1035,7 @@
     </p:spTree>
     <p:extLst>
       <p:ext uri="{BB962C8B-B14F-4D97-AF65-F5344CB8AC3E}">
-        <p14:creationId xmlns:p14="http://schemas.microsoft.com/office/powerpoint/2010/main" val="1548980618"/>
+        <p14:creationId xmlns:p14="http://schemas.microsoft.com/office/powerpoint/2010/main" val="4261164090"/>
       </p:ext>
     </p:extLst>
   </p:cSld>
@@ -1077,64 +1091,16 @@
           <a:p>
             <a:r>
               <a:rPr lang="en-GB" dirty="0" smtClean="0"/>
-              <a:t>Not all combinations of</a:t>
+              <a:t>This device query would return 1 on platforms that implicitly</a:t>
             </a:r>
             <a:r>
               <a:rPr lang="en-GB" baseline="0" dirty="0" smtClean="0"/>
-              <a:t> data-type/channel order are valid (see table in spec)</a:t>
-            </a:r>
-          </a:p>
-          <a:p>
-            <a:r>
-              <a:rPr lang="en-GB" baseline="0" dirty="0" smtClean="0"/>
-              <a:t>Min requirement is for CL_RGBA with the UNORM, SIGNED, UNSIGNED and *_FLOAT types, and CL_BGRA with CL_UNORM_INT8</a:t>
-            </a:r>
-          </a:p>
-          <a:p>
-            <a:r>
-              <a:rPr lang="en-GB" baseline="0" dirty="0" smtClean="0"/>
-              <a:t>CL_*x variants affect border </a:t>
+              <a:t> </a:t>
             </a:r>
             <a:r>
               <a:rPr lang="en-GB" baseline="0" dirty="0" err="1" smtClean="0"/>
-              <a:t>color</a:t>
-            </a:r>
-            <a:r>
-              <a:rPr lang="en-GB" baseline="0" dirty="0" smtClean="0"/>
-              <a:t> when clamping out-of-range </a:t>
-            </a:r>
-            <a:r>
-              <a:rPr lang="en-GB" baseline="0" dirty="0" err="1" smtClean="0"/>
-              <a:t>coords</a:t>
-            </a:r>
-            <a:r>
-              <a:rPr lang="en-GB" baseline="0" dirty="0" smtClean="0"/>
-              <a:t> – x means alpha is 0, otherwise 1</a:t>
-            </a:r>
-          </a:p>
-          <a:p>
-            <a:r>
-              <a:rPr lang="en-GB" baseline="0" dirty="0" smtClean="0"/>
-              <a:t>INTENSITY </a:t>
-            </a:r>
-            <a:r>
-              <a:rPr lang="en-GB" baseline="0" dirty="0" err="1" smtClean="0"/>
-              <a:t>vs</a:t>
-            </a:r>
-            <a:r>
-              <a:rPr lang="en-GB" baseline="0" dirty="0" smtClean="0"/>
-              <a:t> LUMINANCE – also affects border </a:t>
-            </a:r>
-            <a:r>
-              <a:rPr lang="en-GB" baseline="0" dirty="0" err="1" smtClean="0"/>
-              <a:t>color</a:t>
-            </a:r>
-            <a:r>
-              <a:rPr lang="en-GB" baseline="0" dirty="0" smtClean="0"/>
-              <a:t> (INTENSITY means alpha is 0, otherwise 1)</a:t>
-            </a:r>
-          </a:p>
-          <a:p>
+              <a:t>vectorize</a:t>
+            </a:r>
             <a:endParaRPr lang="en-GB" dirty="0"/>
           </a:p>
         </p:txBody>
@@ -1156,7 +1122,7 @@
           <a:p>
             <a:fld id="{09586968-7D7C-644F-B08A-4E148D7B3FC9}" type="slidenum">
               <a:rPr lang="en-GB" smtClean="0"/>
-              <a:t>77</a:t>
+              <a:t>68</a:t>
             </a:fld>
             <a:endParaRPr lang="en-GB"/>
           </a:p>
@@ -1165,7 +1131,7 @@
     </p:spTree>
     <p:extLst>
       <p:ext uri="{BB962C8B-B14F-4D97-AF65-F5344CB8AC3E}">
-        <p14:creationId xmlns:p14="http://schemas.microsoft.com/office/powerpoint/2010/main" val="1497800764"/>
+        <p14:creationId xmlns:p14="http://schemas.microsoft.com/office/powerpoint/2010/main" val="3581421292"/>
       </p:ext>
     </p:extLst>
   </p:cSld>
@@ -1221,18 +1187,11 @@
           <a:p>
             <a:r>
               <a:rPr lang="en-GB" dirty="0" smtClean="0"/>
-              <a:t>OpenCL 2.0 introduced </a:t>
-            </a:r>
-            <a:r>
-              <a:rPr lang="en-GB" b="1" dirty="0" err="1" smtClean="0">
-                <a:latin typeface="Courier New"/>
-                <a:cs typeface="Courier New"/>
-              </a:rPr>
-              <a:t>read_write</a:t>
-            </a:r>
-            <a:r>
-              <a:rPr lang="en-GB" dirty="0" smtClean="0"/>
-              <a:t> attribute for images</a:t>
+              <a:t>Branches</a:t>
+            </a:r>
+            <a:r>
+              <a:rPr lang="en-GB" baseline="0" dirty="0" smtClean="0"/>
+              <a:t> will cause pipeline stalls if there’s no branch prediction/speculative execution</a:t>
             </a:r>
             <a:endParaRPr lang="en-GB" dirty="0"/>
           </a:p>
@@ -1255,7 +1214,7 @@
           <a:p>
             <a:fld id="{09586968-7D7C-644F-B08A-4E148D7B3FC9}" type="slidenum">
               <a:rPr lang="en-GB" smtClean="0"/>
-              <a:t>78</a:t>
+              <a:t>69</a:t>
             </a:fld>
             <a:endParaRPr lang="en-GB"/>
           </a:p>
@@ -1264,7 +1223,7 @@
     </p:spTree>
     <p:extLst>
       <p:ext uri="{BB962C8B-B14F-4D97-AF65-F5344CB8AC3E}">
-        <p14:creationId xmlns:p14="http://schemas.microsoft.com/office/powerpoint/2010/main" val="399853659"/>
+        <p14:creationId xmlns:p14="http://schemas.microsoft.com/office/powerpoint/2010/main" val="1154213089"/>
       </p:ext>
     </p:extLst>
   </p:cSld>
@@ -1318,11 +1277,77 @@
           <a:bodyPr/>
           <a:lstStyle/>
           <a:p>
-            <a:r>
-              <a:rPr lang="en-GB" dirty="0" smtClean="0"/>
-              <a:t>Declaring the sample inside the OpenCL program may be faster – compiler can optimize</a:t>
-            </a:r>
-            <a:endParaRPr lang="en-GB" dirty="0"/>
+            <a:pPr marL="0" marR="0" indent="0" algn="l" defTabSz="457200" rtl="0" eaLnBrk="1" fontAlgn="auto" latinLnBrk="0" hangingPunct="1">
+              <a:lnSpc>
+                <a:spcPct val="100000"/>
+              </a:lnSpc>
+              <a:spcBef>
+                <a:spcPts val="0"/>
+              </a:spcBef>
+              <a:spcAft>
+                <a:spcPts val="0"/>
+              </a:spcAft>
+              <a:buClrTx/>
+              <a:buSzTx/>
+              <a:buFontTx/>
+              <a:buNone/>
+              <a:tabLst/>
+              <a:defRPr/>
+            </a:pPr>
+            <a:r>
+              <a:rPr lang="en-US" dirty="0" smtClean="0"/>
+              <a:t>Mask 0 if a &lt;= b </a:t>
+            </a:r>
+          </a:p>
+          <a:p>
+            <a:endParaRPr lang="en-US" dirty="0" smtClean="0"/>
+          </a:p>
+          <a:p>
+            <a:r>
+              <a:rPr lang="en-US" dirty="0" smtClean="0"/>
+              <a:t>Single</a:t>
+            </a:r>
+            <a:r>
+              <a:rPr lang="en-US" baseline="0" dirty="0" smtClean="0"/>
+              <a:t>-cycle multiply-add means we get the extra multiplication by the mask for free</a:t>
+            </a:r>
+          </a:p>
+          <a:p>
+            <a:r>
+              <a:rPr lang="en-US" baseline="0" dirty="0" smtClean="0"/>
+              <a:t>No branches means there won’t be any pipeline stalls</a:t>
+            </a:r>
+          </a:p>
+          <a:p>
+            <a:r>
+              <a:rPr lang="en-US" baseline="0" dirty="0" smtClean="0"/>
+              <a:t>Subtle point: more instruction level parallelism in second example: the </a:t>
+            </a:r>
+            <a:r>
+              <a:rPr lang="en-US" baseline="0" dirty="0" err="1" smtClean="0"/>
+              <a:t>mul</a:t>
+            </a:r>
+            <a:r>
+              <a:rPr lang="en-US" baseline="0" dirty="0" smtClean="0"/>
+              <a:t> and sub can be issued independently from the </a:t>
+            </a:r>
+            <a:r>
+              <a:rPr lang="en-US" baseline="0" dirty="0" err="1" smtClean="0"/>
+              <a:t>setp</a:t>
+            </a:r>
+            <a:r>
+              <a:rPr lang="en-US" baseline="0" dirty="0" smtClean="0"/>
+              <a:t> and </a:t>
+            </a:r>
+            <a:r>
+              <a:rPr lang="en-US" baseline="0" dirty="0" err="1" smtClean="0"/>
+              <a:t>selp</a:t>
+            </a:r>
+            <a:r>
+              <a:rPr lang="en-US" baseline="0" dirty="0" smtClean="0"/>
+              <a:t> on dual-issue architectures</a:t>
+            </a:r>
+            <a:endParaRPr lang="en-US" dirty="0"/>
           </a:p>
         </p:txBody>
       </p:sp>
@@ -1343,7 +1368,7 @@
           <a:p>
             <a:fld id="{09586968-7D7C-644F-B08A-4E148D7B3FC9}" type="slidenum">
               <a:rPr lang="en-GB" smtClean="0"/>
-              <a:t>79</a:t>
+              <a:t>70</a:t>
             </a:fld>
             <a:endParaRPr lang="en-GB"/>
           </a:p>
@@ -1352,7 +1377,281 @@
     </p:spTree>
     <p:extLst>
       <p:ext uri="{BB962C8B-B14F-4D97-AF65-F5344CB8AC3E}">
-        <p14:creationId xmlns:p14="http://schemas.microsoft.com/office/powerpoint/2010/main" val="400922365"/>
+        <p14:creationId xmlns:p14="http://schemas.microsoft.com/office/powerpoint/2010/main" val="4019362909"/>
+      </p:ext>
+    </p:extLst>
+  </p:cSld>
+  <p:clrMapOvr>
+    <a:masterClrMapping/>
+  </p:clrMapOvr>
+</p:notes>
+</file>
+
+<file path=ppt/notesSlides/notesSlide17.xml><?xml version="1.0" encoding="utf-8"?>
+<p:notes xmlns:a="http://schemas.openxmlformats.org/drawingml/2006/main" xmlns:r="http://schemas.openxmlformats.org/officeDocument/2006/relationships" xmlns:p="http://schemas.openxmlformats.org/presentationml/2006/main">
+  <p:cSld>
+    <p:spTree>
+      <p:nvGrpSpPr>
+        <p:cNvPr id="1" name=""/>
+        <p:cNvGrpSpPr/>
+        <p:nvPr/>
+      </p:nvGrpSpPr>
+      <p:grpSpPr>
+        <a:xfrm>
+          <a:off x="0" y="0"/>
+          <a:ext cx="0" cy="0"/>
+          <a:chOff x="0" y="0"/>
+          <a:chExt cx="0" cy="0"/>
+        </a:xfrm>
+      </p:grpSpPr>
+      <p:sp>
+        <p:nvSpPr>
+          <p:cNvPr id="2" name="Slide Image Placeholder 1"/>
+          <p:cNvSpPr>
+            <a:spLocks noGrp="1" noRot="1" noChangeAspect="1"/>
+          </p:cNvSpPr>
+          <p:nvPr>
+            <p:ph type="sldImg"/>
+          </p:nvPr>
+        </p:nvSpPr>
+        <p:spPr/>
+      </p:sp>
+      <p:sp>
+        <p:nvSpPr>
+          <p:cNvPr id="3" name="Notes Placeholder 2"/>
+          <p:cNvSpPr>
+            <a:spLocks noGrp="1"/>
+          </p:cNvSpPr>
+          <p:nvPr>
+            <p:ph type="body" idx="1"/>
+          </p:nvPr>
+        </p:nvSpPr>
+        <p:spPr/>
+        <p:txBody>
+          <a:bodyPr/>
+          <a:lstStyle/>
+          <a:p>
+            <a:r>
+              <a:rPr lang="en-GB" dirty="0" smtClean="0"/>
+              <a:t>***no precision guarantees at all*** for native functions – need</a:t>
+            </a:r>
+            <a:r>
+              <a:rPr lang="en-GB" baseline="0" dirty="0" smtClean="0"/>
+              <a:t> to be careful</a:t>
+            </a:r>
+            <a:endParaRPr lang="en-GB" dirty="0"/>
+          </a:p>
+        </p:txBody>
+      </p:sp>
+      <p:sp>
+        <p:nvSpPr>
+          <p:cNvPr id="4" name="Slide Number Placeholder 3"/>
+          <p:cNvSpPr>
+            <a:spLocks noGrp="1"/>
+          </p:cNvSpPr>
+          <p:nvPr>
+            <p:ph type="sldNum" sz="quarter" idx="10"/>
+          </p:nvPr>
+        </p:nvSpPr>
+        <p:spPr/>
+        <p:txBody>
+          <a:bodyPr/>
+          <a:lstStyle/>
+          <a:p>
+            <a:fld id="{09586968-7D7C-644F-B08A-4E148D7B3FC9}" type="slidenum">
+              <a:rPr lang="en-GB" smtClean="0"/>
+              <a:t>71</a:t>
+            </a:fld>
+            <a:endParaRPr lang="en-GB"/>
+          </a:p>
+        </p:txBody>
+      </p:sp>
+    </p:spTree>
+    <p:extLst>
+      <p:ext uri="{BB962C8B-B14F-4D97-AF65-F5344CB8AC3E}">
+        <p14:creationId xmlns:p14="http://schemas.microsoft.com/office/powerpoint/2010/main" val="1610227844"/>
+      </p:ext>
+    </p:extLst>
+  </p:cSld>
+  <p:clrMapOvr>
+    <a:masterClrMapping/>
+  </p:clrMapOvr>
+</p:notes>
+</file>
+
+<file path=ppt/notesSlides/notesSlide18.xml><?xml version="1.0" encoding="utf-8"?>
+<p:notes xmlns:a="http://schemas.openxmlformats.org/drawingml/2006/main" xmlns:r="http://schemas.openxmlformats.org/officeDocument/2006/relationships" xmlns:p="http://schemas.openxmlformats.org/presentationml/2006/main">
+  <p:cSld>
+    <p:spTree>
+      <p:nvGrpSpPr>
+        <p:cNvPr id="1" name=""/>
+        <p:cNvGrpSpPr/>
+        <p:nvPr/>
+      </p:nvGrpSpPr>
+      <p:grpSpPr>
+        <a:xfrm>
+          <a:off x="0" y="0"/>
+          <a:ext cx="0" cy="0"/>
+          <a:chOff x="0" y="0"/>
+          <a:chExt cx="0" cy="0"/>
+        </a:xfrm>
+      </p:grpSpPr>
+      <p:sp>
+        <p:nvSpPr>
+          <p:cNvPr id="2" name="Slide Image Placeholder 1"/>
+          <p:cNvSpPr>
+            <a:spLocks noGrp="1" noRot="1" noChangeAspect="1"/>
+          </p:cNvSpPr>
+          <p:nvPr>
+            <p:ph type="sldImg"/>
+          </p:nvPr>
+        </p:nvSpPr>
+        <p:spPr/>
+      </p:sp>
+      <p:sp>
+        <p:nvSpPr>
+          <p:cNvPr id="3" name="Notes Placeholder 2"/>
+          <p:cNvSpPr>
+            <a:spLocks noGrp="1"/>
+          </p:cNvSpPr>
+          <p:nvPr>
+            <p:ph type="body" idx="1"/>
+          </p:nvPr>
+        </p:nvSpPr>
+        <p:spPr/>
+        <p:txBody>
+          <a:bodyPr/>
+          <a:lstStyle/>
+          <a:p>
+            <a:endParaRPr lang="en-GB" dirty="0"/>
+          </a:p>
+        </p:txBody>
+      </p:sp>
+      <p:sp>
+        <p:nvSpPr>
+          <p:cNvPr id="4" name="Slide Number Placeholder 3"/>
+          <p:cNvSpPr>
+            <a:spLocks noGrp="1"/>
+          </p:cNvSpPr>
+          <p:nvPr>
+            <p:ph type="sldNum" sz="quarter" idx="10"/>
+          </p:nvPr>
+        </p:nvSpPr>
+        <p:spPr/>
+        <p:txBody>
+          <a:bodyPr/>
+          <a:lstStyle/>
+          <a:p>
+            <a:fld id="{09586968-7D7C-644F-B08A-4E148D7B3FC9}" type="slidenum">
+              <a:rPr lang="en-GB" smtClean="0"/>
+              <a:t>72</a:t>
+            </a:fld>
+            <a:endParaRPr lang="en-GB"/>
+          </a:p>
+        </p:txBody>
+      </p:sp>
+    </p:spTree>
+    <p:extLst>
+      <p:ext uri="{BB962C8B-B14F-4D97-AF65-F5344CB8AC3E}">
+        <p14:creationId xmlns:p14="http://schemas.microsoft.com/office/powerpoint/2010/main" val="1133319794"/>
+      </p:ext>
+    </p:extLst>
+  </p:cSld>
+  <p:clrMapOvr>
+    <a:masterClrMapping/>
+  </p:clrMapOvr>
+</p:notes>
+</file>
+
+<file path=ppt/notesSlides/notesSlide19.xml><?xml version="1.0" encoding="utf-8"?>
+<p:notes xmlns:a="http://schemas.openxmlformats.org/drawingml/2006/main" xmlns:r="http://schemas.openxmlformats.org/officeDocument/2006/relationships" xmlns:p="http://schemas.openxmlformats.org/presentationml/2006/main">
+  <p:cSld>
+    <p:spTree>
+      <p:nvGrpSpPr>
+        <p:cNvPr id="1" name=""/>
+        <p:cNvGrpSpPr/>
+        <p:nvPr/>
+      </p:nvGrpSpPr>
+      <p:grpSpPr>
+        <a:xfrm>
+          <a:off x="0" y="0"/>
+          <a:ext cx="0" cy="0"/>
+          <a:chOff x="0" y="0"/>
+          <a:chExt cx="0" cy="0"/>
+        </a:xfrm>
+      </p:grpSpPr>
+      <p:sp>
+        <p:nvSpPr>
+          <p:cNvPr id="2" name="Slide Image Placeholder 1"/>
+          <p:cNvSpPr>
+            <a:spLocks noGrp="1" noRot="1" noChangeAspect="1"/>
+          </p:cNvSpPr>
+          <p:nvPr>
+            <p:ph type="sldImg"/>
+          </p:nvPr>
+        </p:nvSpPr>
+        <p:spPr/>
+      </p:sp>
+      <p:sp>
+        <p:nvSpPr>
+          <p:cNvPr id="3" name="Notes Placeholder 2"/>
+          <p:cNvSpPr>
+            <a:spLocks noGrp="1"/>
+          </p:cNvSpPr>
+          <p:nvPr>
+            <p:ph type="body" idx="1"/>
+          </p:nvPr>
+        </p:nvSpPr>
+        <p:spPr/>
+        <p:txBody>
+          <a:bodyPr/>
+          <a:lstStyle/>
+          <a:p>
+            <a:r>
+              <a:rPr lang="en-GB" dirty="0" smtClean="0"/>
+              <a:t>Intel Xeon Phi is only platform we’ve come across that doesn’t support images</a:t>
+            </a:r>
+          </a:p>
+          <a:p>
+            <a:r>
+              <a:rPr lang="en-GB" dirty="0" smtClean="0"/>
+              <a:t>As well as being faster on many devices, also more convenient</a:t>
+            </a:r>
+            <a:r>
+              <a:rPr lang="en-GB" baseline="0" dirty="0" smtClean="0"/>
+              <a:t> (bounds checking, normalization, interpolation)</a:t>
+            </a:r>
+            <a:endParaRPr lang="en-GB" dirty="0"/>
+          </a:p>
+        </p:txBody>
+      </p:sp>
+      <p:sp>
+        <p:nvSpPr>
+          <p:cNvPr id="4" name="Slide Number Placeholder 3"/>
+          <p:cNvSpPr>
+            <a:spLocks noGrp="1"/>
+          </p:cNvSpPr>
+          <p:nvPr>
+            <p:ph type="sldNum" sz="quarter" idx="10"/>
+          </p:nvPr>
+        </p:nvSpPr>
+        <p:spPr/>
+        <p:txBody>
+          <a:bodyPr/>
+          <a:lstStyle/>
+          <a:p>
+            <a:fld id="{09586968-7D7C-644F-B08A-4E148D7B3FC9}" type="slidenum">
+              <a:rPr lang="en-GB" smtClean="0"/>
+              <a:t>74</a:t>
+            </a:fld>
+            <a:endParaRPr lang="en-GB"/>
+          </a:p>
+        </p:txBody>
+      </p:sp>
+    </p:spTree>
+    <p:extLst>
+      <p:ext uri="{BB962C8B-B14F-4D97-AF65-F5344CB8AC3E}">
+        <p14:creationId xmlns:p14="http://schemas.microsoft.com/office/powerpoint/2010/main" val="1455476205"/>
       </p:ext>
     </p:extLst>
   </p:cSld>
@@ -1442,6 +1741,437 @@
     <p:extLst>
       <p:ext uri="{BB962C8B-B14F-4D97-AF65-F5344CB8AC3E}">
         <p14:creationId xmlns:p14="http://schemas.microsoft.com/office/powerpoint/2010/main" val="2474384275"/>
+      </p:ext>
+    </p:extLst>
+  </p:cSld>
+  <p:clrMapOvr>
+    <a:masterClrMapping/>
+  </p:clrMapOvr>
+</p:notes>
+</file>
+
+<file path=ppt/notesSlides/notesSlide20.xml><?xml version="1.0" encoding="utf-8"?>
+<p:notes xmlns:a="http://schemas.openxmlformats.org/drawingml/2006/main" xmlns:r="http://schemas.openxmlformats.org/officeDocument/2006/relationships" xmlns:p="http://schemas.openxmlformats.org/presentationml/2006/main">
+  <p:cSld>
+    <p:spTree>
+      <p:nvGrpSpPr>
+        <p:cNvPr id="1" name=""/>
+        <p:cNvGrpSpPr/>
+        <p:nvPr/>
+      </p:nvGrpSpPr>
+      <p:grpSpPr>
+        <a:xfrm>
+          <a:off x="0" y="0"/>
+          <a:ext cx="0" cy="0"/>
+          <a:chOff x="0" y="0"/>
+          <a:chExt cx="0" cy="0"/>
+        </a:xfrm>
+      </p:grpSpPr>
+      <p:sp>
+        <p:nvSpPr>
+          <p:cNvPr id="2" name="Slide Image Placeholder 1"/>
+          <p:cNvSpPr>
+            <a:spLocks noGrp="1" noRot="1" noChangeAspect="1"/>
+          </p:cNvSpPr>
+          <p:nvPr>
+            <p:ph type="sldImg"/>
+          </p:nvPr>
+        </p:nvSpPr>
+        <p:spPr/>
+      </p:sp>
+      <p:sp>
+        <p:nvSpPr>
+          <p:cNvPr id="3" name="Notes Placeholder 2"/>
+          <p:cNvSpPr>
+            <a:spLocks noGrp="1"/>
+          </p:cNvSpPr>
+          <p:nvPr>
+            <p:ph type="body" idx="1"/>
+          </p:nvPr>
+        </p:nvSpPr>
+        <p:spPr/>
+        <p:txBody>
+          <a:bodyPr/>
+          <a:lstStyle/>
+          <a:p>
+            <a:r>
+              <a:rPr lang="en-GB" dirty="0" smtClean="0"/>
+              <a:t>OpenCL</a:t>
+            </a:r>
+            <a:r>
+              <a:rPr lang="en-GB" baseline="0" dirty="0" smtClean="0"/>
+              <a:t> 1.2 introduced 1D images as well</a:t>
+            </a:r>
+            <a:endParaRPr lang="en-GB" dirty="0"/>
+          </a:p>
+        </p:txBody>
+      </p:sp>
+      <p:sp>
+        <p:nvSpPr>
+          <p:cNvPr id="4" name="Slide Number Placeholder 3"/>
+          <p:cNvSpPr>
+            <a:spLocks noGrp="1"/>
+          </p:cNvSpPr>
+          <p:nvPr>
+            <p:ph type="sldNum" sz="quarter" idx="10"/>
+          </p:nvPr>
+        </p:nvSpPr>
+        <p:spPr/>
+        <p:txBody>
+          <a:bodyPr/>
+          <a:lstStyle/>
+          <a:p>
+            <a:fld id="{09586968-7D7C-644F-B08A-4E148D7B3FC9}" type="slidenum">
+              <a:rPr lang="en-GB" smtClean="0"/>
+              <a:t>75</a:t>
+            </a:fld>
+            <a:endParaRPr lang="en-GB"/>
+          </a:p>
+        </p:txBody>
+      </p:sp>
+    </p:spTree>
+    <p:extLst>
+      <p:ext uri="{BB962C8B-B14F-4D97-AF65-F5344CB8AC3E}">
+        <p14:creationId xmlns:p14="http://schemas.microsoft.com/office/powerpoint/2010/main" val="1548980618"/>
+      </p:ext>
+    </p:extLst>
+  </p:cSld>
+  <p:clrMapOvr>
+    <a:masterClrMapping/>
+  </p:clrMapOvr>
+</p:notes>
+</file>
+
+<file path=ppt/notesSlides/notesSlide21.xml><?xml version="1.0" encoding="utf-8"?>
+<p:notes xmlns:a="http://schemas.openxmlformats.org/drawingml/2006/main" xmlns:r="http://schemas.openxmlformats.org/officeDocument/2006/relationships" xmlns:p="http://schemas.openxmlformats.org/presentationml/2006/main">
+  <p:cSld>
+    <p:spTree>
+      <p:nvGrpSpPr>
+        <p:cNvPr id="1" name=""/>
+        <p:cNvGrpSpPr/>
+        <p:nvPr/>
+      </p:nvGrpSpPr>
+      <p:grpSpPr>
+        <a:xfrm>
+          <a:off x="0" y="0"/>
+          <a:ext cx="0" cy="0"/>
+          <a:chOff x="0" y="0"/>
+          <a:chExt cx="0" cy="0"/>
+        </a:xfrm>
+      </p:grpSpPr>
+      <p:sp>
+        <p:nvSpPr>
+          <p:cNvPr id="2" name="Slide Image Placeholder 1"/>
+          <p:cNvSpPr>
+            <a:spLocks noGrp="1" noRot="1" noChangeAspect="1"/>
+          </p:cNvSpPr>
+          <p:nvPr>
+            <p:ph type="sldImg"/>
+          </p:nvPr>
+        </p:nvSpPr>
+        <p:spPr/>
+      </p:sp>
+      <p:sp>
+        <p:nvSpPr>
+          <p:cNvPr id="3" name="Notes Placeholder 2"/>
+          <p:cNvSpPr>
+            <a:spLocks noGrp="1"/>
+          </p:cNvSpPr>
+          <p:nvPr>
+            <p:ph type="body" idx="1"/>
+          </p:nvPr>
+        </p:nvSpPr>
+        <p:spPr/>
+        <p:txBody>
+          <a:bodyPr/>
+          <a:lstStyle/>
+          <a:p>
+            <a:r>
+              <a:rPr lang="en-GB" dirty="0" smtClean="0"/>
+              <a:t>Not all combinations of</a:t>
+            </a:r>
+            <a:r>
+              <a:rPr lang="en-GB" baseline="0" dirty="0" smtClean="0"/>
+              <a:t> data-type/channel order are valid (see table in spec)</a:t>
+            </a:r>
+          </a:p>
+          <a:p>
+            <a:r>
+              <a:rPr lang="en-GB" baseline="0" dirty="0" smtClean="0"/>
+              <a:t>Min requirement is for CL_RGBA with the UNORM, SIGNED, UNSIGNED and *_FLOAT types, and CL_BGRA with CL_UNORM_INT8</a:t>
+            </a:r>
+          </a:p>
+          <a:p>
+            <a:r>
+              <a:rPr lang="en-GB" baseline="0" dirty="0" smtClean="0"/>
+              <a:t>CL_*x variants affect border </a:t>
+            </a:r>
+            <a:r>
+              <a:rPr lang="en-GB" baseline="0" dirty="0" err="1" smtClean="0"/>
+              <a:t>color</a:t>
+            </a:r>
+            <a:r>
+              <a:rPr lang="en-GB" baseline="0" dirty="0" smtClean="0"/>
+              <a:t> when clamping out-of-range </a:t>
+            </a:r>
+            <a:r>
+              <a:rPr lang="en-GB" baseline="0" dirty="0" err="1" smtClean="0"/>
+              <a:t>coords</a:t>
+            </a:r>
+            <a:r>
+              <a:rPr lang="en-GB" baseline="0" dirty="0" smtClean="0"/>
+              <a:t> – x means alpha is 0, otherwise 1</a:t>
+            </a:r>
+          </a:p>
+          <a:p>
+            <a:r>
+              <a:rPr lang="en-GB" baseline="0" dirty="0" smtClean="0"/>
+              <a:t>INTENSITY </a:t>
+            </a:r>
+            <a:r>
+              <a:rPr lang="en-GB" baseline="0" dirty="0" err="1" smtClean="0"/>
+              <a:t>vs</a:t>
+            </a:r>
+            <a:r>
+              <a:rPr lang="en-GB" baseline="0" dirty="0" smtClean="0"/>
+              <a:t> LUMINANCE – also affects border </a:t>
+            </a:r>
+            <a:r>
+              <a:rPr lang="en-GB" baseline="0" dirty="0" err="1" smtClean="0"/>
+              <a:t>color</a:t>
+            </a:r>
+            <a:r>
+              <a:rPr lang="en-GB" baseline="0" dirty="0" smtClean="0"/>
+              <a:t> (INTENSITY means alpha is 0, otherwise 1)</a:t>
+            </a:r>
+          </a:p>
+          <a:p>
+            <a:endParaRPr lang="en-GB" dirty="0"/>
+          </a:p>
+        </p:txBody>
+      </p:sp>
+      <p:sp>
+        <p:nvSpPr>
+          <p:cNvPr id="4" name="Slide Number Placeholder 3"/>
+          <p:cNvSpPr>
+            <a:spLocks noGrp="1"/>
+          </p:cNvSpPr>
+          <p:nvPr>
+            <p:ph type="sldNum" sz="quarter" idx="10"/>
+          </p:nvPr>
+        </p:nvSpPr>
+        <p:spPr/>
+        <p:txBody>
+          <a:bodyPr/>
+          <a:lstStyle/>
+          <a:p>
+            <a:fld id="{09586968-7D7C-644F-B08A-4E148D7B3FC9}" type="slidenum">
+              <a:rPr lang="en-GB" smtClean="0"/>
+              <a:t>77</a:t>
+            </a:fld>
+            <a:endParaRPr lang="en-GB"/>
+          </a:p>
+        </p:txBody>
+      </p:sp>
+    </p:spTree>
+    <p:extLst>
+      <p:ext uri="{BB962C8B-B14F-4D97-AF65-F5344CB8AC3E}">
+        <p14:creationId xmlns:p14="http://schemas.microsoft.com/office/powerpoint/2010/main" val="1497800764"/>
+      </p:ext>
+    </p:extLst>
+  </p:cSld>
+  <p:clrMapOvr>
+    <a:masterClrMapping/>
+  </p:clrMapOvr>
+</p:notes>
+</file>
+
+<file path=ppt/notesSlides/notesSlide22.xml><?xml version="1.0" encoding="utf-8"?>
+<p:notes xmlns:a="http://schemas.openxmlformats.org/drawingml/2006/main" xmlns:r="http://schemas.openxmlformats.org/officeDocument/2006/relationships" xmlns:p="http://schemas.openxmlformats.org/presentationml/2006/main">
+  <p:cSld>
+    <p:spTree>
+      <p:nvGrpSpPr>
+        <p:cNvPr id="1" name=""/>
+        <p:cNvGrpSpPr/>
+        <p:nvPr/>
+      </p:nvGrpSpPr>
+      <p:grpSpPr>
+        <a:xfrm>
+          <a:off x="0" y="0"/>
+          <a:ext cx="0" cy="0"/>
+          <a:chOff x="0" y="0"/>
+          <a:chExt cx="0" cy="0"/>
+        </a:xfrm>
+      </p:grpSpPr>
+      <p:sp>
+        <p:nvSpPr>
+          <p:cNvPr id="2" name="Slide Image Placeholder 1"/>
+          <p:cNvSpPr>
+            <a:spLocks noGrp="1" noRot="1" noChangeAspect="1"/>
+          </p:cNvSpPr>
+          <p:nvPr>
+            <p:ph type="sldImg"/>
+          </p:nvPr>
+        </p:nvSpPr>
+        <p:spPr/>
+      </p:sp>
+      <p:sp>
+        <p:nvSpPr>
+          <p:cNvPr id="3" name="Notes Placeholder 2"/>
+          <p:cNvSpPr>
+            <a:spLocks noGrp="1"/>
+          </p:cNvSpPr>
+          <p:nvPr>
+            <p:ph type="body" idx="1"/>
+          </p:nvPr>
+        </p:nvSpPr>
+        <p:spPr/>
+        <p:txBody>
+          <a:bodyPr/>
+          <a:lstStyle/>
+          <a:p>
+            <a:r>
+              <a:rPr lang="en-GB" dirty="0" smtClean="0"/>
+              <a:t>OpenCL 2.0 introduced </a:t>
+            </a:r>
+            <a:r>
+              <a:rPr lang="en-GB" b="1" dirty="0" err="1" smtClean="0">
+                <a:latin typeface="Courier New"/>
+                <a:cs typeface="Courier New"/>
+              </a:rPr>
+              <a:t>read_write</a:t>
+            </a:r>
+            <a:r>
+              <a:rPr lang="en-GB" dirty="0" smtClean="0"/>
+              <a:t> attribute for images</a:t>
+            </a:r>
+            <a:endParaRPr lang="en-GB" dirty="0"/>
+          </a:p>
+        </p:txBody>
+      </p:sp>
+      <p:sp>
+        <p:nvSpPr>
+          <p:cNvPr id="4" name="Slide Number Placeholder 3"/>
+          <p:cNvSpPr>
+            <a:spLocks noGrp="1"/>
+          </p:cNvSpPr>
+          <p:nvPr>
+            <p:ph type="sldNum" sz="quarter" idx="10"/>
+          </p:nvPr>
+        </p:nvSpPr>
+        <p:spPr/>
+        <p:txBody>
+          <a:bodyPr/>
+          <a:lstStyle/>
+          <a:p>
+            <a:fld id="{09586968-7D7C-644F-B08A-4E148D7B3FC9}" type="slidenum">
+              <a:rPr lang="en-GB" smtClean="0"/>
+              <a:t>78</a:t>
+            </a:fld>
+            <a:endParaRPr lang="en-GB"/>
+          </a:p>
+        </p:txBody>
+      </p:sp>
+    </p:spTree>
+    <p:extLst>
+      <p:ext uri="{BB962C8B-B14F-4D97-AF65-F5344CB8AC3E}">
+        <p14:creationId xmlns:p14="http://schemas.microsoft.com/office/powerpoint/2010/main" val="399853659"/>
+      </p:ext>
+    </p:extLst>
+  </p:cSld>
+  <p:clrMapOvr>
+    <a:masterClrMapping/>
+  </p:clrMapOvr>
+</p:notes>
+</file>
+
+<file path=ppt/notesSlides/notesSlide23.xml><?xml version="1.0" encoding="utf-8"?>
+<p:notes xmlns:a="http://schemas.openxmlformats.org/drawingml/2006/main" xmlns:r="http://schemas.openxmlformats.org/officeDocument/2006/relationships" xmlns:p="http://schemas.openxmlformats.org/presentationml/2006/main">
+  <p:cSld>
+    <p:spTree>
+      <p:nvGrpSpPr>
+        <p:cNvPr id="1" name=""/>
+        <p:cNvGrpSpPr/>
+        <p:nvPr/>
+      </p:nvGrpSpPr>
+      <p:grpSpPr>
+        <a:xfrm>
+          <a:off x="0" y="0"/>
+          <a:ext cx="0" cy="0"/>
+          <a:chOff x="0" y="0"/>
+          <a:chExt cx="0" cy="0"/>
+        </a:xfrm>
+      </p:grpSpPr>
+      <p:sp>
+        <p:nvSpPr>
+          <p:cNvPr id="2" name="Slide Image Placeholder 1"/>
+          <p:cNvSpPr>
+            <a:spLocks noGrp="1" noRot="1" noChangeAspect="1"/>
+          </p:cNvSpPr>
+          <p:nvPr>
+            <p:ph type="sldImg"/>
+          </p:nvPr>
+        </p:nvSpPr>
+        <p:spPr/>
+      </p:sp>
+      <p:sp>
+        <p:nvSpPr>
+          <p:cNvPr id="3" name="Notes Placeholder 2"/>
+          <p:cNvSpPr>
+            <a:spLocks noGrp="1"/>
+          </p:cNvSpPr>
+          <p:nvPr>
+            <p:ph type="body" idx="1"/>
+          </p:nvPr>
+        </p:nvSpPr>
+        <p:spPr/>
+        <p:txBody>
+          <a:bodyPr/>
+          <a:lstStyle/>
+          <a:p>
+            <a:r>
+              <a:rPr lang="en-GB" dirty="0" smtClean="0"/>
+              <a:t>Declaring the </a:t>
+            </a:r>
+            <a:r>
+              <a:rPr lang="en-GB" dirty="0" smtClean="0"/>
+              <a:t>sampler </a:t>
+            </a:r>
+            <a:r>
+              <a:rPr lang="en-GB" dirty="0" smtClean="0"/>
+              <a:t>inside the OpenCL program may be faster – compiler can optimize</a:t>
+            </a:r>
+            <a:endParaRPr lang="en-GB" dirty="0"/>
+          </a:p>
+        </p:txBody>
+      </p:sp>
+      <p:sp>
+        <p:nvSpPr>
+          <p:cNvPr id="4" name="Slide Number Placeholder 3"/>
+          <p:cNvSpPr>
+            <a:spLocks noGrp="1"/>
+          </p:cNvSpPr>
+          <p:nvPr>
+            <p:ph type="sldNum" sz="quarter" idx="10"/>
+          </p:nvPr>
+        </p:nvSpPr>
+        <p:spPr/>
+        <p:txBody>
+          <a:bodyPr/>
+          <a:lstStyle/>
+          <a:p>
+            <a:fld id="{09586968-7D7C-644F-B08A-4E148D7B3FC9}" type="slidenum">
+              <a:rPr lang="en-GB" smtClean="0"/>
+              <a:t>79</a:t>
+            </a:fld>
+            <a:endParaRPr lang="en-GB"/>
+          </a:p>
+        </p:txBody>
+      </p:sp>
+    </p:spTree>
+    <p:extLst>
+      <p:ext uri="{BB962C8B-B14F-4D97-AF65-F5344CB8AC3E}">
+        <p14:creationId xmlns:p14="http://schemas.microsoft.com/office/powerpoint/2010/main" val="400922365"/>
       </p:ext>
     </p:extLst>
   </p:cSld>
@@ -2125,16 +2855,18 @@
           <a:lstStyle/>
           <a:p>
             <a:r>
+              <a:rPr lang="en-GB" dirty="0" smtClean="0"/>
+              <a:t>Can query the maximum size of a constant memory allocation</a:t>
+            </a:r>
+            <a:r>
               <a:rPr lang="en-GB" baseline="0" dirty="0" smtClean="0"/>
-              <a:t>Work group sizes – maybe obvious. Mention </a:t>
-            </a:r>
-            <a:r>
-              <a:rPr lang="en-GB" baseline="0" dirty="0" err="1" smtClean="0"/>
-              <a:t>opencl</a:t>
-            </a:r>
+              <a:t> with CL_DEVICE_MAX_CONSTANT_BUFFER_SIZE</a:t>
+            </a:r>
+          </a:p>
+          <a:p>
             <a:r>
               <a:rPr lang="en-GB" baseline="0" dirty="0" smtClean="0"/>
-              <a:t> 2 padded work group sizes, which will allocate remainder box sizes.</a:t>
+              <a:t>Limited number of constant memory arguments per kernel – CL_DEVICE_MAX_CONSTANT_ARGS</a:t>
             </a:r>
             <a:endParaRPr lang="en-GB" dirty="0"/>
           </a:p>
@@ -2155,10 +2887,9 @@
           <a:bodyPr/>
           <a:lstStyle/>
           <a:p>
-            <a:fld id="{9B3F2D69-97A9-4C41-91BD-6A22F8270148}" type="slidenum">
+            <a:fld id="{09586968-7D7C-644F-B08A-4E148D7B3FC9}" type="slidenum">
               <a:rPr lang="en-GB" smtClean="0"/>
-              <a:pPr/>
-              <a:t>56</a:t>
+              <a:t>55</a:t>
             </a:fld>
             <a:endParaRPr lang="en-GB"/>
           </a:p>
@@ -2167,7 +2898,7 @@
     </p:spTree>
     <p:extLst>
       <p:ext uri="{BB962C8B-B14F-4D97-AF65-F5344CB8AC3E}">
-        <p14:creationId xmlns:p14="http://schemas.microsoft.com/office/powerpoint/2010/main" val="459045051"/>
+        <p14:creationId xmlns:p14="http://schemas.microsoft.com/office/powerpoint/2010/main" val="793593648"/>
       </p:ext>
     </p:extLst>
   </p:cSld>
@@ -2223,24 +2954,15 @@
           <a:p>
             <a:r>
               <a:rPr lang="en-GB" baseline="0" dirty="0" smtClean="0"/>
-              <a:t>Results from our 2D lattice Boltzmann code, results from the ISC paper.</a:t>
-            </a:r>
-          </a:p>
-          <a:p>
-            <a:endParaRPr lang="en-GB" baseline="0" dirty="0" smtClean="0"/>
-          </a:p>
-          <a:p>
+              <a:t>Work group sizes – maybe obvious. Mention </a:t>
+            </a:r>
+            <a:r>
+              <a:rPr lang="en-GB" baseline="0" dirty="0" err="1" smtClean="0"/>
+              <a:t>opencl</a:t>
+            </a:r>
             <a:r>
               <a:rPr lang="en-GB" baseline="0" dirty="0" smtClean="0"/>
-              <a:t>Top left is AMD, top right is </a:t>
-            </a:r>
-            <a:r>
-              <a:rPr lang="en-GB" baseline="0" dirty="0" err="1" smtClean="0"/>
-              <a:t>Nvidia</a:t>
-            </a:r>
-            <a:r>
-              <a:rPr lang="en-GB" baseline="0" dirty="0" smtClean="0"/>
-              <a:t>, bottom is Intel CPU.</a:t>
+              <a:t> 2 padded work group sizes, which will allocate remainder box sizes.</a:t>
             </a:r>
             <a:endParaRPr lang="en-GB" dirty="0"/>
           </a:p>
@@ -2264,7 +2986,7 @@
             <a:fld id="{9B3F2D69-97A9-4C41-91BD-6A22F8270148}" type="slidenum">
               <a:rPr lang="en-GB" smtClean="0"/>
               <a:pPr/>
-              <a:t>57</a:t>
+              <a:t>56</a:t>
             </a:fld>
             <a:endParaRPr lang="en-GB"/>
           </a:p>
@@ -2273,7 +2995,7 @@
     </p:spTree>
     <p:extLst>
       <p:ext uri="{BB962C8B-B14F-4D97-AF65-F5344CB8AC3E}">
-        <p14:creationId xmlns:p14="http://schemas.microsoft.com/office/powerpoint/2010/main" val="1332754836"/>
+        <p14:creationId xmlns:p14="http://schemas.microsoft.com/office/powerpoint/2010/main" val="459045051"/>
       </p:ext>
     </p:extLst>
   </p:cSld>
@@ -2328,26 +3050,25 @@
           <a:lstStyle/>
           <a:p>
             <a:r>
-              <a:rPr lang="en-GB" dirty="0" smtClean="0"/>
-              <a:t>Barriers between code for better cache use </a:t>
-            </a:r>
-            <a:r>
-              <a:rPr lang="en-GB" dirty="0" err="1" smtClean="0"/>
-              <a:t>etc</a:t>
-            </a:r>
-            <a:endParaRPr lang="en-GB" dirty="0" smtClean="0"/>
-          </a:p>
-          <a:p>
-            <a:endParaRPr lang="en-GB" dirty="0" smtClean="0"/>
-          </a:p>
-          <a:p>
-            <a:r>
-              <a:rPr lang="en-GB" dirty="0" smtClean="0"/>
-              <a:t>Architecture dependent, may not always</a:t>
-            </a:r>
-            <a:r>
               <a:rPr lang="en-GB" baseline="0" dirty="0" smtClean="0"/>
-              <a:t> be useful</a:t>
+              <a:t>Results from our 2D lattice Boltzmann code, results from the ISC paper.</a:t>
+            </a:r>
+          </a:p>
+          <a:p>
+            <a:endParaRPr lang="en-GB" baseline="0" dirty="0" smtClean="0"/>
+          </a:p>
+          <a:p>
+            <a:r>
+              <a:rPr lang="en-GB" baseline="0" dirty="0" smtClean="0"/>
+              <a:t>Top left is AMD, top right is </a:t>
+            </a:r>
+            <a:r>
+              <a:rPr lang="en-GB" baseline="0" dirty="0" err="1" smtClean="0"/>
+              <a:t>Nvidia</a:t>
+            </a:r>
+            <a:r>
+              <a:rPr lang="en-GB" baseline="0" dirty="0" smtClean="0"/>
+              <a:t>, bottom is Intel CPU.</a:t>
             </a:r>
             <a:endParaRPr lang="en-GB" dirty="0"/>
           </a:p>
@@ -2371,7 +3092,7 @@
             <a:fld id="{9B3F2D69-97A9-4C41-91BD-6A22F8270148}" type="slidenum">
               <a:rPr lang="en-GB" smtClean="0"/>
               <a:pPr/>
-              <a:t>63</a:t>
+              <a:t>57</a:t>
             </a:fld>
             <a:endParaRPr lang="en-GB"/>
           </a:p>
@@ -2380,7 +3101,7 @@
     </p:spTree>
     <p:extLst>
       <p:ext uri="{BB962C8B-B14F-4D97-AF65-F5344CB8AC3E}">
-        <p14:creationId xmlns:p14="http://schemas.microsoft.com/office/powerpoint/2010/main" val="80389277"/>
+        <p14:creationId xmlns:p14="http://schemas.microsoft.com/office/powerpoint/2010/main" val="1332754836"/>
       </p:ext>
     </p:extLst>
   </p:cSld>
@@ -5652,11 +6373,11 @@
   <p:clrMapOvr>
     <a:masterClrMapping/>
   </p:clrMapOvr>
-  <mc:AlternateContent xmlns:mc="http://schemas.openxmlformats.org/markup-compatibility/2006">
-    <mc:Choice xmlns:p14="http://schemas.microsoft.com/office/powerpoint/2010/main" Requires="p14">
+  <mc:AlternateContent xmlns:mc="http://schemas.openxmlformats.org/markup-compatibility/2006" xmlns:p14="http://schemas.microsoft.com/office/powerpoint/2010/main">
+    <mc:Choice Requires="p14">
       <p:transition spd="slow" p14:dur="2000"/>
     </mc:Choice>
-    <mc:Fallback>
+    <mc:Fallback xmlns="">
       <p:transition xmlns:p14="http://schemas.microsoft.com/office/powerpoint/2010/main" spd="slow"/>
     </mc:Fallback>
   </mc:AlternateContent>
@@ -5953,11 +6674,11 @@
   <p:clrMapOvr>
     <a:masterClrMapping/>
   </p:clrMapOvr>
-  <mc:AlternateContent xmlns:mc="http://schemas.openxmlformats.org/markup-compatibility/2006">
-    <mc:Choice xmlns:p14="http://schemas.microsoft.com/office/powerpoint/2010/main" Requires="p14">
+  <mc:AlternateContent xmlns:mc="http://schemas.openxmlformats.org/markup-compatibility/2006" xmlns:p14="http://schemas.microsoft.com/office/powerpoint/2010/main">
+    <mc:Choice Requires="p14">
       <p:transition spd="slow" p14:dur="2000"/>
     </mc:Choice>
-    <mc:Fallback>
+    <mc:Fallback xmlns="">
       <p:transition xmlns:p14="http://schemas.microsoft.com/office/powerpoint/2010/main" spd="slow"/>
     </mc:Fallback>
   </mc:AlternateContent>
@@ -6079,11 +6800,11 @@
   <p:clrMapOvr>
     <a:masterClrMapping/>
   </p:clrMapOvr>
-  <mc:AlternateContent xmlns:mc="http://schemas.openxmlformats.org/markup-compatibility/2006">
-    <mc:Choice xmlns:p14="http://schemas.microsoft.com/office/powerpoint/2010/main" Requires="p14">
+  <mc:AlternateContent xmlns:mc="http://schemas.openxmlformats.org/markup-compatibility/2006" xmlns:p14="http://schemas.microsoft.com/office/powerpoint/2010/main">
+    <mc:Choice Requires="p14">
       <p:transition spd="slow" p14:dur="2000"/>
     </mc:Choice>
-    <mc:Fallback>
+    <mc:Fallback xmlns="">
       <p:transition xmlns:p14="http://schemas.microsoft.com/office/powerpoint/2010/main" spd="slow"/>
     </mc:Fallback>
   </mc:AlternateContent>
@@ -6238,11 +6959,11 @@
   <p:clrMapOvr>
     <a:masterClrMapping/>
   </p:clrMapOvr>
-  <mc:AlternateContent xmlns:mc="http://schemas.openxmlformats.org/markup-compatibility/2006">
-    <mc:Choice xmlns:p14="http://schemas.microsoft.com/office/powerpoint/2010/main" Requires="p14">
+  <mc:AlternateContent xmlns:mc="http://schemas.openxmlformats.org/markup-compatibility/2006" xmlns:p14="http://schemas.microsoft.com/office/powerpoint/2010/main">
+    <mc:Choice Requires="p14">
       <p:transition spd="slow" p14:dur="2000"/>
     </mc:Choice>
-    <mc:Fallback>
+    <mc:Fallback xmlns="">
       <p:transition xmlns:p14="http://schemas.microsoft.com/office/powerpoint/2010/main" spd="slow"/>
     </mc:Fallback>
   </mc:AlternateContent>
@@ -6350,11 +7071,11 @@
   <p:clrMapOvr>
     <a:masterClrMapping/>
   </p:clrMapOvr>
-  <mc:AlternateContent xmlns:mc="http://schemas.openxmlformats.org/markup-compatibility/2006">
-    <mc:Choice xmlns:p14="http://schemas.microsoft.com/office/powerpoint/2010/main" Requires="p14">
+  <mc:AlternateContent xmlns:mc="http://schemas.openxmlformats.org/markup-compatibility/2006" xmlns:p14="http://schemas.microsoft.com/office/powerpoint/2010/main">
+    <mc:Choice Requires="p14">
       <p:transition spd="slow" p14:dur="2000"/>
     </mc:Choice>
-    <mc:Fallback>
+    <mc:Fallback xmlns="">
       <p:transition xmlns:p14="http://schemas.microsoft.com/office/powerpoint/2010/main" spd="slow"/>
     </mc:Fallback>
   </mc:AlternateContent>
@@ -7113,11 +7834,11 @@
   <p:clrMapOvr>
     <a:masterClrMapping/>
   </p:clrMapOvr>
-  <mc:AlternateContent xmlns:mc="http://schemas.openxmlformats.org/markup-compatibility/2006">
-    <mc:Choice xmlns:p14="http://schemas.microsoft.com/office/powerpoint/2010/main" Requires="p14">
+  <mc:AlternateContent xmlns:mc="http://schemas.openxmlformats.org/markup-compatibility/2006" xmlns:p14="http://schemas.microsoft.com/office/powerpoint/2010/main">
+    <mc:Choice Requires="p14">
       <p:transition spd="slow" p14:dur="2000"/>
     </mc:Choice>
-    <mc:Fallback>
+    <mc:Fallback xmlns="">
       <p:transition xmlns:p14="http://schemas.microsoft.com/office/powerpoint/2010/main" spd="slow"/>
     </mc:Fallback>
   </mc:AlternateContent>
@@ -7395,11 +8116,11 @@
   <p:clrMapOvr>
     <a:masterClrMapping/>
   </p:clrMapOvr>
-  <mc:AlternateContent xmlns:mc="http://schemas.openxmlformats.org/markup-compatibility/2006">
-    <mc:Choice xmlns:p14="http://schemas.microsoft.com/office/powerpoint/2010/main" Requires="p14">
+  <mc:AlternateContent xmlns:mc="http://schemas.openxmlformats.org/markup-compatibility/2006" xmlns:p14="http://schemas.microsoft.com/office/powerpoint/2010/main">
+    <mc:Choice Requires="p14">
       <p:transition spd="slow" p14:dur="2000"/>
     </mc:Choice>
-    <mc:Fallback>
+    <mc:Fallback xmlns="">
       <p:transition xmlns:p14="http://schemas.microsoft.com/office/powerpoint/2010/main" spd="slow"/>
     </mc:Fallback>
   </mc:AlternateContent>
@@ -7547,11 +8268,11 @@
   <p:clrMapOvr>
     <a:masterClrMapping/>
   </p:clrMapOvr>
-  <mc:AlternateContent xmlns:mc="http://schemas.openxmlformats.org/markup-compatibility/2006">
-    <mc:Choice xmlns:p14="http://schemas.microsoft.com/office/powerpoint/2010/main" Requires="p14">
+  <mc:AlternateContent xmlns:mc="http://schemas.openxmlformats.org/markup-compatibility/2006" xmlns:p14="http://schemas.microsoft.com/office/powerpoint/2010/main">
+    <mc:Choice Requires="p14">
       <p:transition spd="slow" p14:dur="2000"/>
     </mc:Choice>
-    <mc:Fallback>
+    <mc:Fallback xmlns="">
       <p:transition xmlns:p14="http://schemas.microsoft.com/office/powerpoint/2010/main" spd="slow"/>
     </mc:Fallback>
   </mc:AlternateContent>
@@ -7705,11 +8426,11 @@
   <p:clrMapOvr>
     <a:masterClrMapping/>
   </p:clrMapOvr>
-  <mc:AlternateContent xmlns:mc="http://schemas.openxmlformats.org/markup-compatibility/2006">
-    <mc:Choice xmlns:p14="http://schemas.microsoft.com/office/powerpoint/2010/main" Requires="p14">
+  <mc:AlternateContent xmlns:mc="http://schemas.openxmlformats.org/markup-compatibility/2006" xmlns:p14="http://schemas.microsoft.com/office/powerpoint/2010/main">
+    <mc:Choice Requires="p14">
       <p:transition spd="slow" p14:dur="2000"/>
     </mc:Choice>
-    <mc:Fallback>
+    <mc:Fallback xmlns="">
       <p:transition xmlns:p14="http://schemas.microsoft.com/office/powerpoint/2010/main" spd="slow"/>
     </mc:Fallback>
   </mc:AlternateContent>
@@ -8255,11 +8976,11 @@
   <p:clrMapOvr>
     <a:masterClrMapping/>
   </p:clrMapOvr>
-  <mc:AlternateContent xmlns:mc="http://schemas.openxmlformats.org/markup-compatibility/2006">
-    <mc:Choice xmlns:p14="http://schemas.microsoft.com/office/powerpoint/2010/main" Requires="p14">
+  <mc:AlternateContent xmlns:mc="http://schemas.openxmlformats.org/markup-compatibility/2006" xmlns:p14="http://schemas.microsoft.com/office/powerpoint/2010/main">
+    <mc:Choice Requires="p14">
       <p:transition spd="slow" p14:dur="2000"/>
     </mc:Choice>
-    <mc:Fallback>
+    <mc:Fallback xmlns="">
       <p:transition xmlns:p14="http://schemas.microsoft.com/office/powerpoint/2010/main" spd="slow"/>
     </mc:Fallback>
   </mc:AlternateContent>
@@ -8759,11 +9480,11 @@
   <p:clrMapOvr>
     <a:masterClrMapping/>
   </p:clrMapOvr>
-  <mc:AlternateContent xmlns:mc="http://schemas.openxmlformats.org/markup-compatibility/2006">
-    <mc:Choice xmlns:p14="http://schemas.microsoft.com/office/powerpoint/2010/main" Requires="p14">
+  <mc:AlternateContent xmlns:mc="http://schemas.openxmlformats.org/markup-compatibility/2006" xmlns:p14="http://schemas.microsoft.com/office/powerpoint/2010/main">
+    <mc:Choice Requires="p14">
       <p:transition spd="slow" p14:dur="2000"/>
     </mc:Choice>
-    <mc:Fallback>
+    <mc:Fallback xmlns="">
       <p:transition xmlns:p14="http://schemas.microsoft.com/office/powerpoint/2010/main" spd="slow"/>
     </mc:Fallback>
   </mc:AlternateContent>
@@ -8971,11 +9692,11 @@
   <p:clrMapOvr>
     <a:masterClrMapping/>
   </p:clrMapOvr>
-  <mc:AlternateContent xmlns:mc="http://schemas.openxmlformats.org/markup-compatibility/2006">
-    <mc:Choice xmlns:p14="http://schemas.microsoft.com/office/powerpoint/2010/main" Requires="p14">
+  <mc:AlternateContent xmlns:mc="http://schemas.openxmlformats.org/markup-compatibility/2006" xmlns:p14="http://schemas.microsoft.com/office/powerpoint/2010/main">
+    <mc:Choice Requires="p14">
       <p:transition spd="slow" p14:dur="2000"/>
     </mc:Choice>
-    <mc:Fallback>
+    <mc:Fallback xmlns="">
       <p:transition xmlns:p14="http://schemas.microsoft.com/office/powerpoint/2010/main" spd="slow"/>
     </mc:Fallback>
   </mc:AlternateContent>
@@ -9186,11 +9907,11 @@
   <p:clrMapOvr>
     <a:masterClrMapping/>
   </p:clrMapOvr>
-  <mc:AlternateContent xmlns:mc="http://schemas.openxmlformats.org/markup-compatibility/2006">
-    <mc:Choice xmlns:p14="http://schemas.microsoft.com/office/powerpoint/2010/main" Requires="p14">
+  <mc:AlternateContent xmlns:mc="http://schemas.openxmlformats.org/markup-compatibility/2006" xmlns:p14="http://schemas.microsoft.com/office/powerpoint/2010/main">
+    <mc:Choice Requires="p14">
       <p:transition spd="slow" p14:dur="2000"/>
     </mc:Choice>
-    <mc:Fallback>
+    <mc:Fallback xmlns="">
       <p:transition xmlns:p14="http://schemas.microsoft.com/office/powerpoint/2010/main" spd="slow"/>
     </mc:Fallback>
   </mc:AlternateContent>
@@ -9332,11 +10053,11 @@
   <p:clrMapOvr>
     <a:masterClrMapping/>
   </p:clrMapOvr>
-  <mc:AlternateContent xmlns:mc="http://schemas.openxmlformats.org/markup-compatibility/2006">
-    <mc:Choice xmlns:p14="http://schemas.microsoft.com/office/powerpoint/2010/main" Requires="p14">
+  <mc:AlternateContent xmlns:mc="http://schemas.openxmlformats.org/markup-compatibility/2006" xmlns:p14="http://schemas.microsoft.com/office/powerpoint/2010/main">
+    <mc:Choice Requires="p14">
       <p:transition spd="slow" p14:dur="2000"/>
     </mc:Choice>
-    <mc:Fallback>
+    <mc:Fallback xmlns="">
       <p:transition xmlns:p14="http://schemas.microsoft.com/office/powerpoint/2010/main" spd="slow"/>
     </mc:Fallback>
   </mc:AlternateContent>
@@ -9486,11 +10207,11 @@
   <p:clrMapOvr>
     <a:masterClrMapping/>
   </p:clrMapOvr>
-  <mc:AlternateContent xmlns:mc="http://schemas.openxmlformats.org/markup-compatibility/2006">
-    <mc:Choice xmlns:p14="http://schemas.microsoft.com/office/powerpoint/2010/main" Requires="p14">
+  <mc:AlternateContent xmlns:mc="http://schemas.openxmlformats.org/markup-compatibility/2006" xmlns:p14="http://schemas.microsoft.com/office/powerpoint/2010/main">
+    <mc:Choice Requires="p14">
       <p:transition spd="slow" p14:dur="2000"/>
     </mc:Choice>
-    <mc:Fallback>
+    <mc:Fallback xmlns="">
       <p:transition xmlns:p14="http://schemas.microsoft.com/office/powerpoint/2010/main" spd="slow"/>
     </mc:Fallback>
   </mc:AlternateContent>
@@ -9584,11 +10305,11 @@
   <p:clrMapOvr>
     <a:masterClrMapping/>
   </p:clrMapOvr>
-  <mc:AlternateContent xmlns:mc="http://schemas.openxmlformats.org/markup-compatibility/2006">
-    <mc:Choice xmlns:p14="http://schemas.microsoft.com/office/powerpoint/2010/main" Requires="p14">
+  <mc:AlternateContent xmlns:mc="http://schemas.openxmlformats.org/markup-compatibility/2006" xmlns:p14="http://schemas.microsoft.com/office/powerpoint/2010/main">
+    <mc:Choice Requires="p14">
       <p:transition spd="slow" p14:dur="2000"/>
     </mc:Choice>
-    <mc:Fallback>
+    <mc:Fallback xmlns="">
       <p:transition xmlns:p14="http://schemas.microsoft.com/office/powerpoint/2010/main" spd="slow"/>
     </mc:Fallback>
   </mc:AlternateContent>
@@ -9742,11 +10463,11 @@
   <p:clrMapOvr>
     <a:masterClrMapping/>
   </p:clrMapOvr>
-  <mc:AlternateContent xmlns:mc="http://schemas.openxmlformats.org/markup-compatibility/2006">
-    <mc:Choice xmlns:p14="http://schemas.microsoft.com/office/powerpoint/2010/main" Requires="p14">
+  <mc:AlternateContent xmlns:mc="http://schemas.openxmlformats.org/markup-compatibility/2006" xmlns:p14="http://schemas.microsoft.com/office/powerpoint/2010/main">
+    <mc:Choice Requires="p14">
       <p:transition spd="slow" p14:dur="2000"/>
     </mc:Choice>
-    <mc:Fallback>
+    <mc:Fallback xmlns="">
       <p:transition xmlns:p14="http://schemas.microsoft.com/office/powerpoint/2010/main" spd="slow"/>
     </mc:Fallback>
   </mc:AlternateContent>
@@ -9902,11 +10623,11 @@
   <p:clrMapOvr>
     <a:masterClrMapping/>
   </p:clrMapOvr>
-  <mc:AlternateContent xmlns:mc="http://schemas.openxmlformats.org/markup-compatibility/2006">
-    <mc:Choice xmlns:p14="http://schemas.microsoft.com/office/powerpoint/2010/main" Requires="p14">
+  <mc:AlternateContent xmlns:mc="http://schemas.openxmlformats.org/markup-compatibility/2006" xmlns:p14="http://schemas.microsoft.com/office/powerpoint/2010/main">
+    <mc:Choice Requires="p14">
       <p:transition spd="slow" p14:dur="2000"/>
     </mc:Choice>
-    <mc:Fallback>
+    <mc:Fallback xmlns="">
       <p:transition xmlns:p14="http://schemas.microsoft.com/office/powerpoint/2010/main" spd="slow"/>
     </mc:Fallback>
   </mc:AlternateContent>
@@ -10124,11 +10845,11 @@
   <p:clrMapOvr>
     <a:masterClrMapping/>
   </p:clrMapOvr>
-  <mc:AlternateContent xmlns:mc="http://schemas.openxmlformats.org/markup-compatibility/2006">
-    <mc:Choice xmlns:p14="http://schemas.microsoft.com/office/powerpoint/2010/main" Requires="p14">
+  <mc:AlternateContent xmlns:mc="http://schemas.openxmlformats.org/markup-compatibility/2006" xmlns:p14="http://schemas.microsoft.com/office/powerpoint/2010/main">
+    <mc:Choice Requires="p14">
       <p:transition spd="slow" p14:dur="2000"/>
     </mc:Choice>
-    <mc:Fallback>
+    <mc:Fallback xmlns="">
       <p:transition xmlns:p14="http://schemas.microsoft.com/office/powerpoint/2010/main" spd="slow"/>
     </mc:Fallback>
   </mc:AlternateContent>
@@ -10234,11 +10955,11 @@
   <p:clrMapOvr>
     <a:masterClrMapping/>
   </p:clrMapOvr>
-  <mc:AlternateContent xmlns:mc="http://schemas.openxmlformats.org/markup-compatibility/2006">
-    <mc:Choice xmlns:p14="http://schemas.microsoft.com/office/powerpoint/2010/main" Requires="p14">
+  <mc:AlternateContent xmlns:mc="http://schemas.openxmlformats.org/markup-compatibility/2006" xmlns:p14="http://schemas.microsoft.com/office/powerpoint/2010/main">
+    <mc:Choice Requires="p14">
       <p:transition spd="slow" p14:dur="2000"/>
     </mc:Choice>
-    <mc:Fallback>
+    <mc:Fallback xmlns="">
       <p:transition xmlns:p14="http://schemas.microsoft.com/office/powerpoint/2010/main" spd="slow"/>
     </mc:Fallback>
   </mc:AlternateContent>
@@ -11446,11 +12167,11 @@
   <p:clrMapOvr>
     <a:masterClrMapping/>
   </p:clrMapOvr>
-  <mc:AlternateContent xmlns:mc="http://schemas.openxmlformats.org/markup-compatibility/2006">
-    <mc:Choice xmlns:p14="http://schemas.microsoft.com/office/powerpoint/2010/main" Requires="p14">
+  <mc:AlternateContent xmlns:mc="http://schemas.openxmlformats.org/markup-compatibility/2006" xmlns:p14="http://schemas.microsoft.com/office/powerpoint/2010/main">
+    <mc:Choice Requires="p14">
       <p:transition spd="slow" p14:dur="2000"/>
     </mc:Choice>
-    <mc:Fallback>
+    <mc:Fallback xmlns="">
       <p:transition xmlns:p14="http://schemas.microsoft.com/office/powerpoint/2010/main" spd="slow"/>
     </mc:Fallback>
   </mc:AlternateContent>
@@ -11997,11 +12718,11 @@
   <p:clrMapOvr>
     <a:masterClrMapping/>
   </p:clrMapOvr>
-  <mc:AlternateContent xmlns:mc="http://schemas.openxmlformats.org/markup-compatibility/2006">
-    <mc:Choice xmlns:p14="http://schemas.microsoft.com/office/powerpoint/2010/main" Requires="p14">
+  <mc:AlternateContent xmlns:mc="http://schemas.openxmlformats.org/markup-compatibility/2006" xmlns:p14="http://schemas.microsoft.com/office/powerpoint/2010/main">
+    <mc:Choice Requires="p14">
       <p:transition spd="slow" p14:dur="2000"/>
     </mc:Choice>
-    <mc:Fallback>
+    <mc:Fallback xmlns="">
       <p:transition xmlns:p14="http://schemas.microsoft.com/office/powerpoint/2010/main" spd="slow"/>
     </mc:Fallback>
   </mc:AlternateContent>
@@ -12285,11 +13006,11 @@
   <p:clrMapOvr>
     <a:masterClrMapping/>
   </p:clrMapOvr>
-  <mc:AlternateContent xmlns:mc="http://schemas.openxmlformats.org/markup-compatibility/2006">
-    <mc:Choice xmlns:p14="http://schemas.microsoft.com/office/powerpoint/2010/main" Requires="p14">
+  <mc:AlternateContent xmlns:mc="http://schemas.openxmlformats.org/markup-compatibility/2006" xmlns:p14="http://schemas.microsoft.com/office/powerpoint/2010/main">
+    <mc:Choice Requires="p14">
       <p:transition spd="slow" p14:dur="2000"/>
     </mc:Choice>
-    <mc:Fallback>
+    <mc:Fallback xmlns="">
       <p:transition xmlns:p14="http://schemas.microsoft.com/office/powerpoint/2010/main" spd="slow"/>
     </mc:Fallback>
   </mc:AlternateContent>
@@ -12413,11 +13134,11 @@
   <p:clrMapOvr>
     <a:masterClrMapping/>
   </p:clrMapOvr>
-  <mc:AlternateContent xmlns:mc="http://schemas.openxmlformats.org/markup-compatibility/2006">
-    <mc:Choice xmlns:p14="http://schemas.microsoft.com/office/powerpoint/2010/main" Requires="p14">
+  <mc:AlternateContent xmlns:mc="http://schemas.openxmlformats.org/markup-compatibility/2006" xmlns:p14="http://schemas.microsoft.com/office/powerpoint/2010/main">
+    <mc:Choice Requires="p14">
       <p:transition spd="slow" p14:dur="2000"/>
     </mc:Choice>
-    <mc:Fallback>
+    <mc:Fallback xmlns="">
       <p:transition xmlns:p14="http://schemas.microsoft.com/office/powerpoint/2010/main" spd="slow"/>
     </mc:Fallback>
   </mc:AlternateContent>
@@ -12649,11 +13370,11 @@
   <p:clrMapOvr>
     <a:masterClrMapping/>
   </p:clrMapOvr>
-  <mc:AlternateContent xmlns:mc="http://schemas.openxmlformats.org/markup-compatibility/2006">
-    <mc:Choice xmlns:p14="http://schemas.microsoft.com/office/powerpoint/2010/main" Requires="p14">
+  <mc:AlternateContent xmlns:mc="http://schemas.openxmlformats.org/markup-compatibility/2006" xmlns:p14="http://schemas.microsoft.com/office/powerpoint/2010/main">
+    <mc:Choice Requires="p14">
       <p:transition spd="slow" p14:dur="2000"/>
     </mc:Choice>
-    <mc:Fallback>
+    <mc:Fallback xmlns="">
       <p:transition xmlns:p14="http://schemas.microsoft.com/office/powerpoint/2010/main" spd="slow"/>
     </mc:Fallback>
   </mc:AlternateContent>
@@ -12958,11 +13679,11 @@
   <p:clrMapOvr>
     <a:masterClrMapping/>
   </p:clrMapOvr>
-  <mc:AlternateContent xmlns:mc="http://schemas.openxmlformats.org/markup-compatibility/2006">
-    <mc:Choice xmlns:p14="http://schemas.microsoft.com/office/powerpoint/2010/main" Requires="p14">
+  <mc:AlternateContent xmlns:mc="http://schemas.openxmlformats.org/markup-compatibility/2006" xmlns:p14="http://schemas.microsoft.com/office/powerpoint/2010/main">
+    <mc:Choice Requires="p14">
       <p:transition spd="slow" p14:dur="2000"/>
     </mc:Choice>
-    <mc:Fallback>
+    <mc:Fallback xmlns="">
       <p:transition xmlns:p14="http://schemas.microsoft.com/office/powerpoint/2010/main" spd="slow"/>
     </mc:Fallback>
   </mc:AlternateContent>
@@ -13192,11 +13913,11 @@
   <p:clrMapOvr>
     <a:masterClrMapping/>
   </p:clrMapOvr>
-  <mc:AlternateContent xmlns:mc="http://schemas.openxmlformats.org/markup-compatibility/2006">
-    <mc:Choice xmlns:p14="http://schemas.microsoft.com/office/powerpoint/2010/main" Requires="p14">
+  <mc:AlternateContent xmlns:mc="http://schemas.openxmlformats.org/markup-compatibility/2006" xmlns:p14="http://schemas.microsoft.com/office/powerpoint/2010/main">
+    <mc:Choice Requires="p14">
       <p:transition spd="slow" p14:dur="2000"/>
     </mc:Choice>
-    <mc:Fallback>
+    <mc:Fallback xmlns="">
       <p:transition xmlns:p14="http://schemas.microsoft.com/office/powerpoint/2010/main" spd="slow"/>
     </mc:Fallback>
   </mc:AlternateContent>
@@ -13291,11 +14012,11 @@
   <p:clrMapOvr>
     <a:masterClrMapping/>
   </p:clrMapOvr>
-  <mc:AlternateContent xmlns:mc="http://schemas.openxmlformats.org/markup-compatibility/2006">
-    <mc:Choice xmlns:p14="http://schemas.microsoft.com/office/powerpoint/2010/main" Requires="p14">
+  <mc:AlternateContent xmlns:mc="http://schemas.openxmlformats.org/markup-compatibility/2006" xmlns:p14="http://schemas.microsoft.com/office/powerpoint/2010/main">
+    <mc:Choice Requires="p14">
       <p:transition spd="slow" p14:dur="2000"/>
     </mc:Choice>
-    <mc:Fallback>
+    <mc:Fallback xmlns="">
       <p:transition xmlns:p14="http://schemas.microsoft.com/office/powerpoint/2010/main" spd="slow"/>
     </mc:Fallback>
   </mc:AlternateContent>
@@ -13426,11 +14147,11 @@
   <p:clrMapOvr>
     <a:masterClrMapping/>
   </p:clrMapOvr>
-  <mc:AlternateContent xmlns:mc="http://schemas.openxmlformats.org/markup-compatibility/2006">
-    <mc:Choice xmlns:p14="http://schemas.microsoft.com/office/powerpoint/2010/main" Requires="p14">
+  <mc:AlternateContent xmlns:mc="http://schemas.openxmlformats.org/markup-compatibility/2006" xmlns:p14="http://schemas.microsoft.com/office/powerpoint/2010/main">
+    <mc:Choice Requires="p14">
       <p:transition spd="slow" p14:dur="2000"/>
     </mc:Choice>
-    <mc:Fallback>
+    <mc:Fallback xmlns="">
       <p:transition xmlns:p14="http://schemas.microsoft.com/office/powerpoint/2010/main" spd="slow"/>
     </mc:Fallback>
   </mc:AlternateContent>
@@ -13822,11 +14543,11 @@
   <p:clrMapOvr>
     <a:masterClrMapping/>
   </p:clrMapOvr>
-  <mc:AlternateContent xmlns:mc="http://schemas.openxmlformats.org/markup-compatibility/2006">
-    <mc:Choice xmlns:p14="http://schemas.microsoft.com/office/powerpoint/2010/main" Requires="p14">
+  <mc:AlternateContent xmlns:mc="http://schemas.openxmlformats.org/markup-compatibility/2006" xmlns:p14="http://schemas.microsoft.com/office/powerpoint/2010/main">
+    <mc:Choice Requires="p14">
       <p:transition spd="slow" p14:dur="2000"/>
     </mc:Choice>
-    <mc:Fallback>
+    <mc:Fallback xmlns="">
       <p:transition xmlns:p14="http://schemas.microsoft.com/office/powerpoint/2010/main" spd="slow"/>
     </mc:Fallback>
   </mc:AlternateContent>
@@ -13982,11 +14703,11 @@
   <p:clrMapOvr>
     <a:masterClrMapping/>
   </p:clrMapOvr>
-  <mc:AlternateContent xmlns:mc="http://schemas.openxmlformats.org/markup-compatibility/2006">
-    <mc:Choice xmlns:p14="http://schemas.microsoft.com/office/powerpoint/2010/main" Requires="p14">
+  <mc:AlternateContent xmlns:mc="http://schemas.openxmlformats.org/markup-compatibility/2006" xmlns:p14="http://schemas.microsoft.com/office/powerpoint/2010/main">
+    <mc:Choice Requires="p14">
       <p:transition spd="slow" p14:dur="2000"/>
     </mc:Choice>
-    <mc:Fallback>
+    <mc:Fallback xmlns="">
       <p:transition xmlns:p14="http://schemas.microsoft.com/office/powerpoint/2010/main" spd="slow"/>
     </mc:Fallback>
   </mc:AlternateContent>
@@ -14610,11 +15331,11 @@
   <p:clrMapOvr>
     <a:masterClrMapping/>
   </p:clrMapOvr>
-  <mc:AlternateContent xmlns:mc="http://schemas.openxmlformats.org/markup-compatibility/2006">
-    <mc:Choice xmlns:p14="http://schemas.microsoft.com/office/powerpoint/2010/main" Requires="p14">
+  <mc:AlternateContent xmlns:mc="http://schemas.openxmlformats.org/markup-compatibility/2006" xmlns:p14="http://schemas.microsoft.com/office/powerpoint/2010/main">
+    <mc:Choice Requires="p14">
       <p:transition spd="slow" p14:dur="2000"/>
     </mc:Choice>
-    <mc:Fallback>
+    <mc:Fallback xmlns="">
       <p:transition xmlns:p14="http://schemas.microsoft.com/office/powerpoint/2010/main" spd="slow"/>
     </mc:Fallback>
   </mc:AlternateContent>
@@ -15091,11 +15812,11 @@
   <p:clrMapOvr>
     <a:masterClrMapping/>
   </p:clrMapOvr>
-  <mc:AlternateContent xmlns:mc="http://schemas.openxmlformats.org/markup-compatibility/2006">
-    <mc:Choice xmlns:p14="http://schemas.microsoft.com/office/powerpoint/2010/main" Requires="p14">
+  <mc:AlternateContent xmlns:mc="http://schemas.openxmlformats.org/markup-compatibility/2006" xmlns:p14="http://schemas.microsoft.com/office/powerpoint/2010/main">
+    <mc:Choice Requires="p14">
       <p:transition spd="slow" p14:dur="2000"/>
     </mc:Choice>
-    <mc:Fallback>
+    <mc:Fallback xmlns="">
       <p:transition xmlns:p14="http://schemas.microsoft.com/office/powerpoint/2010/main" spd="slow"/>
     </mc:Fallback>
   </mc:AlternateContent>
@@ -16023,11 +16744,11 @@
   <p:clrMapOvr>
     <a:masterClrMapping/>
   </p:clrMapOvr>
-  <mc:AlternateContent xmlns:mc="http://schemas.openxmlformats.org/markup-compatibility/2006">
-    <mc:Choice xmlns:p14="http://schemas.microsoft.com/office/powerpoint/2010/main" Requires="p14">
+  <mc:AlternateContent xmlns:mc="http://schemas.openxmlformats.org/markup-compatibility/2006" xmlns:p14="http://schemas.microsoft.com/office/powerpoint/2010/main">
+    <mc:Choice Requires="p14">
       <p:transition spd="slow" p14:dur="2000"/>
     </mc:Choice>
-    <mc:Fallback>
+    <mc:Fallback xmlns="">
       <p:transition xmlns:p14="http://schemas.microsoft.com/office/powerpoint/2010/main" spd="slow"/>
     </mc:Fallback>
   </mc:AlternateContent>
@@ -16297,19 +17018,16 @@
               <a:t>struct</a:t>
             </a:r>
             <a:r>
-              <a:rPr lang="en-GB" b="1" dirty="0" smtClean="0">
-                <a:solidFill>
-                  <a:schemeClr val="accent2"/>
-                </a:solidFill>
-                <a:latin typeface="Courier New Bold"/>
-              </a:rPr>
-              <a:t> </a:t>
-            </a:r>
-            <a:r>
               <a:rPr lang="en-GB" b="1" dirty="0">
                 <a:latin typeface="Courier New Bold"/>
               </a:rPr>
-              <a:t>{ </a:t>
+              <a:t> </a:t>
+            </a:r>
+            <a:r>
+              <a:rPr lang="en-GB" b="1" dirty="0" smtClean="0">
+                <a:latin typeface="Courier New Bold"/>
+              </a:rPr>
+              <a:t>Point{ </a:t>
             </a:r>
             <a:r>
               <a:rPr lang="en-GB" b="1" dirty="0">
@@ -16330,8 +17048,11 @@
               <a:rPr lang="en-GB" b="1" dirty="0" smtClean="0">
                 <a:latin typeface="Courier New Bold"/>
               </a:rPr>
-              <a:t>} Point;</a:t>
-            </a:r>
+              <a:t>};</a:t>
+            </a:r>
+            <a:endParaRPr lang="en-GB" b="1" dirty="0" smtClean="0">
+              <a:latin typeface="Courier New Bold"/>
+            </a:endParaRPr>
           </a:p>
           <a:p>
             <a:pPr marL="0" indent="0">
@@ -21313,11 +22034,11 @@
   <p:clrMapOvr>
     <a:masterClrMapping/>
   </p:clrMapOvr>
-  <mc:AlternateContent xmlns:mc="http://schemas.openxmlformats.org/markup-compatibility/2006">
-    <mc:Choice xmlns:p14="http://schemas.microsoft.com/office/powerpoint/2010/main" Requires="p14">
+  <mc:AlternateContent xmlns:mc="http://schemas.openxmlformats.org/markup-compatibility/2006" xmlns:p14="http://schemas.microsoft.com/office/powerpoint/2010/main">
+    <mc:Choice Requires="p14">
       <p:transition spd="slow" p14:dur="2000"/>
     </mc:Choice>
-    <mc:Fallback>
+    <mc:Fallback xmlns="">
       <p:transition xmlns:p14="http://schemas.microsoft.com/office/powerpoint/2010/main" spd="slow"/>
     </mc:Fallback>
   </mc:AlternateContent>
@@ -24052,11 +24773,11 @@
   <p:clrMapOvr>
     <a:masterClrMapping/>
   </p:clrMapOvr>
-  <mc:AlternateContent xmlns:mc="http://schemas.openxmlformats.org/markup-compatibility/2006">
-    <mc:Choice xmlns:p14="http://schemas.microsoft.com/office/powerpoint/2010/main" Requires="p14">
+  <mc:AlternateContent xmlns:mc="http://schemas.openxmlformats.org/markup-compatibility/2006" xmlns:p14="http://schemas.microsoft.com/office/powerpoint/2010/main">
+    <mc:Choice Requires="p14">
       <p:transition spd="slow" p14:dur="2000"/>
     </mc:Choice>
-    <mc:Fallback>
+    <mc:Fallback xmlns="">
       <p:transition xmlns:p14="http://schemas.microsoft.com/office/powerpoint/2010/main" spd="slow"/>
     </mc:Fallback>
   </mc:AlternateContent>
@@ -36189,11 +36910,11 @@
   <p:clrMapOvr>
     <a:masterClrMapping/>
   </p:clrMapOvr>
-  <mc:AlternateContent xmlns:mc="http://schemas.openxmlformats.org/markup-compatibility/2006">
-    <mc:Choice xmlns:p14="http://schemas.microsoft.com/office/powerpoint/2010/main" Requires="p14">
+  <mc:AlternateContent xmlns:mc="http://schemas.openxmlformats.org/markup-compatibility/2006" xmlns:p14="http://schemas.microsoft.com/office/powerpoint/2010/main">
+    <mc:Choice Requires="p14">
       <p:transition spd="slow" p14:dur="2000"/>
     </mc:Choice>
-    <mc:Fallback>
+    <mc:Fallback xmlns="">
       <p:transition xmlns:p14="http://schemas.microsoft.com/office/powerpoint/2010/main" spd="slow"/>
     </mc:Fallback>
   </mc:AlternateContent>
@@ -36280,8 +37001,21 @@
             </a:pPr>
             <a:r>
               <a:rPr lang="en-US" sz="1800" dirty="0" smtClean="0"/>
-              <a:t>Constant memory can be considered a store for variables that never change </a:t>
-            </a:r>
+              <a:t>Constant memory can be considered a store for </a:t>
+            </a:r>
+            <a:r>
+              <a:rPr lang="en-US" sz="1800" dirty="0" smtClean="0"/>
+              <a:t>data that </a:t>
+            </a:r>
+            <a:r>
+              <a:rPr lang="en-US" sz="1800" dirty="0" smtClean="0"/>
+              <a:t>never </a:t>
+            </a:r>
+            <a:r>
+              <a:rPr lang="en-US" sz="1800" dirty="0" smtClean="0"/>
+              <a:t>changes</a:t>
+            </a:r>
+            <a:endParaRPr lang="en-US" sz="1800" dirty="0" smtClean="0"/>
           </a:p>
           <a:p>
             <a:pPr marL="285750" indent="-285750">
@@ -36326,8 +37060,9 @@
             </a:pPr>
             <a:r>
               <a:rPr lang="en-US" sz="1800" dirty="0" smtClean="0"/>
-              <a:t>If a device has constant memory, upon kernel execution the data will be copied once from global</a:t>
-            </a:r>
+              <a:t>Some devices may have dedicated on-chip caches or data-paths for constant memory</a:t>
+            </a:r>
+            <a:endParaRPr lang="en-US" sz="1800" dirty="0" smtClean="0"/>
           </a:p>
           <a:p>
             <a:pPr marL="285750" indent="-285750">
@@ -36336,7 +37071,7 @@
             </a:pPr>
             <a:r>
               <a:rPr lang="en-US" sz="1800" dirty="0" smtClean="0"/>
-              <a:t>GPUs typically have ~64kB of constant memory</a:t>
+              <a:t>Devices are guaranteed to support constant memory allocations of at least 64kB</a:t>
             </a:r>
           </a:p>
           <a:p>
@@ -36346,7 +37081,11 @@
             </a:pPr>
             <a:r>
               <a:rPr lang="en-US" sz="1800" dirty="0" smtClean="0"/>
-              <a:t>Can declare OpenCL program scope constant data, but this has to be initialized at OpenCL program compile time</a:t>
+              <a:t>Can also declare </a:t>
+            </a:r>
+            <a:r>
+              <a:rPr lang="en-US" sz="1800" dirty="0" smtClean="0"/>
+              <a:t>OpenCL program scope constant data, but this has to be initialized at OpenCL program compile time</a:t>
             </a:r>
           </a:p>
         </p:txBody>
@@ -37471,11 +38210,11 @@
   <p:clrMapOvr>
     <a:masterClrMapping/>
   </p:clrMapOvr>
-  <mc:AlternateContent xmlns:mc="http://schemas.openxmlformats.org/markup-compatibility/2006">
-    <mc:Choice xmlns:p14="http://schemas.microsoft.com/office/powerpoint/2010/main" Requires="p14">
+  <mc:AlternateContent xmlns:mc="http://schemas.openxmlformats.org/markup-compatibility/2006" xmlns:p14="http://schemas.microsoft.com/office/powerpoint/2010/main">
+    <mc:Choice Requires="p14">
       <p:transition spd="slow" p14:dur="2000"/>
     </mc:Choice>
-    <mc:Fallback>
+    <mc:Fallback xmlns="">
       <p:transition xmlns:p14="http://schemas.microsoft.com/office/powerpoint/2010/main" spd="slow"/>
     </mc:Fallback>
   </mc:AlternateContent>
@@ -37827,13 +38566,13 @@
           <a:p>
             <a:r>
               <a:rPr lang="en-GB" dirty="0">
-                <a:hlinkClick r:id="rId2"/>
+                <a:hlinkClick r:id="rId3"/>
               </a:rPr>
               <a:t>http://mistymountain.co.uk/flamingo</a:t>
             </a:r>
             <a:r>
               <a:rPr lang="en-GB" dirty="0" smtClean="0">
-                <a:hlinkClick r:id="rId2"/>
+                <a:hlinkClick r:id="rId3"/>
               </a:rPr>
               <a:t>/</a:t>
             </a:r>
@@ -37878,11 +38617,11 @@
   <p:clrMapOvr>
     <a:masterClrMapping/>
   </p:clrMapOvr>
-  <mc:AlternateContent xmlns:mc="http://schemas.openxmlformats.org/markup-compatibility/2006">
-    <mc:Choice xmlns:p14="http://schemas.microsoft.com/office/powerpoint/2010/main" Requires="p14">
+  <mc:AlternateContent xmlns:mc="http://schemas.openxmlformats.org/markup-compatibility/2006" xmlns:p14="http://schemas.microsoft.com/office/powerpoint/2010/main">
+    <mc:Choice Requires="p14">
       <p:transition spd="slow" p14:dur="2000"/>
     </mc:Choice>
-    <mc:Fallback>
+    <mc:Fallback xmlns="">
       <p:transition xmlns:p14="http://schemas.microsoft.com/office/powerpoint/2010/main" spd="slow"/>
     </mc:Fallback>
   </mc:AlternateContent>
@@ -38323,7 +39062,11 @@
           <a:p>
             <a:r>
               <a:rPr lang="en-GB" dirty="0" smtClean="0"/>
-              <a:t>Architecture dependent</a:t>
+              <a:t>Architecture </a:t>
+            </a:r>
+            <a:r>
+              <a:rPr lang="en-GB" dirty="0" smtClean="0"/>
+              <a:t>dependent</a:t>
             </a:r>
             <a:endParaRPr lang="en-GB" dirty="0"/>
           </a:p>
@@ -39465,7 +40208,15 @@
             </a:pPr>
             <a:r>
               <a:rPr lang="en-GB" dirty="0" smtClean="0"/>
-              <a:t>In the past, several platforms required the use of these types in order to make use of their vector ALUs (e.g. AMD’s pre-GCN architectures and Intel’s initial CPU implementation)</a:t>
+              <a:t>In the past, several platforms </a:t>
+            </a:r>
+            <a:r>
+              <a:rPr lang="en-GB" i="1" dirty="0" smtClean="0"/>
+              <a:t>required</a:t>
+            </a:r>
+            <a:r>
+              <a:rPr lang="en-GB" dirty="0" smtClean="0"/>
+              <a:t> the use of these types in order to make use of their vector ALUs (e.g. AMD’s pre-GCN architectures and Intel’s initial CPU implementation)</a:t>
             </a:r>
           </a:p>
           <a:p>
@@ -39794,7 +40545,7 @@
         </p:spPr>
         <p:txBody>
           <a:bodyPr>
-            <a:normAutofit/>
+            <a:normAutofit lnSpcReduction="10000"/>
           </a:bodyPr>
           <a:lstStyle/>
           <a:p>
@@ -39805,7 +40556,15 @@
             </a:pPr>
             <a:r>
               <a:rPr lang="en-GB" dirty="0" smtClean="0"/>
-              <a:t>You many come across some platforms that still require explicit </a:t>
+              <a:t>You </a:t>
+            </a:r>
+            <a:r>
+              <a:rPr lang="en-GB" dirty="0" smtClean="0"/>
+              <a:t>may </a:t>
+            </a:r>
+            <a:r>
+              <a:rPr lang="en-GB" dirty="0" smtClean="0"/>
+              <a:t>come across some platforms that still require explicit </a:t>
             </a:r>
             <a:r>
               <a:rPr lang="en-GB" dirty="0" err="1" smtClean="0"/>
@@ -39832,7 +40591,19 @@
             </a:pPr>
             <a:r>
               <a:rPr lang="en-GB" dirty="0" smtClean="0"/>
-              <a:t>You can query an OpenCL device to determine whether it prefers scalar or vector data types:</a:t>
+              <a:t>You can query an OpenCL device to determine whether it prefers scalar or vector data </a:t>
+            </a:r>
+            <a:r>
+              <a:rPr lang="en-GB" dirty="0" smtClean="0"/>
+              <a:t>types, </a:t>
+            </a:r>
+            <a:r>
+              <a:rPr lang="en-GB" dirty="0" err="1" smtClean="0"/>
+              <a:t>e.g</a:t>
+            </a:r>
+            <a:r>
+              <a:rPr lang="en-GB" dirty="0" smtClean="0"/>
+              <a:t>:</a:t>
             </a:r>
             <a:endParaRPr lang="en-GB" dirty="0"/>
           </a:p>
@@ -40479,11 +41250,11 @@
   <p:clrMapOvr>
     <a:masterClrMapping/>
   </p:clrMapOvr>
-  <mc:AlternateContent xmlns:mc="http://schemas.openxmlformats.org/markup-compatibility/2006">
-    <mc:Choice xmlns:p14="http://schemas.microsoft.com/office/powerpoint/2010/main" Requires="p14">
+  <mc:AlternateContent xmlns:mc="http://schemas.openxmlformats.org/markup-compatibility/2006" xmlns:p14="http://schemas.microsoft.com/office/powerpoint/2010/main">
+    <mc:Choice Requires="p14">
       <p:transition spd="slow" p14:dur="2000"/>
     </mc:Choice>
-    <mc:Fallback>
+    <mc:Fallback xmlns="">
       <p:transition xmlns:p14="http://schemas.microsoft.com/office/powerpoint/2010/main" spd="slow"/>
     </mc:Fallback>
   </mc:AlternateContent>
@@ -42731,11 +43502,11 @@
   <p:clrMapOvr>
     <a:masterClrMapping/>
   </p:clrMapOvr>
-  <mc:AlternateContent xmlns:mc="http://schemas.openxmlformats.org/markup-compatibility/2006">
-    <mc:Choice xmlns:p14="http://schemas.microsoft.com/office/powerpoint/2010/main" Requires="p14">
+  <mc:AlternateContent xmlns:mc="http://schemas.openxmlformats.org/markup-compatibility/2006" xmlns:p14="http://schemas.microsoft.com/office/powerpoint/2010/main">
+    <mc:Choice Requires="p14">
       <p:transition spd="slow" p14:dur="2000"/>
     </mc:Choice>
-    <mc:Fallback>
+    <mc:Fallback xmlns="">
       <p:transition xmlns:p14="http://schemas.microsoft.com/office/powerpoint/2010/main" spd="slow"/>
     </mc:Fallback>
   </mc:AlternateContent>
@@ -44231,47 +45002,17 @@
                 <a:latin typeface="Courier New"/>
                 <a:cs typeface="Courier New"/>
               </a:rPr>
-              <a:t>    region[0] </a:t>
-            </a:r>
-            <a:r>
-              <a:rPr lang="hr-HR" b="1">
-                <a:solidFill>
-                  <a:srgbClr val="3366FF"/>
-                </a:solidFill>
-                <a:latin typeface="Courier New"/>
-                <a:cs typeface="Courier New"/>
-              </a:rPr>
-              <a:t>= </a:t>
-            </a:r>
-            <a:r>
-              <a:rPr lang="hr-HR" b="1" dirty="0">
-                <a:solidFill>
-                  <a:srgbClr val="3366FF"/>
-                </a:solidFill>
-                <a:latin typeface="Courier New"/>
-                <a:cs typeface="Courier New"/>
-              </a:rPr>
-              <a:t>image</a:t>
-            </a:r>
-            <a:r>
-              <a:rPr lang="hr-HR" b="1">
-                <a:solidFill>
-                  <a:srgbClr val="3366FF"/>
-                </a:solidFill>
-                <a:latin typeface="Courier New"/>
-                <a:cs typeface="Courier New"/>
-              </a:rPr>
-              <a:t>-&gt;</a:t>
-            </a:r>
-            <a:r>
-              <a:rPr lang="hr-HR" b="1" smtClean="0">
-                <a:solidFill>
-                  <a:srgbClr val="3366FF"/>
-                </a:solidFill>
-                <a:latin typeface="Courier New"/>
-                <a:cs typeface="Courier New"/>
-              </a:rPr>
-              <a:t>w;</a:t>
+              <a:t>    region[0] = </a:t>
+            </a:r>
+            <a:r>
+              <a:rPr lang="hr-HR" b="1" dirty="0" smtClean="0">
+                <a:solidFill>
+                  <a:srgbClr val="3366FF"/>
+                </a:solidFill>
+                <a:latin typeface="Courier New"/>
+                <a:cs typeface="Courier New"/>
+              </a:rPr>
+              <a:t>width;</a:t>
             </a:r>
             <a:endParaRPr lang="hr-HR" b="1" dirty="0">
               <a:solidFill>
@@ -44293,47 +45034,17 @@
                 <a:latin typeface="Courier New"/>
                 <a:cs typeface="Courier New"/>
               </a:rPr>
-              <a:t>    region[1] </a:t>
-            </a:r>
-            <a:r>
-              <a:rPr lang="hr-HR" b="1">
-                <a:solidFill>
-                  <a:srgbClr val="3366FF"/>
-                </a:solidFill>
-                <a:latin typeface="Courier New"/>
-                <a:cs typeface="Courier New"/>
-              </a:rPr>
-              <a:t>= </a:t>
-            </a:r>
-            <a:r>
-              <a:rPr lang="hr-HR" b="1" dirty="0">
-                <a:solidFill>
-                  <a:srgbClr val="3366FF"/>
-                </a:solidFill>
-                <a:latin typeface="Courier New"/>
-                <a:cs typeface="Courier New"/>
-              </a:rPr>
-              <a:t>image</a:t>
-            </a:r>
-            <a:r>
-              <a:rPr lang="hr-HR" b="1">
-                <a:solidFill>
-                  <a:srgbClr val="3366FF"/>
-                </a:solidFill>
-                <a:latin typeface="Courier New"/>
-                <a:cs typeface="Courier New"/>
-              </a:rPr>
-              <a:t>-&gt;</a:t>
-            </a:r>
-            <a:r>
-              <a:rPr lang="hr-HR" b="1" smtClean="0">
-                <a:solidFill>
-                  <a:srgbClr val="3366FF"/>
-                </a:solidFill>
-                <a:latin typeface="Courier New"/>
-                <a:cs typeface="Courier New"/>
-              </a:rPr>
-              <a:t>h;</a:t>
+              <a:t>    region[1] = </a:t>
+            </a:r>
+            <a:r>
+              <a:rPr lang="hr-HR" b="1" dirty="0" smtClean="0">
+                <a:solidFill>
+                  <a:srgbClr val="3366FF"/>
+                </a:solidFill>
+                <a:latin typeface="Courier New"/>
+                <a:cs typeface="Courier New"/>
+              </a:rPr>
+              <a:t>height;</a:t>
             </a:r>
             <a:endParaRPr lang="hr-HR" b="1" dirty="0">
               <a:solidFill>
@@ -47457,11 +48168,11 @@
   <p:clrMapOvr>
     <a:masterClrMapping/>
   </p:clrMapOvr>
-  <mc:AlternateContent xmlns:mc="http://schemas.openxmlformats.org/markup-compatibility/2006">
-    <mc:Choice xmlns:p14="http://schemas.microsoft.com/office/powerpoint/2010/main" Requires="p14">
+  <mc:AlternateContent xmlns:mc="http://schemas.openxmlformats.org/markup-compatibility/2006" xmlns:p14="http://schemas.microsoft.com/office/powerpoint/2010/main">
+    <mc:Choice Requires="p14">
       <p:transition spd="slow" p14:dur="2000"/>
     </mc:Choice>
-    <mc:Fallback>
+    <mc:Fallback xmlns="">
       <p:transition xmlns:p14="http://schemas.microsoft.com/office/powerpoint/2010/main" spd="slow"/>
     </mc:Fallback>
   </mc:AlternateContent>
@@ -47916,11 +48627,11 @@
   <p:clrMapOvr>
     <a:masterClrMapping/>
   </p:clrMapOvr>
-  <mc:AlternateContent xmlns:mc="http://schemas.openxmlformats.org/markup-compatibility/2006">
-    <mc:Choice xmlns:p14="http://schemas.microsoft.com/office/powerpoint/2010/main" Requires="p14">
+  <mc:AlternateContent xmlns:mc="http://schemas.openxmlformats.org/markup-compatibility/2006" xmlns:p14="http://schemas.microsoft.com/office/powerpoint/2010/main">
+    <mc:Choice Requires="p14">
       <p:transition spd="slow" p14:dur="2000"/>
     </mc:Choice>
-    <mc:Fallback>
+    <mc:Fallback xmlns="">
       <p:transition xmlns:p14="http://schemas.microsoft.com/office/powerpoint/2010/main" spd="slow"/>
     </mc:Fallback>
   </mc:AlternateContent>

</xml_diff>

<commit_message>
Update part4 slides with changes from training at Waters
</commit_message>
<xml_diff>
--- a/slides/advanced_part3.pptx
+++ b/slides/advanced_part3.pptx
@@ -12778,15 +12778,7 @@
           <a:p>
             <a:r>
               <a:rPr lang="en-US" dirty="0" smtClean="0"/>
-              <a:t>Intel </a:t>
-            </a:r>
-            <a:r>
-              <a:rPr lang="en-US" dirty="0" smtClean="0"/>
-              <a:t>SDK (</a:t>
-            </a:r>
-            <a:r>
-              <a:rPr lang="en-US" dirty="0" smtClean="0"/>
-              <a:t>Visual Studio plugin)</a:t>
+              <a:t>Intel SDK (Visual Studio plugin)</a:t>
             </a:r>
           </a:p>
           <a:p>
@@ -12794,7 +12786,6 @@
               <a:rPr lang="en-US" dirty="0" smtClean="0"/>
               <a:t>GDB (CPU platforms)</a:t>
             </a:r>
-            <a:endParaRPr lang="en-US" dirty="0" smtClean="0"/>
           </a:p>
           <a:p>
             <a:r>
@@ -12836,28 +12827,7 @@
                 <a:latin typeface="Calibri"/>
                 <a:cs typeface="Calibri"/>
               </a:rPr>
-              <a:t>( from </a:t>
-            </a:r>
-            <a:r>
-              <a:rPr lang="en-US" dirty="0" smtClean="0">
-                <a:latin typeface="Calibri"/>
-                <a:cs typeface="Calibri"/>
-              </a:rPr>
-              <a:t>OpenCL </a:t>
-            </a:r>
-            <a:r>
-              <a:rPr lang="en-US" dirty="0" smtClean="0">
-                <a:latin typeface="Calibri"/>
-                <a:cs typeface="Calibri"/>
-              </a:rPr>
-              <a:t>1.2 onwards </a:t>
-            </a:r>
-            <a:r>
-              <a:rPr lang="en-US" dirty="0" smtClean="0">
-                <a:latin typeface="Calibri"/>
-                <a:cs typeface="Calibri"/>
-              </a:rPr>
-              <a:t>)</a:t>
+              <a:t>( from OpenCL 1.2 onwards )</a:t>
             </a:r>
             <a:endParaRPr lang="en-US" b="1" dirty="0" smtClean="0">
               <a:solidFill>
@@ -14220,11 +14190,7 @@
           <a:p>
             <a:r>
               <a:rPr lang="en-US" dirty="0" smtClean="0"/>
-              <a:t>Intel </a:t>
-            </a:r>
-            <a:r>
-              <a:rPr lang="en-US" dirty="0" smtClean="0"/>
-              <a:t>System Analyzer, Platform Analyzer, </a:t>
+              <a:t>Intel System Analyzer, Platform Analyzer, </a:t>
             </a:r>
             <a:r>
               <a:rPr lang="en-US" dirty="0" err="1" smtClean="0"/>
@@ -14422,11 +14388,7 @@
           <a:p>
             <a:r>
               <a:rPr lang="en-GB" dirty="0" smtClean="0"/>
-              <a:t>Profile (events should work </a:t>
-            </a:r>
-            <a:r>
-              <a:rPr lang="en-GB" dirty="0" smtClean="0"/>
-              <a:t>everywhere)</a:t>
+              <a:t>Profile (events should work everywhere)</a:t>
             </a:r>
             <a:endParaRPr lang="en-GB" dirty="0"/>
           </a:p>
@@ -16890,11 +16852,7 @@
             </a:r>
             <a:r>
               <a:rPr lang="en-US" dirty="0" smtClean="0"/>
-              <a:t>(Array of Structures vs</a:t>
-            </a:r>
-            <a:r>
-              <a:rPr lang="en-US" dirty="0" smtClean="0"/>
-              <a:t>. Structure of Arrays)</a:t>
+              <a:t>(Array of Structures vs. Structure of Arrays)</a:t>
             </a:r>
             <a:endParaRPr lang="en-US" dirty="0" smtClean="0">
               <a:solidFill>
@@ -17028,11 +16986,7 @@
             </a:r>
             <a:r>
               <a:rPr lang="en-GB" dirty="0" smtClean="0"/>
-              <a:t>often </a:t>
-            </a:r>
-            <a:r>
-              <a:rPr lang="en-GB" dirty="0" smtClean="0"/>
-              <a:t>more </a:t>
+              <a:t>often more </a:t>
             </a:r>
             <a:r>
               <a:rPr lang="en-GB" dirty="0"/>
@@ -37255,17 +37209,7 @@
                 <a:latin typeface="Courier New"/>
                 <a:cs typeface="Courier New"/>
               </a:rPr>
-              <a:t>/ constant </a:t>
-            </a:r>
-            <a:r>
-              <a:rPr lang="en-US" sz="1400" b="1" dirty="0" smtClean="0">
-                <a:solidFill>
-                  <a:srgbClr val="3366FF"/>
-                </a:solidFill>
-                <a:latin typeface="Courier New"/>
-                <a:cs typeface="Courier New"/>
-              </a:rPr>
-              <a:t>memory </a:t>
+              <a:t>/ constant memory </a:t>
             </a:r>
             <a:r>
               <a:rPr lang="en-US" sz="1400" b="1" dirty="0">
@@ -37369,27 +37313,7 @@
                 <a:latin typeface="Courier New"/>
                 <a:cs typeface="Courier New"/>
               </a:rPr>
-              <a:t>  /</a:t>
-            </a:r>
-            <a:r>
-              <a:rPr lang="en-US" sz="1400" b="1" dirty="0" smtClean="0">
-                <a:solidFill>
-                  <a:srgbClr val="3366FF"/>
-                </a:solidFill>
-                <a:latin typeface="Courier New"/>
-                <a:cs typeface="Courier New"/>
-              </a:rPr>
-              <a:t>/ code </a:t>
-            </a:r>
-            <a:r>
-              <a:rPr lang="en-US" sz="1400" b="1" dirty="0" smtClean="0">
-                <a:solidFill>
-                  <a:srgbClr val="3366FF"/>
-                </a:solidFill>
-                <a:latin typeface="Courier New"/>
-                <a:cs typeface="Courier New"/>
-              </a:rPr>
-              <a:t>here</a:t>
+              <a:t>  // code here</a:t>
             </a:r>
           </a:p>
           <a:p>
@@ -38019,13 +37943,8 @@
             <a:pPr lvl="1"/>
             <a:r>
               <a:rPr lang="en-GB" dirty="0" smtClean="0"/>
-              <a:t>What is the best work-group size, for </a:t>
-            </a:r>
-            <a:r>
-              <a:rPr lang="en-GB" dirty="0" smtClean="0"/>
-              <a:t>example?</a:t>
-            </a:r>
-            <a:endParaRPr lang="en-GB" dirty="0" smtClean="0"/>
+              <a:t>What is the best work-group size, for example?</a:t>
+            </a:r>
           </a:p>
           <a:p>
             <a:endParaRPr lang="en-GB" dirty="0"/>
@@ -39105,11 +39024,7 @@
           <a:p>
             <a:r>
               <a:rPr lang="en-GB" dirty="0" smtClean="0"/>
-              <a:t>Barriers between memory access-heavy kernel code sections might actually speed it up by </a:t>
-            </a:r>
-            <a:r>
-              <a:rPr lang="en-GB" dirty="0" smtClean="0"/>
-              <a:t>improving the cache behaviour</a:t>
+              <a:t>Barriers between memory access-heavy kernel code sections might actually speed it up by improving the cache behaviour</a:t>
             </a:r>
           </a:p>
           <a:p>
@@ -39125,7 +39040,6 @@
               <a:rPr lang="en-GB" dirty="0" smtClean="0"/>
               <a:t>Works by stopping some work-items from racing ahead and trashing the cache before all the other work-items have finished working with the current contents</a:t>
             </a:r>
-            <a:endParaRPr lang="en-GB" dirty="0" smtClean="0"/>
           </a:p>
           <a:p>
             <a:r>
@@ -40855,11 +40769,7 @@
             </a:pPr>
             <a:r>
               <a:rPr lang="en-GB" dirty="0" smtClean="0"/>
-              <a:t>We </a:t>
-            </a:r>
-            <a:r>
-              <a:rPr lang="en-GB" dirty="0" smtClean="0"/>
-              <a:t>can use predication, selection and masking to convert conditional control flow into straight line code and significantly improve the performance of code that has lots of conditional branches</a:t>
+              <a:t>We can use predication, selection and masking to convert conditional control flow into straight line code and significantly improve the performance of code that has lots of conditional branches</a:t>
             </a:r>
             <a:endParaRPr lang="en-GB" dirty="0"/>
           </a:p>
@@ -44189,19 +44099,7 @@
             </a:pPr>
             <a:r>
               <a:rPr lang="en-GB" dirty="0" smtClean="0"/>
-              <a:t>If </a:t>
-            </a:r>
-            <a:r>
-              <a:rPr lang="en-GB" dirty="0" smtClean="0"/>
-              <a:t>you can settle for reduced precision, then </a:t>
-            </a:r>
-            <a:r>
-              <a:rPr lang="en-GB" dirty="0" smtClean="0"/>
-              <a:t>native/half functions </a:t>
-            </a:r>
-            <a:r>
-              <a:rPr lang="en-GB" dirty="0" smtClean="0"/>
-              <a:t>can significantly improve performance</a:t>
+              <a:t>If you can settle for reduced precision, then native/half functions can significantly improve performance</a:t>
             </a:r>
           </a:p>
           <a:p>
@@ -44348,11 +44246,7 @@
             <a:pPr lvl="1"/>
             <a:r>
               <a:rPr lang="en-GB" dirty="0" smtClean="0"/>
-              <a:t>This can only be used as </a:t>
-            </a:r>
-            <a:r>
-              <a:rPr lang="en-GB" dirty="0" smtClean="0"/>
-              <a:t>storage </a:t>
+              <a:t>This can only be used as storage </a:t>
             </a:r>
           </a:p>
           <a:p>
@@ -44365,15 +44259,7 @@
             </a:r>
             <a:r>
               <a:rPr lang="en-GB" dirty="0" smtClean="0"/>
-              <a:t> </a:t>
-            </a:r>
-            <a:r>
-              <a:rPr lang="en-GB" dirty="0" smtClean="0"/>
-              <a:t> </a:t>
-            </a:r>
-            <a:r>
-              <a:rPr lang="en-GB" dirty="0" smtClean="0"/>
-              <a:t>(</a:t>
+              <a:t>  (</a:t>
             </a:r>
             <a:r>
               <a:rPr lang="en-GB" b="1" dirty="0" smtClean="0">
@@ -44435,11 +44321,7 @@
           <a:p>
             <a:r>
               <a:rPr lang="en-GB" dirty="0" smtClean="0"/>
-              <a:t>If the device </a:t>
-            </a:r>
-            <a:r>
-              <a:rPr lang="en-GB" dirty="0" smtClean="0"/>
-              <a:t>supports the </a:t>
+              <a:t>If the device supports the </a:t>
             </a:r>
             <a:r>
               <a:rPr lang="en-GB" b="1" dirty="0" smtClean="0">
@@ -44457,17 +44339,8 @@
             </a:r>
             <a:r>
               <a:rPr lang="en-GB" dirty="0" smtClean="0"/>
-              <a:t>extension, you </a:t>
-            </a:r>
-            <a:r>
-              <a:rPr lang="en-GB" dirty="0" smtClean="0"/>
-              <a:t>can also perform arithmetic on these types, and use the built-in math </a:t>
-            </a:r>
-            <a:r>
-              <a:rPr lang="en-GB" dirty="0" smtClean="0"/>
-              <a:t>functions</a:t>
-            </a:r>
-            <a:endParaRPr lang="en-GB" dirty="0" smtClean="0"/>
+              <a:t>extension, you can also perform arithmetic on these types, and use the built-in math functions</a:t>
+            </a:r>
           </a:p>
         </p:txBody>
       </p:sp>
@@ -45621,15 +45494,7 @@
             </a:pPr>
             <a:r>
               <a:rPr lang="en-GB" dirty="0" smtClean="0"/>
-              <a:t>The </a:t>
-            </a:r>
-            <a:r>
-              <a:rPr lang="en-GB" dirty="0" smtClean="0"/>
-              <a:t>kernel compiler will </a:t>
-            </a:r>
-            <a:r>
-              <a:rPr lang="en-GB" dirty="0" smtClean="0"/>
-              <a:t>define the </a:t>
+              <a:t>The kernel compiler will define the </a:t>
             </a:r>
             <a:r>
               <a:rPr lang="en-GB" dirty="0" err="1" smtClean="0"/>
@@ -49323,8 +49188,12 @@
           <a:lstStyle/>
           <a:p>
             <a:r>
+              <a:rPr lang="en-GB" smtClean="0"/>
+              <a:t>Exercise: image </a:t>
+            </a:r>
+            <a:r>
               <a:rPr lang="en-GB" dirty="0" smtClean="0"/>
-              <a:t>Exercise 3</a:t>
+              <a:t>types</a:t>
             </a:r>
             <a:endParaRPr lang="en-GB" dirty="0"/>
           </a:p>

</xml_diff>

<commit_message>
Part 3 mods: added Oclgrind slide and exercise results slide
</commit_message>
<xml_diff>
--- a/slides/advanced_part3.pptx
+++ b/slides/advanced_part3.pptx
@@ -5,7 +5,7 @@
     <p:sldMasterId id="2147483648" r:id="rId1"/>
   </p:sldMasterIdLst>
   <p:notesMasterIdLst>
-    <p:notesMasterId r:id="rId83"/>
+    <p:notesMasterId r:id="rId84"/>
   </p:notesMasterIdLst>
   <p:sldIdLst>
     <p:sldId id="257" r:id="rId2"/>
@@ -89,6 +89,7 @@
     <p:sldId id="332" r:id="rId80"/>
     <p:sldId id="333" r:id="rId81"/>
     <p:sldId id="334" r:id="rId82"/>
+    <p:sldId id="339" r:id="rId83"/>
   </p:sldIdLst>
   <p:sldSz cx="9144000" cy="6858000" type="screen4x3"/>
   <p:notesSz cx="6858000" cy="9144000"/>
@@ -272,7 +273,7 @@
           <a:p>
             <a:fld id="{154B9960-65DD-7948-AAE5-CA021B06E14D}" type="datetimeFigureOut">
               <a:rPr lang="en-US" smtClean="0"/>
-              <a:t>08/04/16</a:t>
+              <a:t>14/04/16</a:t>
             </a:fld>
             <a:endParaRPr lang="en-GB"/>
           </a:p>
@@ -3266,7 +3267,7 @@
           <a:p>
             <a:fld id="{D96F9273-1B51-1D4D-B007-2EA617412104}" type="datetimeFigureOut">
               <a:rPr lang="en-US" smtClean="0"/>
-              <a:t>08/04/16</a:t>
+              <a:t>14/04/16</a:t>
             </a:fld>
             <a:endParaRPr lang="en-GB"/>
           </a:p>
@@ -3436,7 +3437,7 @@
           <a:p>
             <a:fld id="{D96F9273-1B51-1D4D-B007-2EA617412104}" type="datetimeFigureOut">
               <a:rPr lang="en-US" smtClean="0"/>
-              <a:t>08/04/16</a:t>
+              <a:t>14/04/16</a:t>
             </a:fld>
             <a:endParaRPr lang="en-GB"/>
           </a:p>
@@ -3616,7 +3617,7 @@
           <a:p>
             <a:fld id="{D96F9273-1B51-1D4D-B007-2EA617412104}" type="datetimeFigureOut">
               <a:rPr lang="en-US" smtClean="0"/>
-              <a:t>08/04/16</a:t>
+              <a:t>14/04/16</a:t>
             </a:fld>
             <a:endParaRPr lang="en-GB"/>
           </a:p>
@@ -3786,7 +3787,7 @@
           <a:p>
             <a:fld id="{D96F9273-1B51-1D4D-B007-2EA617412104}" type="datetimeFigureOut">
               <a:rPr lang="en-US" smtClean="0"/>
-              <a:t>08/04/16</a:t>
+              <a:t>14/04/16</a:t>
             </a:fld>
             <a:endParaRPr lang="en-GB"/>
           </a:p>
@@ -4032,7 +4033,7 @@
           <a:p>
             <a:fld id="{D96F9273-1B51-1D4D-B007-2EA617412104}" type="datetimeFigureOut">
               <a:rPr lang="en-US" smtClean="0"/>
-              <a:t>08/04/16</a:t>
+              <a:t>14/04/16</a:t>
             </a:fld>
             <a:endParaRPr lang="en-GB"/>
           </a:p>
@@ -4320,7 +4321,7 @@
           <a:p>
             <a:fld id="{D96F9273-1B51-1D4D-B007-2EA617412104}" type="datetimeFigureOut">
               <a:rPr lang="en-US" smtClean="0"/>
-              <a:t>08/04/16</a:t>
+              <a:t>14/04/16</a:t>
             </a:fld>
             <a:endParaRPr lang="en-GB"/>
           </a:p>
@@ -4742,7 +4743,7 @@
           <a:p>
             <a:fld id="{D96F9273-1B51-1D4D-B007-2EA617412104}" type="datetimeFigureOut">
               <a:rPr lang="en-US" smtClean="0"/>
-              <a:t>08/04/16</a:t>
+              <a:t>14/04/16</a:t>
             </a:fld>
             <a:endParaRPr lang="en-GB"/>
           </a:p>
@@ -4860,7 +4861,7 @@
           <a:p>
             <a:fld id="{D96F9273-1B51-1D4D-B007-2EA617412104}" type="datetimeFigureOut">
               <a:rPr lang="en-US" smtClean="0"/>
-              <a:t>08/04/16</a:t>
+              <a:t>14/04/16</a:t>
             </a:fld>
             <a:endParaRPr lang="en-GB"/>
           </a:p>
@@ -4955,7 +4956,7 @@
           <a:p>
             <a:fld id="{D96F9273-1B51-1D4D-B007-2EA617412104}" type="datetimeFigureOut">
               <a:rPr lang="en-US" smtClean="0"/>
-              <a:t>08/04/16</a:t>
+              <a:t>14/04/16</a:t>
             </a:fld>
             <a:endParaRPr lang="en-GB"/>
           </a:p>
@@ -5232,7 +5233,7 @@
           <a:p>
             <a:fld id="{D96F9273-1B51-1D4D-B007-2EA617412104}" type="datetimeFigureOut">
               <a:rPr lang="en-US" smtClean="0"/>
-              <a:t>08/04/16</a:t>
+              <a:t>14/04/16</a:t>
             </a:fld>
             <a:endParaRPr lang="en-GB"/>
           </a:p>
@@ -5485,7 +5486,7 @@
           <a:p>
             <a:fld id="{D96F9273-1B51-1D4D-B007-2EA617412104}" type="datetimeFigureOut">
               <a:rPr lang="en-US" smtClean="0"/>
-              <a:t>08/04/16</a:t>
+              <a:t>14/04/16</a:t>
             </a:fld>
             <a:endParaRPr lang="en-GB"/>
           </a:p>
@@ -5698,7 +5699,7 @@
           <a:p>
             <a:fld id="{D96F9273-1B51-1D4D-B007-2EA617412104}" type="datetimeFigureOut">
               <a:rPr lang="en-US" smtClean="0"/>
-              <a:t>08/04/16</a:t>
+              <a:t>14/04/16</a:t>
             </a:fld>
             <a:endParaRPr lang="en-GB"/>
           </a:p>
@@ -6347,11 +6348,11 @@
   <p:clrMapOvr>
     <a:masterClrMapping/>
   </p:clrMapOvr>
-  <mc:AlternateContent xmlns:mc="http://schemas.openxmlformats.org/markup-compatibility/2006" xmlns:p14="http://schemas.microsoft.com/office/powerpoint/2010/main">
-    <mc:Choice Requires="p14">
+  <mc:AlternateContent xmlns:mc="http://schemas.openxmlformats.org/markup-compatibility/2006">
+    <mc:Choice xmlns:p14="http://schemas.microsoft.com/office/powerpoint/2010/main" Requires="p14">
       <p:transition spd="slow" p14:dur="2000"/>
     </mc:Choice>
-    <mc:Fallback xmlns="">
+    <mc:Fallback>
       <p:transition xmlns:p14="http://schemas.microsoft.com/office/powerpoint/2010/main" spd="slow"/>
     </mc:Fallback>
   </mc:AlternateContent>
@@ -6648,11 +6649,11 @@
   <p:clrMapOvr>
     <a:masterClrMapping/>
   </p:clrMapOvr>
-  <mc:AlternateContent xmlns:mc="http://schemas.openxmlformats.org/markup-compatibility/2006" xmlns:p14="http://schemas.microsoft.com/office/powerpoint/2010/main">
-    <mc:Choice Requires="p14">
+  <mc:AlternateContent xmlns:mc="http://schemas.openxmlformats.org/markup-compatibility/2006">
+    <mc:Choice xmlns:p14="http://schemas.microsoft.com/office/powerpoint/2010/main" Requires="p14">
       <p:transition spd="slow" p14:dur="2000"/>
     </mc:Choice>
-    <mc:Fallback xmlns="">
+    <mc:Fallback>
       <p:transition xmlns:p14="http://schemas.microsoft.com/office/powerpoint/2010/main" spd="slow"/>
     </mc:Fallback>
   </mc:AlternateContent>
@@ -6774,11 +6775,11 @@
   <p:clrMapOvr>
     <a:masterClrMapping/>
   </p:clrMapOvr>
-  <mc:AlternateContent xmlns:mc="http://schemas.openxmlformats.org/markup-compatibility/2006" xmlns:p14="http://schemas.microsoft.com/office/powerpoint/2010/main">
-    <mc:Choice Requires="p14">
+  <mc:AlternateContent xmlns:mc="http://schemas.openxmlformats.org/markup-compatibility/2006">
+    <mc:Choice xmlns:p14="http://schemas.microsoft.com/office/powerpoint/2010/main" Requires="p14">
       <p:transition spd="slow" p14:dur="2000"/>
     </mc:Choice>
-    <mc:Fallback xmlns="">
+    <mc:Fallback>
       <p:transition xmlns:p14="http://schemas.microsoft.com/office/powerpoint/2010/main" spd="slow"/>
     </mc:Fallback>
   </mc:AlternateContent>
@@ -6933,11 +6934,11 @@
   <p:clrMapOvr>
     <a:masterClrMapping/>
   </p:clrMapOvr>
-  <mc:AlternateContent xmlns:mc="http://schemas.openxmlformats.org/markup-compatibility/2006" xmlns:p14="http://schemas.microsoft.com/office/powerpoint/2010/main">
-    <mc:Choice Requires="p14">
+  <mc:AlternateContent xmlns:mc="http://schemas.openxmlformats.org/markup-compatibility/2006">
+    <mc:Choice xmlns:p14="http://schemas.microsoft.com/office/powerpoint/2010/main" Requires="p14">
       <p:transition spd="slow" p14:dur="2000"/>
     </mc:Choice>
-    <mc:Fallback xmlns="">
+    <mc:Fallback>
       <p:transition xmlns:p14="http://schemas.microsoft.com/office/powerpoint/2010/main" spd="slow"/>
     </mc:Fallback>
   </mc:AlternateContent>
@@ -7045,11 +7046,11 @@
   <p:clrMapOvr>
     <a:masterClrMapping/>
   </p:clrMapOvr>
-  <mc:AlternateContent xmlns:mc="http://schemas.openxmlformats.org/markup-compatibility/2006" xmlns:p14="http://schemas.microsoft.com/office/powerpoint/2010/main">
-    <mc:Choice Requires="p14">
+  <mc:AlternateContent xmlns:mc="http://schemas.openxmlformats.org/markup-compatibility/2006">
+    <mc:Choice xmlns:p14="http://schemas.microsoft.com/office/powerpoint/2010/main" Requires="p14">
       <p:transition spd="slow" p14:dur="2000"/>
     </mc:Choice>
-    <mc:Fallback xmlns="">
+    <mc:Fallback>
       <p:transition xmlns:p14="http://schemas.microsoft.com/office/powerpoint/2010/main" spd="slow"/>
     </mc:Fallback>
   </mc:AlternateContent>
@@ -7808,11 +7809,11 @@
   <p:clrMapOvr>
     <a:masterClrMapping/>
   </p:clrMapOvr>
-  <mc:AlternateContent xmlns:mc="http://schemas.openxmlformats.org/markup-compatibility/2006" xmlns:p14="http://schemas.microsoft.com/office/powerpoint/2010/main">
-    <mc:Choice Requires="p14">
+  <mc:AlternateContent xmlns:mc="http://schemas.openxmlformats.org/markup-compatibility/2006">
+    <mc:Choice xmlns:p14="http://schemas.microsoft.com/office/powerpoint/2010/main" Requires="p14">
       <p:transition spd="slow" p14:dur="2000"/>
     </mc:Choice>
-    <mc:Fallback xmlns="">
+    <mc:Fallback>
       <p:transition xmlns:p14="http://schemas.microsoft.com/office/powerpoint/2010/main" spd="slow"/>
     </mc:Fallback>
   </mc:AlternateContent>
@@ -8090,11 +8091,11 @@
   <p:clrMapOvr>
     <a:masterClrMapping/>
   </p:clrMapOvr>
-  <mc:AlternateContent xmlns:mc="http://schemas.openxmlformats.org/markup-compatibility/2006" xmlns:p14="http://schemas.microsoft.com/office/powerpoint/2010/main">
-    <mc:Choice Requires="p14">
+  <mc:AlternateContent xmlns:mc="http://schemas.openxmlformats.org/markup-compatibility/2006">
+    <mc:Choice xmlns:p14="http://schemas.microsoft.com/office/powerpoint/2010/main" Requires="p14">
       <p:transition spd="slow" p14:dur="2000"/>
     </mc:Choice>
-    <mc:Fallback xmlns="">
+    <mc:Fallback>
       <p:transition xmlns:p14="http://schemas.microsoft.com/office/powerpoint/2010/main" spd="slow"/>
     </mc:Fallback>
   </mc:AlternateContent>
@@ -8242,11 +8243,11 @@
   <p:clrMapOvr>
     <a:masterClrMapping/>
   </p:clrMapOvr>
-  <mc:AlternateContent xmlns:mc="http://schemas.openxmlformats.org/markup-compatibility/2006" xmlns:p14="http://schemas.microsoft.com/office/powerpoint/2010/main">
-    <mc:Choice Requires="p14">
+  <mc:AlternateContent xmlns:mc="http://schemas.openxmlformats.org/markup-compatibility/2006">
+    <mc:Choice xmlns:p14="http://schemas.microsoft.com/office/powerpoint/2010/main" Requires="p14">
       <p:transition spd="slow" p14:dur="2000"/>
     </mc:Choice>
-    <mc:Fallback xmlns="">
+    <mc:Fallback>
       <p:transition xmlns:p14="http://schemas.microsoft.com/office/powerpoint/2010/main" spd="slow"/>
     </mc:Fallback>
   </mc:AlternateContent>
@@ -8400,11 +8401,11 @@
   <p:clrMapOvr>
     <a:masterClrMapping/>
   </p:clrMapOvr>
-  <mc:AlternateContent xmlns:mc="http://schemas.openxmlformats.org/markup-compatibility/2006" xmlns:p14="http://schemas.microsoft.com/office/powerpoint/2010/main">
-    <mc:Choice Requires="p14">
+  <mc:AlternateContent xmlns:mc="http://schemas.openxmlformats.org/markup-compatibility/2006">
+    <mc:Choice xmlns:p14="http://schemas.microsoft.com/office/powerpoint/2010/main" Requires="p14">
       <p:transition spd="slow" p14:dur="2000"/>
     </mc:Choice>
-    <mc:Fallback xmlns="">
+    <mc:Fallback>
       <p:transition xmlns:p14="http://schemas.microsoft.com/office/powerpoint/2010/main" spd="slow"/>
     </mc:Fallback>
   </mc:AlternateContent>
@@ -8950,11 +8951,11 @@
   <p:clrMapOvr>
     <a:masterClrMapping/>
   </p:clrMapOvr>
-  <mc:AlternateContent xmlns:mc="http://schemas.openxmlformats.org/markup-compatibility/2006" xmlns:p14="http://schemas.microsoft.com/office/powerpoint/2010/main">
-    <mc:Choice Requires="p14">
+  <mc:AlternateContent xmlns:mc="http://schemas.openxmlformats.org/markup-compatibility/2006">
+    <mc:Choice xmlns:p14="http://schemas.microsoft.com/office/powerpoint/2010/main" Requires="p14">
       <p:transition spd="slow" p14:dur="2000"/>
     </mc:Choice>
-    <mc:Fallback xmlns="">
+    <mc:Fallback>
       <p:transition xmlns:p14="http://schemas.microsoft.com/office/powerpoint/2010/main" spd="slow"/>
     </mc:Fallback>
   </mc:AlternateContent>
@@ -9454,11 +9455,11 @@
   <p:clrMapOvr>
     <a:masterClrMapping/>
   </p:clrMapOvr>
-  <mc:AlternateContent xmlns:mc="http://schemas.openxmlformats.org/markup-compatibility/2006" xmlns:p14="http://schemas.microsoft.com/office/powerpoint/2010/main">
-    <mc:Choice Requires="p14">
+  <mc:AlternateContent xmlns:mc="http://schemas.openxmlformats.org/markup-compatibility/2006">
+    <mc:Choice xmlns:p14="http://schemas.microsoft.com/office/powerpoint/2010/main" Requires="p14">
       <p:transition spd="slow" p14:dur="2000"/>
     </mc:Choice>
-    <mc:Fallback xmlns="">
+    <mc:Fallback>
       <p:transition xmlns:p14="http://schemas.microsoft.com/office/powerpoint/2010/main" spd="slow"/>
     </mc:Fallback>
   </mc:AlternateContent>
@@ -9666,11 +9667,11 @@
   <p:clrMapOvr>
     <a:masterClrMapping/>
   </p:clrMapOvr>
-  <mc:AlternateContent xmlns:mc="http://schemas.openxmlformats.org/markup-compatibility/2006" xmlns:p14="http://schemas.microsoft.com/office/powerpoint/2010/main">
-    <mc:Choice Requires="p14">
+  <mc:AlternateContent xmlns:mc="http://schemas.openxmlformats.org/markup-compatibility/2006">
+    <mc:Choice xmlns:p14="http://schemas.microsoft.com/office/powerpoint/2010/main" Requires="p14">
       <p:transition spd="slow" p14:dur="2000"/>
     </mc:Choice>
-    <mc:Fallback xmlns="">
+    <mc:Fallback>
       <p:transition xmlns:p14="http://schemas.microsoft.com/office/powerpoint/2010/main" spd="slow"/>
     </mc:Fallback>
   </mc:AlternateContent>
@@ -9881,11 +9882,11 @@
   <p:clrMapOvr>
     <a:masterClrMapping/>
   </p:clrMapOvr>
-  <mc:AlternateContent xmlns:mc="http://schemas.openxmlformats.org/markup-compatibility/2006" xmlns:p14="http://schemas.microsoft.com/office/powerpoint/2010/main">
-    <mc:Choice Requires="p14">
+  <mc:AlternateContent xmlns:mc="http://schemas.openxmlformats.org/markup-compatibility/2006">
+    <mc:Choice xmlns:p14="http://schemas.microsoft.com/office/powerpoint/2010/main" Requires="p14">
       <p:transition spd="slow" p14:dur="2000"/>
     </mc:Choice>
-    <mc:Fallback xmlns="">
+    <mc:Fallback>
       <p:transition xmlns:p14="http://schemas.microsoft.com/office/powerpoint/2010/main" spd="slow"/>
     </mc:Fallback>
   </mc:AlternateContent>
@@ -10027,11 +10028,11 @@
   <p:clrMapOvr>
     <a:masterClrMapping/>
   </p:clrMapOvr>
-  <mc:AlternateContent xmlns:mc="http://schemas.openxmlformats.org/markup-compatibility/2006" xmlns:p14="http://schemas.microsoft.com/office/powerpoint/2010/main">
-    <mc:Choice Requires="p14">
+  <mc:AlternateContent xmlns:mc="http://schemas.openxmlformats.org/markup-compatibility/2006">
+    <mc:Choice xmlns:p14="http://schemas.microsoft.com/office/powerpoint/2010/main" Requires="p14">
       <p:transition spd="slow" p14:dur="2000"/>
     </mc:Choice>
-    <mc:Fallback xmlns="">
+    <mc:Fallback>
       <p:transition xmlns:p14="http://schemas.microsoft.com/office/powerpoint/2010/main" spd="slow"/>
     </mc:Fallback>
   </mc:AlternateContent>
@@ -10181,11 +10182,11 @@
   <p:clrMapOvr>
     <a:masterClrMapping/>
   </p:clrMapOvr>
-  <mc:AlternateContent xmlns:mc="http://schemas.openxmlformats.org/markup-compatibility/2006" xmlns:p14="http://schemas.microsoft.com/office/powerpoint/2010/main">
-    <mc:Choice Requires="p14">
+  <mc:AlternateContent xmlns:mc="http://schemas.openxmlformats.org/markup-compatibility/2006">
+    <mc:Choice xmlns:p14="http://schemas.microsoft.com/office/powerpoint/2010/main" Requires="p14">
       <p:transition spd="slow" p14:dur="2000"/>
     </mc:Choice>
-    <mc:Fallback xmlns="">
+    <mc:Fallback>
       <p:transition xmlns:p14="http://schemas.microsoft.com/office/powerpoint/2010/main" spd="slow"/>
     </mc:Fallback>
   </mc:AlternateContent>
@@ -10279,11 +10280,11 @@
   <p:clrMapOvr>
     <a:masterClrMapping/>
   </p:clrMapOvr>
-  <mc:AlternateContent xmlns:mc="http://schemas.openxmlformats.org/markup-compatibility/2006" xmlns:p14="http://schemas.microsoft.com/office/powerpoint/2010/main">
-    <mc:Choice Requires="p14">
+  <mc:AlternateContent xmlns:mc="http://schemas.openxmlformats.org/markup-compatibility/2006">
+    <mc:Choice xmlns:p14="http://schemas.microsoft.com/office/powerpoint/2010/main" Requires="p14">
       <p:transition spd="slow" p14:dur="2000"/>
     </mc:Choice>
-    <mc:Fallback xmlns="">
+    <mc:Fallback>
       <p:transition xmlns:p14="http://schemas.microsoft.com/office/powerpoint/2010/main" spd="slow"/>
     </mc:Fallback>
   </mc:AlternateContent>
@@ -10437,11 +10438,11 @@
   <p:clrMapOvr>
     <a:masterClrMapping/>
   </p:clrMapOvr>
-  <mc:AlternateContent xmlns:mc="http://schemas.openxmlformats.org/markup-compatibility/2006" xmlns:p14="http://schemas.microsoft.com/office/powerpoint/2010/main">
-    <mc:Choice Requires="p14">
+  <mc:AlternateContent xmlns:mc="http://schemas.openxmlformats.org/markup-compatibility/2006">
+    <mc:Choice xmlns:p14="http://schemas.microsoft.com/office/powerpoint/2010/main" Requires="p14">
       <p:transition spd="slow" p14:dur="2000"/>
     </mc:Choice>
-    <mc:Fallback xmlns="">
+    <mc:Fallback>
       <p:transition xmlns:p14="http://schemas.microsoft.com/office/powerpoint/2010/main" spd="slow"/>
     </mc:Fallback>
   </mc:AlternateContent>
@@ -10597,11 +10598,11 @@
   <p:clrMapOvr>
     <a:masterClrMapping/>
   </p:clrMapOvr>
-  <mc:AlternateContent xmlns:mc="http://schemas.openxmlformats.org/markup-compatibility/2006" xmlns:p14="http://schemas.microsoft.com/office/powerpoint/2010/main">
-    <mc:Choice Requires="p14">
+  <mc:AlternateContent xmlns:mc="http://schemas.openxmlformats.org/markup-compatibility/2006">
+    <mc:Choice xmlns:p14="http://schemas.microsoft.com/office/powerpoint/2010/main" Requires="p14">
       <p:transition spd="slow" p14:dur="2000"/>
     </mc:Choice>
-    <mc:Fallback xmlns="">
+    <mc:Fallback>
       <p:transition xmlns:p14="http://schemas.microsoft.com/office/powerpoint/2010/main" spd="slow"/>
     </mc:Fallback>
   </mc:AlternateContent>
@@ -10819,11 +10820,11 @@
   <p:clrMapOvr>
     <a:masterClrMapping/>
   </p:clrMapOvr>
-  <mc:AlternateContent xmlns:mc="http://schemas.openxmlformats.org/markup-compatibility/2006" xmlns:p14="http://schemas.microsoft.com/office/powerpoint/2010/main">
-    <mc:Choice Requires="p14">
+  <mc:AlternateContent xmlns:mc="http://schemas.openxmlformats.org/markup-compatibility/2006">
+    <mc:Choice xmlns:p14="http://schemas.microsoft.com/office/powerpoint/2010/main" Requires="p14">
       <p:transition spd="slow" p14:dur="2000"/>
     </mc:Choice>
-    <mc:Fallback xmlns="">
+    <mc:Fallback>
       <p:transition xmlns:p14="http://schemas.microsoft.com/office/powerpoint/2010/main" spd="slow"/>
     </mc:Fallback>
   </mc:AlternateContent>
@@ -10929,11 +10930,11 @@
   <p:clrMapOvr>
     <a:masterClrMapping/>
   </p:clrMapOvr>
-  <mc:AlternateContent xmlns:mc="http://schemas.openxmlformats.org/markup-compatibility/2006" xmlns:p14="http://schemas.microsoft.com/office/powerpoint/2010/main">
-    <mc:Choice Requires="p14">
+  <mc:AlternateContent xmlns:mc="http://schemas.openxmlformats.org/markup-compatibility/2006">
+    <mc:Choice xmlns:p14="http://schemas.microsoft.com/office/powerpoint/2010/main" Requires="p14">
       <p:transition spd="slow" p14:dur="2000"/>
     </mc:Choice>
-    <mc:Fallback xmlns="">
+    <mc:Fallback>
       <p:transition xmlns:p14="http://schemas.microsoft.com/office/powerpoint/2010/main" spd="slow"/>
     </mc:Fallback>
   </mc:AlternateContent>
@@ -12141,11 +12142,11 @@
   <p:clrMapOvr>
     <a:masterClrMapping/>
   </p:clrMapOvr>
-  <mc:AlternateContent xmlns:mc="http://schemas.openxmlformats.org/markup-compatibility/2006" xmlns:p14="http://schemas.microsoft.com/office/powerpoint/2010/main">
-    <mc:Choice Requires="p14">
+  <mc:AlternateContent xmlns:mc="http://schemas.openxmlformats.org/markup-compatibility/2006">
+    <mc:Choice xmlns:p14="http://schemas.microsoft.com/office/powerpoint/2010/main" Requires="p14">
       <p:transition spd="slow" p14:dur="2000"/>
     </mc:Choice>
-    <mc:Fallback xmlns="">
+    <mc:Fallback>
       <p:transition xmlns:p14="http://schemas.microsoft.com/office/powerpoint/2010/main" spd="slow"/>
     </mc:Fallback>
   </mc:AlternateContent>
@@ -12692,11 +12693,11 @@
   <p:clrMapOvr>
     <a:masterClrMapping/>
   </p:clrMapOvr>
-  <mc:AlternateContent xmlns:mc="http://schemas.openxmlformats.org/markup-compatibility/2006" xmlns:p14="http://schemas.microsoft.com/office/powerpoint/2010/main">
-    <mc:Choice Requires="p14">
+  <mc:AlternateContent xmlns:mc="http://schemas.openxmlformats.org/markup-compatibility/2006">
+    <mc:Choice xmlns:p14="http://schemas.microsoft.com/office/powerpoint/2010/main" Requires="p14">
       <p:transition spd="slow" p14:dur="2000"/>
     </mc:Choice>
-    <mc:Fallback xmlns="">
+    <mc:Fallback>
       <p:transition xmlns:p14="http://schemas.microsoft.com/office/powerpoint/2010/main" spd="slow"/>
     </mc:Fallback>
   </mc:AlternateContent>
@@ -12972,11 +12973,11 @@
   <p:clrMapOvr>
     <a:masterClrMapping/>
   </p:clrMapOvr>
-  <mc:AlternateContent xmlns:mc="http://schemas.openxmlformats.org/markup-compatibility/2006" xmlns:p14="http://schemas.microsoft.com/office/powerpoint/2010/main">
-    <mc:Choice Requires="p14">
+  <mc:AlternateContent xmlns:mc="http://schemas.openxmlformats.org/markup-compatibility/2006">
+    <mc:Choice xmlns:p14="http://schemas.microsoft.com/office/powerpoint/2010/main" Requires="p14">
       <p:transition spd="slow" p14:dur="2000"/>
     </mc:Choice>
-    <mc:Fallback xmlns="">
+    <mc:Fallback>
       <p:transition xmlns:p14="http://schemas.microsoft.com/office/powerpoint/2010/main" spd="slow"/>
     </mc:Fallback>
   </mc:AlternateContent>
@@ -13100,11 +13101,11 @@
   <p:clrMapOvr>
     <a:masterClrMapping/>
   </p:clrMapOvr>
-  <mc:AlternateContent xmlns:mc="http://schemas.openxmlformats.org/markup-compatibility/2006" xmlns:p14="http://schemas.microsoft.com/office/powerpoint/2010/main">
-    <mc:Choice Requires="p14">
+  <mc:AlternateContent xmlns:mc="http://schemas.openxmlformats.org/markup-compatibility/2006">
+    <mc:Choice xmlns:p14="http://schemas.microsoft.com/office/powerpoint/2010/main" Requires="p14">
       <p:transition spd="slow" p14:dur="2000"/>
     </mc:Choice>
-    <mc:Fallback xmlns="">
+    <mc:Fallback>
       <p:transition xmlns:p14="http://schemas.microsoft.com/office/powerpoint/2010/main" spd="slow"/>
     </mc:Fallback>
   </mc:AlternateContent>
@@ -13336,11 +13337,11 @@
   <p:clrMapOvr>
     <a:masterClrMapping/>
   </p:clrMapOvr>
-  <mc:AlternateContent xmlns:mc="http://schemas.openxmlformats.org/markup-compatibility/2006" xmlns:p14="http://schemas.microsoft.com/office/powerpoint/2010/main">
-    <mc:Choice Requires="p14">
+  <mc:AlternateContent xmlns:mc="http://schemas.openxmlformats.org/markup-compatibility/2006">
+    <mc:Choice xmlns:p14="http://schemas.microsoft.com/office/powerpoint/2010/main" Requires="p14">
       <p:transition spd="slow" p14:dur="2000"/>
     </mc:Choice>
-    <mc:Fallback xmlns="">
+    <mc:Fallback>
       <p:transition xmlns:p14="http://schemas.microsoft.com/office/powerpoint/2010/main" spd="slow"/>
     </mc:Fallback>
   </mc:AlternateContent>
@@ -13355,7 +13356,7 @@
 </file>
 
 <file path=ppt/slides/slide36.xml><?xml version="1.0" encoding="utf-8"?>
-<p:sld xmlns:a="http://schemas.openxmlformats.org/drawingml/2006/main" xmlns:r="http://schemas.openxmlformats.org/officeDocument/2006/relationships" xmlns:p="http://schemas.openxmlformats.org/presentationml/2006/main" show="0">
+<p:sld xmlns:a="http://schemas.openxmlformats.org/drawingml/2006/main" xmlns:r="http://schemas.openxmlformats.org/officeDocument/2006/relationships" xmlns:p="http://schemas.openxmlformats.org/presentationml/2006/main">
   <p:cSld>
     <p:spTree>
       <p:nvGrpSpPr>
@@ -13645,11 +13646,11 @@
   <p:clrMapOvr>
     <a:masterClrMapping/>
   </p:clrMapOvr>
-  <mc:AlternateContent xmlns:mc="http://schemas.openxmlformats.org/markup-compatibility/2006" xmlns:p14="http://schemas.microsoft.com/office/powerpoint/2010/main">
-    <mc:Choice Requires="p14">
+  <mc:AlternateContent xmlns:mc="http://schemas.openxmlformats.org/markup-compatibility/2006">
+    <mc:Choice xmlns:p14="http://schemas.microsoft.com/office/powerpoint/2010/main" Requires="p14">
       <p:transition spd="slow" p14:dur="2000"/>
     </mc:Choice>
-    <mc:Fallback xmlns="">
+    <mc:Fallback>
       <p:transition xmlns:p14="http://schemas.microsoft.com/office/powerpoint/2010/main" spd="slow"/>
     </mc:Fallback>
   </mc:AlternateContent>
@@ -13879,11 +13880,11 @@
   <p:clrMapOvr>
     <a:masterClrMapping/>
   </p:clrMapOvr>
-  <mc:AlternateContent xmlns:mc="http://schemas.openxmlformats.org/markup-compatibility/2006" xmlns:p14="http://schemas.microsoft.com/office/powerpoint/2010/main">
-    <mc:Choice Requires="p14">
+  <mc:AlternateContent xmlns:mc="http://schemas.openxmlformats.org/markup-compatibility/2006">
+    <mc:Choice xmlns:p14="http://schemas.microsoft.com/office/powerpoint/2010/main" Requires="p14">
       <p:transition spd="slow" p14:dur="2000"/>
     </mc:Choice>
-    <mc:Fallback xmlns="">
+    <mc:Fallback>
       <p:transition xmlns:p14="http://schemas.microsoft.com/office/powerpoint/2010/main" spd="slow"/>
     </mc:Fallback>
   </mc:AlternateContent>
@@ -13978,11 +13979,11 @@
   <p:clrMapOvr>
     <a:masterClrMapping/>
   </p:clrMapOvr>
-  <mc:AlternateContent xmlns:mc="http://schemas.openxmlformats.org/markup-compatibility/2006" xmlns:p14="http://schemas.microsoft.com/office/powerpoint/2010/main">
-    <mc:Choice Requires="p14">
+  <mc:AlternateContent xmlns:mc="http://schemas.openxmlformats.org/markup-compatibility/2006">
+    <mc:Choice xmlns:p14="http://schemas.microsoft.com/office/powerpoint/2010/main" Requires="p14">
       <p:transition spd="slow" p14:dur="2000"/>
     </mc:Choice>
-    <mc:Fallback xmlns="">
+    <mc:Fallback>
       <p:transition xmlns:p14="http://schemas.microsoft.com/office/powerpoint/2010/main" spd="slow"/>
     </mc:Fallback>
   </mc:AlternateContent>
@@ -14113,11 +14114,11 @@
   <p:clrMapOvr>
     <a:masterClrMapping/>
   </p:clrMapOvr>
-  <mc:AlternateContent xmlns:mc="http://schemas.openxmlformats.org/markup-compatibility/2006" xmlns:p14="http://schemas.microsoft.com/office/powerpoint/2010/main">
-    <mc:Choice Requires="p14">
+  <mc:AlternateContent xmlns:mc="http://schemas.openxmlformats.org/markup-compatibility/2006">
+    <mc:Choice xmlns:p14="http://schemas.microsoft.com/office/powerpoint/2010/main" Requires="p14">
       <p:transition spd="slow" p14:dur="2000"/>
     </mc:Choice>
-    <mc:Fallback xmlns="">
+    <mc:Fallback>
       <p:transition xmlns:p14="http://schemas.microsoft.com/office/powerpoint/2010/main" spd="slow"/>
     </mc:Fallback>
   </mc:AlternateContent>
@@ -14509,11 +14510,11 @@
   <p:clrMapOvr>
     <a:masterClrMapping/>
   </p:clrMapOvr>
-  <mc:AlternateContent xmlns:mc="http://schemas.openxmlformats.org/markup-compatibility/2006" xmlns:p14="http://schemas.microsoft.com/office/powerpoint/2010/main">
-    <mc:Choice Requires="p14">
+  <mc:AlternateContent xmlns:mc="http://schemas.openxmlformats.org/markup-compatibility/2006">
+    <mc:Choice xmlns:p14="http://schemas.microsoft.com/office/powerpoint/2010/main" Requires="p14">
       <p:transition spd="slow" p14:dur="2000"/>
     </mc:Choice>
-    <mc:Fallback xmlns="">
+    <mc:Fallback>
       <p:transition xmlns:p14="http://schemas.microsoft.com/office/powerpoint/2010/main" spd="slow"/>
     </mc:Fallback>
   </mc:AlternateContent>
@@ -14669,11 +14670,11 @@
   <p:clrMapOvr>
     <a:masterClrMapping/>
   </p:clrMapOvr>
-  <mc:AlternateContent xmlns:mc="http://schemas.openxmlformats.org/markup-compatibility/2006" xmlns:p14="http://schemas.microsoft.com/office/powerpoint/2010/main">
-    <mc:Choice Requires="p14">
+  <mc:AlternateContent xmlns:mc="http://schemas.openxmlformats.org/markup-compatibility/2006">
+    <mc:Choice xmlns:p14="http://schemas.microsoft.com/office/powerpoint/2010/main" Requires="p14">
       <p:transition spd="slow" p14:dur="2000"/>
     </mc:Choice>
-    <mc:Fallback xmlns="">
+    <mc:Fallback>
       <p:transition xmlns:p14="http://schemas.microsoft.com/office/powerpoint/2010/main" spd="slow"/>
     </mc:Fallback>
   </mc:AlternateContent>
@@ -15297,11 +15298,11 @@
   <p:clrMapOvr>
     <a:masterClrMapping/>
   </p:clrMapOvr>
-  <mc:AlternateContent xmlns:mc="http://schemas.openxmlformats.org/markup-compatibility/2006" xmlns:p14="http://schemas.microsoft.com/office/powerpoint/2010/main">
-    <mc:Choice Requires="p14">
+  <mc:AlternateContent xmlns:mc="http://schemas.openxmlformats.org/markup-compatibility/2006">
+    <mc:Choice xmlns:p14="http://schemas.microsoft.com/office/powerpoint/2010/main" Requires="p14">
       <p:transition spd="slow" p14:dur="2000"/>
     </mc:Choice>
-    <mc:Fallback xmlns="">
+    <mc:Fallback>
       <p:transition xmlns:p14="http://schemas.microsoft.com/office/powerpoint/2010/main" spd="slow"/>
     </mc:Fallback>
   </mc:AlternateContent>
@@ -15778,11 +15779,11 @@
   <p:clrMapOvr>
     <a:masterClrMapping/>
   </p:clrMapOvr>
-  <mc:AlternateContent xmlns:mc="http://schemas.openxmlformats.org/markup-compatibility/2006" xmlns:p14="http://schemas.microsoft.com/office/powerpoint/2010/main">
-    <mc:Choice Requires="p14">
+  <mc:AlternateContent xmlns:mc="http://schemas.openxmlformats.org/markup-compatibility/2006">
+    <mc:Choice xmlns:p14="http://schemas.microsoft.com/office/powerpoint/2010/main" Requires="p14">
       <p:transition spd="slow" p14:dur="2000"/>
     </mc:Choice>
-    <mc:Fallback xmlns="">
+    <mc:Fallback>
       <p:transition xmlns:p14="http://schemas.microsoft.com/office/powerpoint/2010/main" spd="slow"/>
     </mc:Fallback>
   </mc:AlternateContent>
@@ -16710,11 +16711,11 @@
   <p:clrMapOvr>
     <a:masterClrMapping/>
   </p:clrMapOvr>
-  <mc:AlternateContent xmlns:mc="http://schemas.openxmlformats.org/markup-compatibility/2006" xmlns:p14="http://schemas.microsoft.com/office/powerpoint/2010/main">
-    <mc:Choice Requires="p14">
+  <mc:AlternateContent xmlns:mc="http://schemas.openxmlformats.org/markup-compatibility/2006">
+    <mc:Choice xmlns:p14="http://schemas.microsoft.com/office/powerpoint/2010/main" Requires="p14">
       <p:transition spd="slow" p14:dur="2000"/>
     </mc:Choice>
-    <mc:Fallback xmlns="">
+    <mc:Fallback>
       <p:transition xmlns:p14="http://schemas.microsoft.com/office/powerpoint/2010/main" spd="slow"/>
     </mc:Fallback>
   </mc:AlternateContent>
@@ -16767,7 +16768,11 @@
           <a:p>
             <a:r>
               <a:rPr lang="en-US" dirty="0" smtClean="0"/>
-              <a:t>Coalesced Access</a:t>
+              <a:t>Coalesced </a:t>
+            </a:r>
+            <a:r>
+              <a:rPr lang="en-US" dirty="0" smtClean="0"/>
+              <a:t>Memory Access</a:t>
             </a:r>
             <a:endParaRPr lang="en-US" dirty="0"/>
           </a:p>
@@ -21306,7 +21311,7 @@
             </a:pPr>
             <a:r>
               <a:rPr lang="en-GB" sz="4000" dirty="0" smtClean="0"/>
-              <a:t>Coalescence</a:t>
+              <a:t>Memory Access Coalescence</a:t>
             </a:r>
             <a:endParaRPr sz="4000" dirty="0"/>
           </a:p>
@@ -21345,8 +21350,12 @@
               </a:defRPr>
             </a:pPr>
             <a:r>
+              <a:rPr sz="2400" b="1" dirty="0"/>
+              <a:t>Coalesce</a:t>
+            </a:r>
+            <a:r>
               <a:rPr sz="2400" dirty="0"/>
-              <a:t>Coalesce - to combine into </a:t>
+              <a:t> - to combine into </a:t>
             </a:r>
             <a:r>
               <a:rPr sz="2400" dirty="0" smtClean="0"/>
@@ -22029,11 +22038,11 @@
   <p:clrMapOvr>
     <a:masterClrMapping/>
   </p:clrMapOvr>
-  <mc:AlternateContent xmlns:mc="http://schemas.openxmlformats.org/markup-compatibility/2006" xmlns:p14="http://schemas.microsoft.com/office/powerpoint/2010/main">
-    <mc:Choice Requires="p14">
+  <mc:AlternateContent xmlns:mc="http://schemas.openxmlformats.org/markup-compatibility/2006">
+    <mc:Choice xmlns:p14="http://schemas.microsoft.com/office/powerpoint/2010/main" Requires="p14">
       <p:transition spd="slow" p14:dur="2000"/>
     </mc:Choice>
-    <mc:Fallback xmlns="">
+    <mc:Fallback>
       <p:transition xmlns:p14="http://schemas.microsoft.com/office/powerpoint/2010/main" spd="slow"/>
     </mc:Fallback>
   </mc:AlternateContent>
@@ -24768,11 +24777,11 @@
   <p:clrMapOvr>
     <a:masterClrMapping/>
   </p:clrMapOvr>
-  <mc:AlternateContent xmlns:mc="http://schemas.openxmlformats.org/markup-compatibility/2006" xmlns:p14="http://schemas.microsoft.com/office/powerpoint/2010/main">
-    <mc:Choice Requires="p14">
+  <mc:AlternateContent xmlns:mc="http://schemas.openxmlformats.org/markup-compatibility/2006">
+    <mc:Choice xmlns:p14="http://schemas.microsoft.com/office/powerpoint/2010/main" Requires="p14">
       <p:transition spd="slow" p14:dur="2000"/>
     </mc:Choice>
-    <mc:Fallback xmlns="">
+    <mc:Fallback>
       <p:transition xmlns:p14="http://schemas.microsoft.com/office/powerpoint/2010/main" spd="slow"/>
     </mc:Fallback>
   </mc:AlternateContent>
@@ -36905,11 +36914,11 @@
   <p:clrMapOvr>
     <a:masterClrMapping/>
   </p:clrMapOvr>
-  <mc:AlternateContent xmlns:mc="http://schemas.openxmlformats.org/markup-compatibility/2006" xmlns:p14="http://schemas.microsoft.com/office/powerpoint/2010/main">
-    <mc:Choice Requires="p14">
+  <mc:AlternateContent xmlns:mc="http://schemas.openxmlformats.org/markup-compatibility/2006">
+    <mc:Choice xmlns:p14="http://schemas.microsoft.com/office/powerpoint/2010/main" Requires="p14">
       <p:transition spd="slow" p14:dur="2000"/>
     </mc:Choice>
-    <mc:Fallback xmlns="">
+    <mc:Fallback>
       <p:transition xmlns:p14="http://schemas.microsoft.com/office/powerpoint/2010/main" spd="slow"/>
     </mc:Fallback>
   </mc:AlternateContent>
@@ -37429,7 +37438,23 @@
             </a:pPr>
             <a:r>
               <a:rPr lang="en-GB" dirty="0" smtClean="0"/>
-              <a:t>Work-group sizes being a power of 2 helps on most architectures. At a minimum:</a:t>
+              <a:t>Work-group sizes </a:t>
+            </a:r>
+            <a:r>
+              <a:rPr lang="en-GB" dirty="0" smtClean="0"/>
+              <a:t>that are </a:t>
+            </a:r>
+            <a:r>
+              <a:rPr lang="en-GB" dirty="0" smtClean="0"/>
+              <a:t>a power of 2 </a:t>
+            </a:r>
+            <a:r>
+              <a:rPr lang="en-GB" dirty="0" smtClean="0"/>
+              <a:t>help </a:t>
+            </a:r>
+            <a:r>
+              <a:rPr lang="en-GB" dirty="0" smtClean="0"/>
+              <a:t>on most architectures. At a minimum:</a:t>
             </a:r>
           </a:p>
           <a:p>
@@ -38184,11 +38209,11 @@
   <p:clrMapOvr>
     <a:masterClrMapping/>
   </p:clrMapOvr>
-  <mc:AlternateContent xmlns:mc="http://schemas.openxmlformats.org/markup-compatibility/2006" xmlns:p14="http://schemas.microsoft.com/office/powerpoint/2010/main">
-    <mc:Choice Requires="p14">
+  <mc:AlternateContent xmlns:mc="http://schemas.openxmlformats.org/markup-compatibility/2006">
+    <mc:Choice xmlns:p14="http://schemas.microsoft.com/office/powerpoint/2010/main" Requires="p14">
       <p:transition spd="slow" p14:dur="2000"/>
     </mc:Choice>
-    <mc:Fallback xmlns="">
+    <mc:Fallback>
       <p:transition xmlns:p14="http://schemas.microsoft.com/office/powerpoint/2010/main" spd="slow"/>
     </mc:Fallback>
   </mc:AlternateContent>
@@ -38591,11 +38616,11 @@
   <p:clrMapOvr>
     <a:masterClrMapping/>
   </p:clrMapOvr>
-  <mc:AlternateContent xmlns:mc="http://schemas.openxmlformats.org/markup-compatibility/2006" xmlns:p14="http://schemas.microsoft.com/office/powerpoint/2010/main">
-    <mc:Choice Requires="p14">
+  <mc:AlternateContent xmlns:mc="http://schemas.openxmlformats.org/markup-compatibility/2006">
+    <mc:Choice xmlns:p14="http://schemas.microsoft.com/office/powerpoint/2010/main" Requires="p14">
       <p:transition spd="slow" p14:dur="2000"/>
     </mc:Choice>
-    <mc:Fallback xmlns="">
+    <mc:Fallback>
       <p:transition xmlns:p14="http://schemas.microsoft.com/office/powerpoint/2010/main" spd="slow"/>
     </mc:Fallback>
   </mc:AlternateContent>
@@ -39024,7 +39049,15 @@
           <a:p>
             <a:r>
               <a:rPr lang="en-GB" dirty="0" smtClean="0"/>
-              <a:t>Barriers between memory access-heavy kernel code sections might actually speed it up by improving the cache behaviour</a:t>
+              <a:t>Barriers between memory access-heavy kernel code sections might actually speed </a:t>
+            </a:r>
+            <a:r>
+              <a:rPr lang="en-GB" dirty="0" smtClean="0"/>
+              <a:t>up your code by </a:t>
+            </a:r>
+            <a:r>
+              <a:rPr lang="en-GB" dirty="0" smtClean="0"/>
+              <a:t>improving the cache behaviour</a:t>
             </a:r>
           </a:p>
           <a:p>
@@ -41169,11 +41202,11 @@
   <p:clrMapOvr>
     <a:masterClrMapping/>
   </p:clrMapOvr>
-  <mc:AlternateContent xmlns:mc="http://schemas.openxmlformats.org/markup-compatibility/2006" xmlns:p14="http://schemas.microsoft.com/office/powerpoint/2010/main">
-    <mc:Choice Requires="p14">
+  <mc:AlternateContent xmlns:mc="http://schemas.openxmlformats.org/markup-compatibility/2006">
+    <mc:Choice xmlns:p14="http://schemas.microsoft.com/office/powerpoint/2010/main" Requires="p14">
       <p:transition spd="slow" p14:dur="2000"/>
     </mc:Choice>
-    <mc:Fallback xmlns="">
+    <mc:Fallback>
       <p:transition xmlns:p14="http://schemas.microsoft.com/office/powerpoint/2010/main" spd="slow"/>
     </mc:Fallback>
   </mc:AlternateContent>
@@ -44471,11 +44504,11 @@
   <p:clrMapOvr>
     <a:masterClrMapping/>
   </p:clrMapOvr>
-  <mc:AlternateContent xmlns:mc="http://schemas.openxmlformats.org/markup-compatibility/2006" xmlns:p14="http://schemas.microsoft.com/office/powerpoint/2010/main">
-    <mc:Choice Requires="p14">
+  <mc:AlternateContent xmlns:mc="http://schemas.openxmlformats.org/markup-compatibility/2006">
+    <mc:Choice xmlns:p14="http://schemas.microsoft.com/office/powerpoint/2010/main" Requires="p14">
       <p:transition spd="slow" p14:dur="2000"/>
     </mc:Choice>
-    <mc:Fallback xmlns="">
+    <mc:Fallback>
       <p:transition xmlns:p14="http://schemas.microsoft.com/office/powerpoint/2010/main" spd="slow"/>
     </mc:Fallback>
   </mc:AlternateContent>
@@ -47938,11 +47971,11 @@
   <p:clrMapOvr>
     <a:masterClrMapping/>
   </p:clrMapOvr>
-  <mc:AlternateContent xmlns:mc="http://schemas.openxmlformats.org/markup-compatibility/2006" xmlns:p14="http://schemas.microsoft.com/office/powerpoint/2010/main">
-    <mc:Choice Requires="p14">
+  <mc:AlternateContent xmlns:mc="http://schemas.openxmlformats.org/markup-compatibility/2006">
+    <mc:Choice xmlns:p14="http://schemas.microsoft.com/office/powerpoint/2010/main" Requires="p14">
       <p:transition spd="slow" p14:dur="2000"/>
     </mc:Choice>
-    <mc:Fallback xmlns="">
+    <mc:Fallback>
       <p:transition xmlns:p14="http://schemas.microsoft.com/office/powerpoint/2010/main" spd="slow"/>
     </mc:Fallback>
   </mc:AlternateContent>
@@ -49188,12 +49221,8 @@
           <a:lstStyle/>
           <a:p>
             <a:r>
-              <a:rPr lang="en-GB" smtClean="0"/>
-              <a:t>Exercise: image </a:t>
-            </a:r>
-            <a:r>
               <a:rPr lang="en-GB" dirty="0" smtClean="0"/>
-              <a:t>types</a:t>
+              <a:t>Exercise: image types</a:t>
             </a:r>
             <a:endParaRPr lang="en-GB" dirty="0"/>
           </a:p>
@@ -49291,11 +49320,7 @@
           <a:p>
             <a:r>
               <a:rPr lang="en-GB" dirty="0" smtClean="0"/>
-              <a:t>Extra: try some other optimizations such as native </a:t>
-            </a:r>
-            <a:r>
-              <a:rPr lang="en-GB" dirty="0" smtClean="0"/>
-              <a:t>functions</a:t>
+              <a:t>Extra: try some other optimizations such as native functions</a:t>
             </a:r>
           </a:p>
           <a:p>
@@ -49371,6 +49396,254 @@
 </p:sld>
 </file>
 
+<file path=ppt/slides/slide82.xml><?xml version="1.0" encoding="utf-8"?>
+<p:sld xmlns:a="http://schemas.openxmlformats.org/drawingml/2006/main" xmlns:r="http://schemas.openxmlformats.org/officeDocument/2006/relationships" xmlns:p="http://schemas.openxmlformats.org/presentationml/2006/main">
+  <p:cSld>
+    <p:spTree>
+      <p:nvGrpSpPr>
+        <p:cNvPr id="1" name=""/>
+        <p:cNvGrpSpPr/>
+        <p:nvPr/>
+      </p:nvGrpSpPr>
+      <p:grpSpPr>
+        <a:xfrm>
+          <a:off x="0" y="0"/>
+          <a:ext cx="0" cy="0"/>
+          <a:chOff x="0" y="0"/>
+          <a:chExt cx="0" cy="0"/>
+        </a:xfrm>
+      </p:grpSpPr>
+      <p:sp>
+        <p:nvSpPr>
+          <p:cNvPr id="2" name="Title 1"/>
+          <p:cNvSpPr>
+            <a:spLocks noGrp="1"/>
+          </p:cNvSpPr>
+          <p:nvPr>
+            <p:ph type="title"/>
+          </p:nvPr>
+        </p:nvSpPr>
+        <p:spPr/>
+        <p:txBody>
+          <a:bodyPr/>
+          <a:lstStyle/>
+          <a:p>
+            <a:r>
+              <a:rPr lang="en-GB" dirty="0"/>
+              <a:t>Exercise: image types</a:t>
+            </a:r>
+            <a:endParaRPr lang="en-GB" dirty="0"/>
+          </a:p>
+        </p:txBody>
+      </p:sp>
+      <p:sp>
+        <p:nvSpPr>
+          <p:cNvPr id="3" name="Content Placeholder 2"/>
+          <p:cNvSpPr>
+            <a:spLocks noGrp="1"/>
+          </p:cNvSpPr>
+          <p:nvPr>
+            <p:ph idx="1"/>
+          </p:nvPr>
+        </p:nvSpPr>
+        <p:spPr>
+          <a:xfrm>
+            <a:off x="457200" y="1417638"/>
+            <a:ext cx="8229600" cy="5440362"/>
+          </a:xfrm>
+        </p:spPr>
+        <p:txBody>
+          <a:bodyPr>
+            <a:normAutofit fontScale="77500" lnSpcReduction="20000"/>
+          </a:bodyPr>
+          <a:lstStyle/>
+          <a:p>
+            <a:pPr marL="0" indent="0">
+              <a:buNone/>
+            </a:pPr>
+            <a:r>
+              <a:rPr lang="en-GB" dirty="0" smtClean="0"/>
+              <a:t>Results from 3 different versions (meta programming, optimised and images) on an </a:t>
+            </a:r>
+            <a:r>
+              <a:rPr lang="en-GB" dirty="0" err="1" smtClean="0"/>
+              <a:t>Nvidia</a:t>
+            </a:r>
+            <a:r>
+              <a:rPr lang="en-GB" dirty="0" smtClean="0"/>
+              <a:t> K40:</a:t>
+            </a:r>
+          </a:p>
+          <a:p>
+            <a:pPr marL="0" indent="0">
+              <a:buNone/>
+            </a:pPr>
+            <a:endParaRPr lang="en-GB" dirty="0" smtClean="0"/>
+          </a:p>
+          <a:p>
+            <a:pPr marL="0" indent="0">
+              <a:buNone/>
+            </a:pPr>
+            <a:r>
+              <a:rPr lang="en-GB" dirty="0"/>
+              <a:t>Running reference...</a:t>
+            </a:r>
+          </a:p>
+          <a:p>
+            <a:pPr marL="0" indent="0">
+              <a:buNone/>
+            </a:pPr>
+            <a:r>
+              <a:rPr lang="en-GB" dirty="0"/>
+              <a:t>Reference took 7784.3ms (1 frame)</a:t>
+            </a:r>
+          </a:p>
+          <a:p>
+            <a:pPr marL="0" indent="0">
+              <a:buNone/>
+            </a:pPr>
+            <a:endParaRPr lang="en-GB" dirty="0" smtClean="0"/>
+          </a:p>
+          <a:p>
+            <a:pPr marL="0" indent="0">
+              <a:buNone/>
+            </a:pPr>
+            <a:r>
+              <a:rPr lang="en-GB" dirty="0"/>
+              <a:t>~/IWOCL2016/solutions/Bilateral$ </a:t>
+            </a:r>
+            <a:r>
+              <a:rPr lang="en-GB" b="1" dirty="0"/>
+              <a:t>./</a:t>
+            </a:r>
+            <a:r>
+              <a:rPr lang="en-GB" b="1" dirty="0" err="1"/>
+              <a:t>bilateral_meta</a:t>
+            </a:r>
+            <a:r>
+              <a:rPr lang="en-GB" b="1" dirty="0"/>
+              <a:t> </a:t>
+            </a:r>
+          </a:p>
+          <a:p>
+            <a:pPr marL="0" indent="0">
+              <a:buNone/>
+            </a:pPr>
+            <a:r>
+              <a:rPr lang="en-GB" dirty="0" smtClean="0"/>
+              <a:t>OpenCL </a:t>
+            </a:r>
+            <a:r>
+              <a:rPr lang="en-GB" dirty="0"/>
+              <a:t>took 357.9ms (11.2ms / frame</a:t>
+            </a:r>
+            <a:r>
+              <a:rPr lang="en-GB" dirty="0" smtClean="0"/>
+              <a:t>)</a:t>
+            </a:r>
+            <a:endParaRPr lang="en-GB" dirty="0"/>
+          </a:p>
+          <a:p>
+            <a:pPr marL="0" indent="0">
+              <a:buNone/>
+            </a:pPr>
+            <a:endParaRPr lang="en-GB" dirty="0"/>
+          </a:p>
+          <a:p>
+            <a:pPr marL="0" indent="0">
+              <a:buNone/>
+            </a:pPr>
+            <a:r>
+              <a:rPr lang="en-GB" dirty="0"/>
+              <a:t>~/IWOCL2016/solutions/Bilateral$ </a:t>
+            </a:r>
+            <a:r>
+              <a:rPr lang="en-GB" b="1" dirty="0"/>
+              <a:t>./</a:t>
+            </a:r>
+            <a:r>
+              <a:rPr lang="en-GB" b="1" dirty="0" err="1"/>
+              <a:t>bilateral_opt</a:t>
+            </a:r>
+            <a:endParaRPr lang="en-GB" b="1" dirty="0"/>
+          </a:p>
+          <a:p>
+            <a:pPr marL="0" indent="0">
+              <a:buNone/>
+            </a:pPr>
+            <a:r>
+              <a:rPr lang="en-GB" dirty="0" smtClean="0"/>
+              <a:t>OpenCL </a:t>
+            </a:r>
+            <a:r>
+              <a:rPr lang="en-GB" dirty="0"/>
+              <a:t>took 74.0ms (2.3ms / frame</a:t>
+            </a:r>
+            <a:r>
+              <a:rPr lang="en-GB" dirty="0" smtClean="0"/>
+              <a:t>)</a:t>
+            </a:r>
+          </a:p>
+          <a:p>
+            <a:pPr marL="0" indent="0">
+              <a:buNone/>
+            </a:pPr>
+            <a:endParaRPr lang="en-GB" dirty="0"/>
+          </a:p>
+          <a:p>
+            <a:pPr marL="0" indent="0">
+              <a:buNone/>
+            </a:pPr>
+            <a:r>
+              <a:rPr lang="en-GB" dirty="0"/>
+              <a:t>~/IWOCL2016/solutions/Bilateral$ </a:t>
+            </a:r>
+            <a:r>
+              <a:rPr lang="en-GB" b="1" dirty="0"/>
+              <a:t>./</a:t>
+            </a:r>
+            <a:r>
+              <a:rPr lang="en-GB" b="1" dirty="0" err="1"/>
+              <a:t>bilateral_images</a:t>
+            </a:r>
+            <a:r>
+              <a:rPr lang="en-GB" b="1" dirty="0"/>
+              <a:t> </a:t>
+            </a:r>
+          </a:p>
+          <a:p>
+            <a:pPr marL="0" indent="0">
+              <a:buNone/>
+            </a:pPr>
+            <a:r>
+              <a:rPr lang="en-GB" dirty="0" smtClean="0"/>
+              <a:t>OpenCL </a:t>
+            </a:r>
+            <a:r>
+              <a:rPr lang="en-GB" dirty="0"/>
+              <a:t>took 41.8ms (1.3ms / frame</a:t>
+            </a:r>
+            <a:r>
+              <a:rPr lang="en-GB" dirty="0" smtClean="0"/>
+              <a:t>)</a:t>
+            </a:r>
+            <a:endParaRPr lang="en-GB" dirty="0"/>
+          </a:p>
+        </p:txBody>
+      </p:sp>
+    </p:spTree>
+    <p:extLst>
+      <p:ext uri="{BB962C8B-B14F-4D97-AF65-F5344CB8AC3E}">
+        <p14:creationId xmlns:p14="http://schemas.microsoft.com/office/powerpoint/2010/main" val="1664308935"/>
+      </p:ext>
+    </p:extLst>
+  </p:cSld>
+  <p:clrMapOvr>
+    <a:masterClrMapping/>
+  </p:clrMapOvr>
+</p:sld>
+</file>
+
 <file path=ppt/slides/slide9.xml><?xml version="1.0" encoding="utf-8"?>
 <p:sld xmlns:a="http://schemas.openxmlformats.org/drawingml/2006/main" xmlns:r="http://schemas.openxmlformats.org/officeDocument/2006/relationships" xmlns:p="http://schemas.openxmlformats.org/presentationml/2006/main" show="0">
   <p:cSld>
@@ -49655,11 +49928,11 @@
   <p:clrMapOvr>
     <a:masterClrMapping/>
   </p:clrMapOvr>
-  <mc:AlternateContent xmlns:mc="http://schemas.openxmlformats.org/markup-compatibility/2006" xmlns:p14="http://schemas.microsoft.com/office/powerpoint/2010/main">
-    <mc:Choice Requires="p14">
+  <mc:AlternateContent xmlns:mc="http://schemas.openxmlformats.org/markup-compatibility/2006">
+    <mc:Choice xmlns:p14="http://schemas.microsoft.com/office/powerpoint/2010/main" Requires="p14">
       <p:transition spd="slow" p14:dur="2000"/>
     </mc:Choice>
-    <mc:Fallback xmlns="">
+    <mc:Fallback>
       <p:transition xmlns:p14="http://schemas.microsoft.com/office/powerpoint/2010/main" spd="slow"/>
     </mc:Fallback>
   </mc:AlternateContent>

</xml_diff>

<commit_message>
Unhide detailed tools slides
</commit_message>
<xml_diff>
--- a/slides/advanced_part3.pptx
+++ b/slides/advanced_part3.pptx
@@ -273,7 +273,7 @@
           <a:p>
             <a:fld id="{154B9960-65DD-7948-AAE5-CA021B06E14D}" type="datetimeFigureOut">
               <a:rPr lang="en-US" smtClean="0"/>
-              <a:t>19/04/16</a:t>
+              <a:t>22/07/16</a:t>
             </a:fld>
             <a:endParaRPr lang="en-GB"/>
           </a:p>
@@ -3267,7 +3267,7 @@
           <a:p>
             <a:fld id="{D96F9273-1B51-1D4D-B007-2EA617412104}" type="datetimeFigureOut">
               <a:rPr lang="en-US" smtClean="0"/>
-              <a:t>19/04/16</a:t>
+              <a:t>22/07/16</a:t>
             </a:fld>
             <a:endParaRPr lang="en-GB"/>
           </a:p>
@@ -3437,7 +3437,7 @@
           <a:p>
             <a:fld id="{D96F9273-1B51-1D4D-B007-2EA617412104}" type="datetimeFigureOut">
               <a:rPr lang="en-US" smtClean="0"/>
-              <a:t>19/04/16</a:t>
+              <a:t>22/07/16</a:t>
             </a:fld>
             <a:endParaRPr lang="en-GB"/>
           </a:p>
@@ -3617,7 +3617,7 @@
           <a:p>
             <a:fld id="{D96F9273-1B51-1D4D-B007-2EA617412104}" type="datetimeFigureOut">
               <a:rPr lang="en-US" smtClean="0"/>
-              <a:t>19/04/16</a:t>
+              <a:t>22/07/16</a:t>
             </a:fld>
             <a:endParaRPr lang="en-GB"/>
           </a:p>
@@ -3787,7 +3787,7 @@
           <a:p>
             <a:fld id="{D96F9273-1B51-1D4D-B007-2EA617412104}" type="datetimeFigureOut">
               <a:rPr lang="en-US" smtClean="0"/>
-              <a:t>19/04/16</a:t>
+              <a:t>22/07/16</a:t>
             </a:fld>
             <a:endParaRPr lang="en-GB"/>
           </a:p>
@@ -4033,7 +4033,7 @@
           <a:p>
             <a:fld id="{D96F9273-1B51-1D4D-B007-2EA617412104}" type="datetimeFigureOut">
               <a:rPr lang="en-US" smtClean="0"/>
-              <a:t>19/04/16</a:t>
+              <a:t>22/07/16</a:t>
             </a:fld>
             <a:endParaRPr lang="en-GB"/>
           </a:p>
@@ -4321,7 +4321,7 @@
           <a:p>
             <a:fld id="{D96F9273-1B51-1D4D-B007-2EA617412104}" type="datetimeFigureOut">
               <a:rPr lang="en-US" smtClean="0"/>
-              <a:t>19/04/16</a:t>
+              <a:t>22/07/16</a:t>
             </a:fld>
             <a:endParaRPr lang="en-GB"/>
           </a:p>
@@ -4743,7 +4743,7 @@
           <a:p>
             <a:fld id="{D96F9273-1B51-1D4D-B007-2EA617412104}" type="datetimeFigureOut">
               <a:rPr lang="en-US" smtClean="0"/>
-              <a:t>19/04/16</a:t>
+              <a:t>22/07/16</a:t>
             </a:fld>
             <a:endParaRPr lang="en-GB"/>
           </a:p>
@@ -4861,7 +4861,7 @@
           <a:p>
             <a:fld id="{D96F9273-1B51-1D4D-B007-2EA617412104}" type="datetimeFigureOut">
               <a:rPr lang="en-US" smtClean="0"/>
-              <a:t>19/04/16</a:t>
+              <a:t>22/07/16</a:t>
             </a:fld>
             <a:endParaRPr lang="en-GB"/>
           </a:p>
@@ -4956,7 +4956,7 @@
           <a:p>
             <a:fld id="{D96F9273-1B51-1D4D-B007-2EA617412104}" type="datetimeFigureOut">
               <a:rPr lang="en-US" smtClean="0"/>
-              <a:t>19/04/16</a:t>
+              <a:t>22/07/16</a:t>
             </a:fld>
             <a:endParaRPr lang="en-GB"/>
           </a:p>
@@ -5233,7 +5233,7 @@
           <a:p>
             <a:fld id="{D96F9273-1B51-1D4D-B007-2EA617412104}" type="datetimeFigureOut">
               <a:rPr lang="en-US" smtClean="0"/>
-              <a:t>19/04/16</a:t>
+              <a:t>22/07/16</a:t>
             </a:fld>
             <a:endParaRPr lang="en-GB"/>
           </a:p>
@@ -5486,7 +5486,7 @@
           <a:p>
             <a:fld id="{D96F9273-1B51-1D4D-B007-2EA617412104}" type="datetimeFigureOut">
               <a:rPr lang="en-US" smtClean="0"/>
-              <a:t>19/04/16</a:t>
+              <a:t>22/07/16</a:t>
             </a:fld>
             <a:endParaRPr lang="en-GB"/>
           </a:p>
@@ -5699,7 +5699,7 @@
           <a:p>
             <a:fld id="{D96F9273-1B51-1D4D-B007-2EA617412104}" type="datetimeFigureOut">
               <a:rPr lang="en-US" smtClean="0"/>
-              <a:t>19/04/16</a:t>
+              <a:t>22/07/16</a:t>
             </a:fld>
             <a:endParaRPr lang="en-GB"/>
           </a:p>
@@ -7065,7 +7065,7 @@
 </file>
 
 <file path=ppt/slides/slide15.xml><?xml version="1.0" encoding="utf-8"?>
-<p:sld xmlns:a="http://schemas.openxmlformats.org/drawingml/2006/main" xmlns:r="http://schemas.openxmlformats.org/officeDocument/2006/relationships" xmlns:p="http://schemas.openxmlformats.org/presentationml/2006/main" show="0">
+<p:sld xmlns:a="http://schemas.openxmlformats.org/drawingml/2006/main" xmlns:r="http://schemas.openxmlformats.org/officeDocument/2006/relationships" xmlns:p="http://schemas.openxmlformats.org/presentationml/2006/main">
   <p:cSld>
     <p:spTree>
       <p:nvGrpSpPr>
@@ -7809,11 +7809,11 @@
   <p:clrMapOvr>
     <a:masterClrMapping/>
   </p:clrMapOvr>
-  <mc:AlternateContent xmlns:mc="http://schemas.openxmlformats.org/markup-compatibility/2006" xmlns:p14="http://schemas.microsoft.com/office/powerpoint/2010/main">
-    <mc:Choice Requires="p14">
+  <mc:AlternateContent xmlns:mc="http://schemas.openxmlformats.org/markup-compatibility/2006">
+    <mc:Choice xmlns:p14="http://schemas.microsoft.com/office/powerpoint/2010/main" Requires="p14">
       <p:transition spd="slow" p14:dur="2000"/>
     </mc:Choice>
-    <mc:Fallback xmlns="">
+    <mc:Fallback>
       <p:transition xmlns:p14="http://schemas.microsoft.com/office/powerpoint/2010/main" spd="slow"/>
     </mc:Fallback>
   </mc:AlternateContent>
@@ -7828,7 +7828,7 @@
 </file>
 
 <file path=ppt/slides/slide16.xml><?xml version="1.0" encoding="utf-8"?>
-<p:sld xmlns:a="http://schemas.openxmlformats.org/drawingml/2006/main" xmlns:r="http://schemas.openxmlformats.org/officeDocument/2006/relationships" xmlns:p="http://schemas.openxmlformats.org/presentationml/2006/main" show="0">
+<p:sld xmlns:a="http://schemas.openxmlformats.org/drawingml/2006/main" xmlns:r="http://schemas.openxmlformats.org/officeDocument/2006/relationships" xmlns:p="http://schemas.openxmlformats.org/presentationml/2006/main">
   <p:cSld>
     <p:spTree>
       <p:nvGrpSpPr>
@@ -8091,11 +8091,11 @@
   <p:clrMapOvr>
     <a:masterClrMapping/>
   </p:clrMapOvr>
-  <mc:AlternateContent xmlns:mc="http://schemas.openxmlformats.org/markup-compatibility/2006" xmlns:p14="http://schemas.microsoft.com/office/powerpoint/2010/main">
-    <mc:Choice Requires="p14">
+  <mc:AlternateContent xmlns:mc="http://schemas.openxmlformats.org/markup-compatibility/2006">
+    <mc:Choice xmlns:p14="http://schemas.microsoft.com/office/powerpoint/2010/main" Requires="p14">
       <p:transition spd="slow" p14:dur="2000"/>
     </mc:Choice>
-    <mc:Fallback xmlns="">
+    <mc:Fallback>
       <p:transition xmlns:p14="http://schemas.microsoft.com/office/powerpoint/2010/main" spd="slow"/>
     </mc:Fallback>
   </mc:AlternateContent>
@@ -8110,7 +8110,7 @@
 </file>
 
 <file path=ppt/slides/slide17.xml><?xml version="1.0" encoding="utf-8"?>
-<p:sld xmlns:a="http://schemas.openxmlformats.org/drawingml/2006/main" xmlns:r="http://schemas.openxmlformats.org/officeDocument/2006/relationships" xmlns:p="http://schemas.openxmlformats.org/presentationml/2006/main" show="0">
+<p:sld xmlns:a="http://schemas.openxmlformats.org/drawingml/2006/main" xmlns:r="http://schemas.openxmlformats.org/officeDocument/2006/relationships" xmlns:p="http://schemas.openxmlformats.org/presentationml/2006/main">
   <p:cSld>
     <p:spTree>
       <p:nvGrpSpPr>
@@ -8243,11 +8243,11 @@
   <p:clrMapOvr>
     <a:masterClrMapping/>
   </p:clrMapOvr>
-  <mc:AlternateContent xmlns:mc="http://schemas.openxmlformats.org/markup-compatibility/2006" xmlns:p14="http://schemas.microsoft.com/office/powerpoint/2010/main">
-    <mc:Choice Requires="p14">
+  <mc:AlternateContent xmlns:mc="http://schemas.openxmlformats.org/markup-compatibility/2006">
+    <mc:Choice xmlns:p14="http://schemas.microsoft.com/office/powerpoint/2010/main" Requires="p14">
       <p:transition spd="slow" p14:dur="2000"/>
     </mc:Choice>
-    <mc:Fallback xmlns="">
+    <mc:Fallback>
       <p:transition xmlns:p14="http://schemas.microsoft.com/office/powerpoint/2010/main" spd="slow"/>
     </mc:Fallback>
   </mc:AlternateContent>
@@ -8262,7 +8262,7 @@
 </file>
 
 <file path=ppt/slides/slide18.xml><?xml version="1.0" encoding="utf-8"?>
-<p:sld xmlns:a="http://schemas.openxmlformats.org/drawingml/2006/main" xmlns:r="http://schemas.openxmlformats.org/officeDocument/2006/relationships" xmlns:p="http://schemas.openxmlformats.org/presentationml/2006/main" show="0">
+<p:sld xmlns:a="http://schemas.openxmlformats.org/drawingml/2006/main" xmlns:r="http://schemas.openxmlformats.org/officeDocument/2006/relationships" xmlns:p="http://schemas.openxmlformats.org/presentationml/2006/main">
   <p:cSld>
     <p:spTree>
       <p:nvGrpSpPr>
@@ -8401,11 +8401,11 @@
   <p:clrMapOvr>
     <a:masterClrMapping/>
   </p:clrMapOvr>
-  <mc:AlternateContent xmlns:mc="http://schemas.openxmlformats.org/markup-compatibility/2006" xmlns:p14="http://schemas.microsoft.com/office/powerpoint/2010/main">
-    <mc:Choice Requires="p14">
+  <mc:AlternateContent xmlns:mc="http://schemas.openxmlformats.org/markup-compatibility/2006">
+    <mc:Choice xmlns:p14="http://schemas.microsoft.com/office/powerpoint/2010/main" Requires="p14">
       <p:transition spd="slow" p14:dur="2000"/>
     </mc:Choice>
-    <mc:Fallback xmlns="">
+    <mc:Fallback>
       <p:transition xmlns:p14="http://schemas.microsoft.com/office/powerpoint/2010/main" spd="slow"/>
     </mc:Fallback>
   </mc:AlternateContent>
@@ -8420,7 +8420,7 @@
 </file>
 
 <file path=ppt/slides/slide19.xml><?xml version="1.0" encoding="utf-8"?>
-<p:sld xmlns:a="http://schemas.openxmlformats.org/drawingml/2006/main" xmlns:r="http://schemas.openxmlformats.org/officeDocument/2006/relationships" xmlns:p="http://schemas.openxmlformats.org/presentationml/2006/main" show="0">
+<p:sld xmlns:a="http://schemas.openxmlformats.org/drawingml/2006/main" xmlns:r="http://schemas.openxmlformats.org/officeDocument/2006/relationships" xmlns:p="http://schemas.openxmlformats.org/presentationml/2006/main">
   <p:cSld>
     <p:spTree>
       <p:nvGrpSpPr>
@@ -8951,11 +8951,11 @@
   <p:clrMapOvr>
     <a:masterClrMapping/>
   </p:clrMapOvr>
-  <mc:AlternateContent xmlns:mc="http://schemas.openxmlformats.org/markup-compatibility/2006" xmlns:p14="http://schemas.microsoft.com/office/powerpoint/2010/main">
-    <mc:Choice Requires="p14">
+  <mc:AlternateContent xmlns:mc="http://schemas.openxmlformats.org/markup-compatibility/2006">
+    <mc:Choice xmlns:p14="http://schemas.microsoft.com/office/powerpoint/2010/main" Requires="p14">
       <p:transition spd="slow" p14:dur="2000"/>
     </mc:Choice>
-    <mc:Fallback xmlns="">
+    <mc:Fallback>
       <p:transition xmlns:p14="http://schemas.microsoft.com/office/powerpoint/2010/main" spd="slow"/>
     </mc:Fallback>
   </mc:AlternateContent>
@@ -9125,7 +9125,7 @@
 </file>
 
 <file path=ppt/slides/slide20.xml><?xml version="1.0" encoding="utf-8"?>
-<p:sld xmlns:a="http://schemas.openxmlformats.org/drawingml/2006/main" xmlns:r="http://schemas.openxmlformats.org/officeDocument/2006/relationships" xmlns:p="http://schemas.openxmlformats.org/presentationml/2006/main" show="0">
+<p:sld xmlns:a="http://schemas.openxmlformats.org/drawingml/2006/main" xmlns:r="http://schemas.openxmlformats.org/officeDocument/2006/relationships" xmlns:p="http://schemas.openxmlformats.org/presentationml/2006/main">
   <p:cSld>
     <p:spTree>
       <p:nvGrpSpPr>
@@ -9455,11 +9455,11 @@
   <p:clrMapOvr>
     <a:masterClrMapping/>
   </p:clrMapOvr>
-  <mc:AlternateContent xmlns:mc="http://schemas.openxmlformats.org/markup-compatibility/2006" xmlns:p14="http://schemas.microsoft.com/office/powerpoint/2010/main">
-    <mc:Choice Requires="p14">
+  <mc:AlternateContent xmlns:mc="http://schemas.openxmlformats.org/markup-compatibility/2006">
+    <mc:Choice xmlns:p14="http://schemas.microsoft.com/office/powerpoint/2010/main" Requires="p14">
       <p:transition spd="slow" p14:dur="2000"/>
     </mc:Choice>
-    <mc:Fallback xmlns="">
+    <mc:Fallback>
       <p:transition xmlns:p14="http://schemas.microsoft.com/office/powerpoint/2010/main" spd="slow"/>
     </mc:Fallback>
   </mc:AlternateContent>
@@ -9474,7 +9474,7 @@
 </file>
 
 <file path=ppt/slides/slide21.xml><?xml version="1.0" encoding="utf-8"?>
-<p:sld xmlns:a="http://schemas.openxmlformats.org/drawingml/2006/main" xmlns:r="http://schemas.openxmlformats.org/officeDocument/2006/relationships" xmlns:p="http://schemas.openxmlformats.org/presentationml/2006/main" show="0">
+<p:sld xmlns:a="http://schemas.openxmlformats.org/drawingml/2006/main" xmlns:r="http://schemas.openxmlformats.org/officeDocument/2006/relationships" xmlns:p="http://schemas.openxmlformats.org/presentationml/2006/main">
   <p:cSld>
     <p:spTree>
       <p:nvGrpSpPr>
@@ -9667,11 +9667,11 @@
   <p:clrMapOvr>
     <a:masterClrMapping/>
   </p:clrMapOvr>
-  <mc:AlternateContent xmlns:mc="http://schemas.openxmlformats.org/markup-compatibility/2006" xmlns:p14="http://schemas.microsoft.com/office/powerpoint/2010/main">
-    <mc:Choice Requires="p14">
+  <mc:AlternateContent xmlns:mc="http://schemas.openxmlformats.org/markup-compatibility/2006">
+    <mc:Choice xmlns:p14="http://schemas.microsoft.com/office/powerpoint/2010/main" Requires="p14">
       <p:transition spd="slow" p14:dur="2000"/>
     </mc:Choice>
-    <mc:Fallback xmlns="">
+    <mc:Fallback>
       <p:transition xmlns:p14="http://schemas.microsoft.com/office/powerpoint/2010/main" spd="slow"/>
     </mc:Fallback>
   </mc:AlternateContent>
@@ -9686,7 +9686,7 @@
 </file>
 
 <file path=ppt/slides/slide22.xml><?xml version="1.0" encoding="utf-8"?>
-<p:sld xmlns:a="http://schemas.openxmlformats.org/drawingml/2006/main" xmlns:r="http://schemas.openxmlformats.org/officeDocument/2006/relationships" xmlns:p="http://schemas.openxmlformats.org/presentationml/2006/main" show="0">
+<p:sld xmlns:a="http://schemas.openxmlformats.org/drawingml/2006/main" xmlns:r="http://schemas.openxmlformats.org/officeDocument/2006/relationships" xmlns:p="http://schemas.openxmlformats.org/presentationml/2006/main">
   <p:cSld>
     <p:spTree>
       <p:nvGrpSpPr>
@@ -9882,11 +9882,11 @@
   <p:clrMapOvr>
     <a:masterClrMapping/>
   </p:clrMapOvr>
-  <mc:AlternateContent xmlns:mc="http://schemas.openxmlformats.org/markup-compatibility/2006" xmlns:p14="http://schemas.microsoft.com/office/powerpoint/2010/main">
-    <mc:Choice Requires="p14">
+  <mc:AlternateContent xmlns:mc="http://schemas.openxmlformats.org/markup-compatibility/2006">
+    <mc:Choice xmlns:p14="http://schemas.microsoft.com/office/powerpoint/2010/main" Requires="p14">
       <p:transition spd="slow" p14:dur="2000"/>
     </mc:Choice>
-    <mc:Fallback xmlns="">
+    <mc:Fallback>
       <p:transition xmlns:p14="http://schemas.microsoft.com/office/powerpoint/2010/main" spd="slow"/>
     </mc:Fallback>
   </mc:AlternateContent>
@@ -9901,7 +9901,7 @@
 </file>
 
 <file path=ppt/slides/slide23.xml><?xml version="1.0" encoding="utf-8"?>
-<p:sld xmlns:a="http://schemas.openxmlformats.org/drawingml/2006/main" xmlns:r="http://schemas.openxmlformats.org/officeDocument/2006/relationships" xmlns:p="http://schemas.openxmlformats.org/presentationml/2006/main" show="0">
+<p:sld xmlns:a="http://schemas.openxmlformats.org/drawingml/2006/main" xmlns:r="http://schemas.openxmlformats.org/officeDocument/2006/relationships" xmlns:p="http://schemas.openxmlformats.org/presentationml/2006/main">
   <p:cSld>
     <p:spTree>
       <p:nvGrpSpPr>
@@ -10028,11 +10028,11 @@
   <p:clrMapOvr>
     <a:masterClrMapping/>
   </p:clrMapOvr>
-  <mc:AlternateContent xmlns:mc="http://schemas.openxmlformats.org/markup-compatibility/2006" xmlns:p14="http://schemas.microsoft.com/office/powerpoint/2010/main">
-    <mc:Choice Requires="p14">
+  <mc:AlternateContent xmlns:mc="http://schemas.openxmlformats.org/markup-compatibility/2006">
+    <mc:Choice xmlns:p14="http://schemas.microsoft.com/office/powerpoint/2010/main" Requires="p14">
       <p:transition spd="slow" p14:dur="2000"/>
     </mc:Choice>
-    <mc:Fallback xmlns="">
+    <mc:Fallback>
       <p:transition xmlns:p14="http://schemas.microsoft.com/office/powerpoint/2010/main" spd="slow"/>
     </mc:Fallback>
   </mc:AlternateContent>
@@ -10047,7 +10047,7 @@
 </file>
 
 <file path=ppt/slides/slide24.xml><?xml version="1.0" encoding="utf-8"?>
-<p:sld xmlns:a="http://schemas.openxmlformats.org/drawingml/2006/main" xmlns:r="http://schemas.openxmlformats.org/officeDocument/2006/relationships" xmlns:p="http://schemas.openxmlformats.org/presentationml/2006/main" show="0">
+<p:sld xmlns:a="http://schemas.openxmlformats.org/drawingml/2006/main" xmlns:r="http://schemas.openxmlformats.org/officeDocument/2006/relationships" xmlns:p="http://schemas.openxmlformats.org/presentationml/2006/main">
   <p:cSld>
     <p:spTree>
       <p:nvGrpSpPr>
@@ -10182,11 +10182,11 @@
   <p:clrMapOvr>
     <a:masterClrMapping/>
   </p:clrMapOvr>
-  <mc:AlternateContent xmlns:mc="http://schemas.openxmlformats.org/markup-compatibility/2006" xmlns:p14="http://schemas.microsoft.com/office/powerpoint/2010/main">
-    <mc:Choice Requires="p14">
+  <mc:AlternateContent xmlns:mc="http://schemas.openxmlformats.org/markup-compatibility/2006">
+    <mc:Choice xmlns:p14="http://schemas.microsoft.com/office/powerpoint/2010/main" Requires="p14">
       <p:transition spd="slow" p14:dur="2000"/>
     </mc:Choice>
-    <mc:Fallback xmlns="">
+    <mc:Fallback>
       <p:transition xmlns:p14="http://schemas.microsoft.com/office/powerpoint/2010/main" spd="slow"/>
     </mc:Fallback>
   </mc:AlternateContent>
@@ -10201,7 +10201,7 @@
 </file>
 
 <file path=ppt/slides/slide25.xml><?xml version="1.0" encoding="utf-8"?>
-<p:sld xmlns:a="http://schemas.openxmlformats.org/drawingml/2006/main" xmlns:r="http://schemas.openxmlformats.org/officeDocument/2006/relationships" xmlns:p="http://schemas.openxmlformats.org/presentationml/2006/main" show="0">
+<p:sld xmlns:a="http://schemas.openxmlformats.org/drawingml/2006/main" xmlns:r="http://schemas.openxmlformats.org/officeDocument/2006/relationships" xmlns:p="http://schemas.openxmlformats.org/presentationml/2006/main">
   <p:cSld>
     <p:spTree>
       <p:nvGrpSpPr>
@@ -10280,11 +10280,11 @@
   <p:clrMapOvr>
     <a:masterClrMapping/>
   </p:clrMapOvr>
-  <mc:AlternateContent xmlns:mc="http://schemas.openxmlformats.org/markup-compatibility/2006" xmlns:p14="http://schemas.microsoft.com/office/powerpoint/2010/main">
-    <mc:Choice Requires="p14">
+  <mc:AlternateContent xmlns:mc="http://schemas.openxmlformats.org/markup-compatibility/2006">
+    <mc:Choice xmlns:p14="http://schemas.microsoft.com/office/powerpoint/2010/main" Requires="p14">
       <p:transition spd="slow" p14:dur="2000"/>
     </mc:Choice>
-    <mc:Fallback xmlns="">
+    <mc:Fallback>
       <p:transition xmlns:p14="http://schemas.microsoft.com/office/powerpoint/2010/main" spd="slow"/>
     </mc:Fallback>
   </mc:AlternateContent>
@@ -10299,7 +10299,7 @@
 </file>
 
 <file path=ppt/slides/slide26.xml><?xml version="1.0" encoding="utf-8"?>
-<p:sld xmlns:a="http://schemas.openxmlformats.org/drawingml/2006/main" xmlns:r="http://schemas.openxmlformats.org/officeDocument/2006/relationships" xmlns:p="http://schemas.openxmlformats.org/presentationml/2006/main" show="0">
+<p:sld xmlns:a="http://schemas.openxmlformats.org/drawingml/2006/main" xmlns:r="http://schemas.openxmlformats.org/officeDocument/2006/relationships" xmlns:p="http://schemas.openxmlformats.org/presentationml/2006/main">
   <p:cSld>
     <p:spTree>
       <p:nvGrpSpPr>
@@ -10438,11 +10438,11 @@
   <p:clrMapOvr>
     <a:masterClrMapping/>
   </p:clrMapOvr>
-  <mc:AlternateContent xmlns:mc="http://schemas.openxmlformats.org/markup-compatibility/2006" xmlns:p14="http://schemas.microsoft.com/office/powerpoint/2010/main">
-    <mc:Choice Requires="p14">
+  <mc:AlternateContent xmlns:mc="http://schemas.openxmlformats.org/markup-compatibility/2006">
+    <mc:Choice xmlns:p14="http://schemas.microsoft.com/office/powerpoint/2010/main" Requires="p14">
       <p:transition spd="slow" p14:dur="2000"/>
     </mc:Choice>
-    <mc:Fallback xmlns="">
+    <mc:Fallback>
       <p:transition xmlns:p14="http://schemas.microsoft.com/office/powerpoint/2010/main" spd="slow"/>
     </mc:Fallback>
   </mc:AlternateContent>
@@ -10457,7 +10457,7 @@
 </file>
 
 <file path=ppt/slides/slide27.xml><?xml version="1.0" encoding="utf-8"?>
-<p:sld xmlns:a="http://schemas.openxmlformats.org/drawingml/2006/main" xmlns:r="http://schemas.openxmlformats.org/officeDocument/2006/relationships" xmlns:p="http://schemas.openxmlformats.org/presentationml/2006/main" show="0">
+<p:sld xmlns:a="http://schemas.openxmlformats.org/drawingml/2006/main" xmlns:r="http://schemas.openxmlformats.org/officeDocument/2006/relationships" xmlns:p="http://schemas.openxmlformats.org/presentationml/2006/main">
   <p:cSld>
     <p:spTree>
       <p:nvGrpSpPr>
@@ -10598,11 +10598,11 @@
   <p:clrMapOvr>
     <a:masterClrMapping/>
   </p:clrMapOvr>
-  <mc:AlternateContent xmlns:mc="http://schemas.openxmlformats.org/markup-compatibility/2006" xmlns:p14="http://schemas.microsoft.com/office/powerpoint/2010/main">
-    <mc:Choice Requires="p14">
+  <mc:AlternateContent xmlns:mc="http://schemas.openxmlformats.org/markup-compatibility/2006">
+    <mc:Choice xmlns:p14="http://schemas.microsoft.com/office/powerpoint/2010/main" Requires="p14">
       <p:transition spd="slow" p14:dur="2000"/>
     </mc:Choice>
-    <mc:Fallback xmlns="">
+    <mc:Fallback>
       <p:transition xmlns:p14="http://schemas.microsoft.com/office/powerpoint/2010/main" spd="slow"/>
     </mc:Fallback>
   </mc:AlternateContent>
@@ -10617,7 +10617,7 @@
 </file>
 
 <file path=ppt/slides/slide28.xml><?xml version="1.0" encoding="utf-8"?>
-<p:sld xmlns:a="http://schemas.openxmlformats.org/drawingml/2006/main" xmlns:r="http://schemas.openxmlformats.org/officeDocument/2006/relationships" xmlns:p="http://schemas.openxmlformats.org/presentationml/2006/main" show="0">
+<p:sld xmlns:a="http://schemas.openxmlformats.org/drawingml/2006/main" xmlns:r="http://schemas.openxmlformats.org/officeDocument/2006/relationships" xmlns:p="http://schemas.openxmlformats.org/presentationml/2006/main">
   <p:cSld>
     <p:spTree>
       <p:nvGrpSpPr>
@@ -10820,11 +10820,11 @@
   <p:clrMapOvr>
     <a:masterClrMapping/>
   </p:clrMapOvr>
-  <mc:AlternateContent xmlns:mc="http://schemas.openxmlformats.org/markup-compatibility/2006" xmlns:p14="http://schemas.microsoft.com/office/powerpoint/2010/main">
-    <mc:Choice Requires="p14">
+  <mc:AlternateContent xmlns:mc="http://schemas.openxmlformats.org/markup-compatibility/2006">
+    <mc:Choice xmlns:p14="http://schemas.microsoft.com/office/powerpoint/2010/main" Requires="p14">
       <p:transition spd="slow" p14:dur="2000"/>
     </mc:Choice>
-    <mc:Fallback xmlns="">
+    <mc:Fallback>
       <p:transition xmlns:p14="http://schemas.microsoft.com/office/powerpoint/2010/main" spd="slow"/>
     </mc:Fallback>
   </mc:AlternateContent>
@@ -10839,7 +10839,7 @@
 </file>
 
 <file path=ppt/slides/slide29.xml><?xml version="1.0" encoding="utf-8"?>
-<p:sld xmlns:a="http://schemas.openxmlformats.org/drawingml/2006/main" xmlns:r="http://schemas.openxmlformats.org/officeDocument/2006/relationships" xmlns:p="http://schemas.openxmlformats.org/presentationml/2006/main" show="0">
+<p:sld xmlns:a="http://schemas.openxmlformats.org/drawingml/2006/main" xmlns:r="http://schemas.openxmlformats.org/officeDocument/2006/relationships" xmlns:p="http://schemas.openxmlformats.org/presentationml/2006/main">
   <p:cSld>
     <p:spTree>
       <p:nvGrpSpPr>
@@ -10930,11 +10930,11 @@
   <p:clrMapOvr>
     <a:masterClrMapping/>
   </p:clrMapOvr>
-  <mc:AlternateContent xmlns:mc="http://schemas.openxmlformats.org/markup-compatibility/2006" xmlns:p14="http://schemas.microsoft.com/office/powerpoint/2010/main">
-    <mc:Choice Requires="p14">
+  <mc:AlternateContent xmlns:mc="http://schemas.openxmlformats.org/markup-compatibility/2006">
+    <mc:Choice xmlns:p14="http://schemas.microsoft.com/office/powerpoint/2010/main" Requires="p14">
       <p:transition spd="slow" p14:dur="2000"/>
     </mc:Choice>
-    <mc:Fallback xmlns="">
+    <mc:Fallback>
       <p:transition xmlns:p14="http://schemas.microsoft.com/office/powerpoint/2010/main" spd="slow"/>
     </mc:Fallback>
   </mc:AlternateContent>
@@ -11630,6 +11630,1088 @@
 </file>
 
 <file path=ppt/slides/slide30.xml><?xml version="1.0" encoding="utf-8"?>
+<p:sld xmlns:a="http://schemas.openxmlformats.org/drawingml/2006/main" xmlns:r="http://schemas.openxmlformats.org/officeDocument/2006/relationships" xmlns:p="http://schemas.openxmlformats.org/presentationml/2006/main">
+  <p:cSld>
+    <p:spTree>
+      <p:nvGrpSpPr>
+        <p:cNvPr id="1" name=""/>
+        <p:cNvGrpSpPr/>
+        <p:nvPr/>
+      </p:nvGrpSpPr>
+      <p:grpSpPr>
+        <a:xfrm>
+          <a:off x="0" y="0"/>
+          <a:ext cx="0" cy="0"/>
+          <a:chOff x="0" y="0"/>
+          <a:chExt cx="0" cy="0"/>
+        </a:xfrm>
+      </p:grpSpPr>
+      <p:sp>
+        <p:nvSpPr>
+          <p:cNvPr id="2" name="Title 1"/>
+          <p:cNvSpPr>
+            <a:spLocks noGrp="1"/>
+          </p:cNvSpPr>
+          <p:nvPr>
+            <p:ph type="title"/>
+          </p:nvPr>
+        </p:nvSpPr>
+        <p:spPr/>
+        <p:txBody>
+          <a:bodyPr/>
+          <a:lstStyle/>
+          <a:p>
+            <a:r>
+              <a:rPr lang="en-GB" dirty="0" smtClean="0"/>
+              <a:t>Using GDB with Intel®</a:t>
+            </a:r>
+            <a:endParaRPr lang="en-GB" dirty="0"/>
+          </a:p>
+        </p:txBody>
+      </p:sp>
+      <p:sp>
+        <p:nvSpPr>
+          <p:cNvPr id="3" name="Content Placeholder 2"/>
+          <p:cNvSpPr>
+            <a:spLocks noGrp="1"/>
+          </p:cNvSpPr>
+          <p:nvPr>
+            <p:ph idx="1"/>
+          </p:nvPr>
+        </p:nvSpPr>
+        <p:spPr>
+          <a:xfrm>
+            <a:off x="457200" y="1340768"/>
+            <a:ext cx="8686800" cy="5400600"/>
+          </a:xfrm>
+        </p:spPr>
+        <p:txBody>
+          <a:bodyPr>
+            <a:normAutofit fontScale="85000" lnSpcReduction="20000"/>
+          </a:bodyPr>
+          <a:lstStyle/>
+          <a:p>
+            <a:pPr>
+              <a:lnSpc>
+                <a:spcPct val="120000"/>
+              </a:lnSpc>
+            </a:pPr>
+            <a:r>
+              <a:rPr lang="en-GB" dirty="0" smtClean="0"/>
+              <a:t>Ensure you select the CPU device from the Intel® platform</a:t>
+            </a:r>
+          </a:p>
+          <a:p>
+            <a:pPr>
+              <a:lnSpc>
+                <a:spcPct val="120000"/>
+              </a:lnSpc>
+            </a:pPr>
+            <a:r>
+              <a:rPr lang="en-GB" dirty="0" smtClean="0"/>
+              <a:t>Enable debugging symbols and add the absolute path to the kernel source code when building the kernels:</a:t>
+            </a:r>
+            <a:endParaRPr lang="en-GB" dirty="0"/>
+          </a:p>
+          <a:p>
+            <a:pPr marL="457200" lvl="1" indent="0">
+              <a:lnSpc>
+                <a:spcPct val="120000"/>
+              </a:lnSpc>
+              <a:buNone/>
+            </a:pPr>
+            <a:r>
+              <a:rPr lang="en-GB" b="1" dirty="0" err="1" smtClean="0">
+                <a:solidFill>
+                  <a:srgbClr val="3366FF"/>
+                </a:solidFill>
+                <a:latin typeface="Courier New"/>
+                <a:cs typeface="Courier New"/>
+              </a:rPr>
+              <a:t>clBuildProgram</a:t>
+            </a:r>
+            <a:r>
+              <a:rPr lang="en-GB" b="1" dirty="0" smtClean="0">
+                <a:solidFill>
+                  <a:srgbClr val="3366FF"/>
+                </a:solidFill>
+                <a:latin typeface="Courier New"/>
+                <a:cs typeface="Courier New"/>
+              </a:rPr>
+              <a:t>(… </a:t>
+            </a:r>
+            <a:r>
+              <a:rPr lang="en-GB" b="1" dirty="0">
+                <a:solidFill>
+                  <a:srgbClr val="3366FF"/>
+                </a:solidFill>
+                <a:latin typeface="Courier New"/>
+                <a:cs typeface="Courier New"/>
+              </a:rPr>
+              <a:t>"–</a:t>
+            </a:r>
+            <a:r>
+              <a:rPr lang="en-GB" b="1" dirty="0" smtClean="0">
+                <a:solidFill>
+                  <a:srgbClr val="3366FF"/>
+                </a:solidFill>
+                <a:latin typeface="Courier New"/>
+                <a:cs typeface="Courier New"/>
+              </a:rPr>
+              <a:t>g –s /path/to/</a:t>
+            </a:r>
+            <a:r>
+              <a:rPr lang="en-GB" b="1" dirty="0" err="1" smtClean="0">
+                <a:solidFill>
+                  <a:srgbClr val="3366FF"/>
+                </a:solidFill>
+                <a:latin typeface="Courier New"/>
+                <a:cs typeface="Courier New"/>
+              </a:rPr>
+              <a:t>kernel.cl</a:t>
+            </a:r>
+            <a:r>
+              <a:rPr lang="en-GB" b="1" dirty="0" smtClean="0">
+                <a:solidFill>
+                  <a:srgbClr val="3366FF"/>
+                </a:solidFill>
+                <a:latin typeface="Courier New"/>
+                <a:cs typeface="Courier New"/>
+              </a:rPr>
+              <a:t>" …);</a:t>
+            </a:r>
+            <a:endParaRPr lang="en-GB" dirty="0" smtClean="0"/>
+          </a:p>
+          <a:p>
+            <a:pPr>
+              <a:lnSpc>
+                <a:spcPct val="120000"/>
+              </a:lnSpc>
+            </a:pPr>
+            <a:r>
+              <a:rPr lang="en-GB" dirty="0" smtClean="0"/>
+              <a:t>The </a:t>
+            </a:r>
+            <a:r>
+              <a:rPr lang="en-GB" dirty="0"/>
+              <a:t>symbolic name of a kernel function </a:t>
+            </a:r>
+            <a:r>
+              <a:rPr lang="en-GB" dirty="0" smtClean="0"/>
+              <a:t>‘</a:t>
+            </a:r>
+            <a:r>
+              <a:rPr lang="en-GB" b="1" dirty="0" smtClean="0">
+                <a:solidFill>
+                  <a:srgbClr val="3366FF"/>
+                </a:solidFill>
+                <a:latin typeface="Courier New"/>
+                <a:cs typeface="Courier New"/>
+              </a:rPr>
+              <a:t>kernel </a:t>
+            </a:r>
+            <a:r>
+              <a:rPr lang="en-GB" b="1" dirty="0">
+                <a:solidFill>
+                  <a:srgbClr val="3366FF"/>
+                </a:solidFill>
+                <a:latin typeface="Courier New"/>
+                <a:cs typeface="Courier New"/>
+              </a:rPr>
+              <a:t>void </a:t>
+            </a:r>
+            <a:r>
+              <a:rPr lang="en-GB" b="1" dirty="0" smtClean="0">
+                <a:solidFill>
+                  <a:srgbClr val="3366FF"/>
+                </a:solidFill>
+                <a:latin typeface="Courier New"/>
+                <a:cs typeface="Courier New"/>
+              </a:rPr>
+              <a:t>foo(</a:t>
+            </a:r>
+            <a:r>
+              <a:rPr lang="en-GB" b="1" dirty="0" err="1">
+                <a:solidFill>
+                  <a:srgbClr val="3366FF"/>
+                </a:solidFill>
+                <a:latin typeface="Courier New"/>
+                <a:cs typeface="Courier New"/>
+              </a:rPr>
+              <a:t>args</a:t>
+            </a:r>
+            <a:r>
+              <a:rPr lang="en-GB" b="1" dirty="0" smtClean="0">
+                <a:solidFill>
+                  <a:srgbClr val="3366FF"/>
+                </a:solidFill>
+                <a:latin typeface="Courier New"/>
+                <a:cs typeface="Courier New"/>
+              </a:rPr>
+              <a:t>)</a:t>
+            </a:r>
+            <a:r>
+              <a:rPr lang="en-GB" b="1" dirty="0" smtClean="0"/>
+              <a:t>’</a:t>
+            </a:r>
+            <a:r>
+              <a:rPr lang="en-GB" dirty="0" smtClean="0"/>
+              <a:t> will just be </a:t>
+            </a:r>
+            <a:r>
+              <a:rPr lang="en-GB" b="1" dirty="0" smtClean="0">
+                <a:solidFill>
+                  <a:srgbClr val="3366FF"/>
+                </a:solidFill>
+                <a:latin typeface="Courier New"/>
+                <a:cs typeface="Courier New"/>
+              </a:rPr>
+              <a:t>foo</a:t>
+            </a:r>
+            <a:endParaRPr lang="en-GB" dirty="0" smtClean="0"/>
+          </a:p>
+          <a:p>
+            <a:pPr lvl="1">
+              <a:lnSpc>
+                <a:spcPct val="110000"/>
+              </a:lnSpc>
+            </a:pPr>
+            <a:r>
+              <a:rPr lang="en-GB" dirty="0" smtClean="0"/>
+              <a:t>To </a:t>
+            </a:r>
+            <a:r>
+              <a:rPr lang="en-GB" dirty="0"/>
+              <a:t>set a breakpoint on kernel entry enter at the GDB </a:t>
+            </a:r>
+            <a:r>
+              <a:rPr lang="en-GB" dirty="0" smtClean="0"/>
+              <a:t>prompt:</a:t>
+            </a:r>
+          </a:p>
+          <a:p>
+            <a:pPr marL="857250" lvl="2" indent="0">
+              <a:lnSpc>
+                <a:spcPct val="110000"/>
+              </a:lnSpc>
+              <a:buNone/>
+            </a:pPr>
+            <a:r>
+              <a:rPr lang="en-GB" sz="2600" b="1" dirty="0">
+                <a:solidFill>
+                  <a:srgbClr val="3366FF"/>
+                </a:solidFill>
+                <a:latin typeface="Courier New"/>
+                <a:cs typeface="Courier New"/>
+              </a:rPr>
+              <a:t>break </a:t>
+            </a:r>
+            <a:r>
+              <a:rPr lang="en-GB" sz="2600" b="1" dirty="0" smtClean="0">
+                <a:solidFill>
+                  <a:srgbClr val="3366FF"/>
+                </a:solidFill>
+                <a:latin typeface="Courier New"/>
+                <a:cs typeface="Courier New"/>
+              </a:rPr>
+              <a:t>foo</a:t>
+            </a:r>
+            <a:endParaRPr lang="en-GB" sz="2600" dirty="0" smtClean="0">
+              <a:latin typeface="Courier New"/>
+              <a:cs typeface="Courier New"/>
+            </a:endParaRPr>
+          </a:p>
+          <a:p>
+            <a:pPr lvl="1">
+              <a:lnSpc>
+                <a:spcPct val="110000"/>
+              </a:lnSpc>
+            </a:pPr>
+            <a:r>
+              <a:rPr lang="en-GB" dirty="0" smtClean="0"/>
+              <a:t>This can only be done </a:t>
+            </a:r>
+            <a:r>
+              <a:rPr lang="en-GB" i="1" dirty="0" smtClean="0"/>
+              <a:t>after</a:t>
+            </a:r>
+            <a:r>
+              <a:rPr lang="en-GB" dirty="0" smtClean="0"/>
+              <a:t> the kernels have been built</a:t>
+            </a:r>
+          </a:p>
+          <a:p>
+            <a:pPr>
+              <a:lnSpc>
+                <a:spcPct val="110000"/>
+              </a:lnSpc>
+            </a:pPr>
+            <a:r>
+              <a:rPr lang="en-GB" dirty="0" smtClean="0"/>
+              <a:t>On Windows, this functionality is provided via a graphical user interface inside Visual Studio</a:t>
+            </a:r>
+          </a:p>
+        </p:txBody>
+      </p:sp>
+      <p:sp>
+        <p:nvSpPr>
+          <p:cNvPr id="4" name="Content Placeholder 7"/>
+          <p:cNvSpPr txBox="1">
+            <a:spLocks/>
+          </p:cNvSpPr>
+          <p:nvPr/>
+        </p:nvSpPr>
+        <p:spPr>
+          <a:xfrm>
+            <a:off x="107504" y="6453337"/>
+            <a:ext cx="4861484" cy="404664"/>
+          </a:xfrm>
+          <a:prstGeom prst="rect">
+            <a:avLst/>
+          </a:prstGeom>
+        </p:spPr>
+        <p:txBody>
+          <a:bodyPr vert="horz" lIns="91440" tIns="45720" rIns="91440" bIns="45720" rtlCol="0">
+            <a:normAutofit/>
+          </a:bodyPr>
+          <a:lstStyle>
+            <a:lvl1pPr marL="342900" indent="-342900" algn="l" defTabSz="914400" rtl="0" eaLnBrk="1" latinLnBrk="0" hangingPunct="1">
+              <a:spcBef>
+                <a:spcPct val="20000"/>
+              </a:spcBef>
+              <a:buFont typeface="Arial" pitchFamily="34" charset="0"/>
+              <a:buChar char="•"/>
+              <a:defRPr sz="3200" kern="1200">
+                <a:solidFill>
+                  <a:schemeClr val="tx1"/>
+                </a:solidFill>
+                <a:latin typeface="+mn-lt"/>
+                <a:ea typeface="+mn-ea"/>
+                <a:cs typeface="+mn-cs"/>
+              </a:defRPr>
+            </a:lvl1pPr>
+            <a:lvl2pPr marL="742950" indent="-285750" algn="l" defTabSz="914400" rtl="0" eaLnBrk="1" latinLnBrk="0" hangingPunct="1">
+              <a:spcBef>
+                <a:spcPct val="20000"/>
+              </a:spcBef>
+              <a:buFont typeface="Arial" pitchFamily="34" charset="0"/>
+              <a:buChar char="–"/>
+              <a:defRPr sz="2800" kern="1200">
+                <a:solidFill>
+                  <a:schemeClr val="tx1"/>
+                </a:solidFill>
+                <a:latin typeface="+mn-lt"/>
+                <a:ea typeface="+mn-ea"/>
+                <a:cs typeface="+mn-cs"/>
+              </a:defRPr>
+            </a:lvl2pPr>
+            <a:lvl3pPr marL="1143000" indent="-228600" algn="l" defTabSz="914400" rtl="0" eaLnBrk="1" latinLnBrk="0" hangingPunct="1">
+              <a:spcBef>
+                <a:spcPct val="20000"/>
+              </a:spcBef>
+              <a:buFont typeface="Arial" pitchFamily="34" charset="0"/>
+              <a:buChar char="•"/>
+              <a:defRPr sz="2400" kern="1200">
+                <a:solidFill>
+                  <a:schemeClr val="tx1"/>
+                </a:solidFill>
+                <a:latin typeface="+mn-lt"/>
+                <a:ea typeface="+mn-ea"/>
+                <a:cs typeface="+mn-cs"/>
+              </a:defRPr>
+            </a:lvl3pPr>
+            <a:lvl4pPr marL="1600200" indent="-228600" algn="l" defTabSz="914400" rtl="0" eaLnBrk="1" latinLnBrk="0" hangingPunct="1">
+              <a:spcBef>
+                <a:spcPct val="20000"/>
+              </a:spcBef>
+              <a:buFont typeface="Arial" pitchFamily="34" charset="0"/>
+              <a:buChar char="–"/>
+              <a:defRPr sz="2000" kern="1200">
+                <a:solidFill>
+                  <a:schemeClr val="tx1"/>
+                </a:solidFill>
+                <a:latin typeface="+mn-lt"/>
+                <a:ea typeface="+mn-ea"/>
+                <a:cs typeface="+mn-cs"/>
+              </a:defRPr>
+            </a:lvl4pPr>
+            <a:lvl5pPr marL="2057400" indent="-228600" algn="l" defTabSz="914400" rtl="0" eaLnBrk="1" latinLnBrk="0" hangingPunct="1">
+              <a:spcBef>
+                <a:spcPct val="20000"/>
+              </a:spcBef>
+              <a:buFont typeface="Arial" pitchFamily="34" charset="0"/>
+              <a:buChar char="»"/>
+              <a:defRPr sz="2000" kern="1200">
+                <a:solidFill>
+                  <a:schemeClr val="tx1"/>
+                </a:solidFill>
+                <a:latin typeface="+mn-lt"/>
+                <a:ea typeface="+mn-ea"/>
+                <a:cs typeface="+mn-cs"/>
+              </a:defRPr>
+            </a:lvl5pPr>
+            <a:lvl6pPr marL="2514600" indent="-228600" algn="l" defTabSz="914400" rtl="0" eaLnBrk="1" latinLnBrk="0" hangingPunct="1">
+              <a:spcBef>
+                <a:spcPct val="20000"/>
+              </a:spcBef>
+              <a:buFont typeface="Arial" pitchFamily="34" charset="0"/>
+              <a:buChar char="•"/>
+              <a:defRPr sz="2000" kern="1200">
+                <a:solidFill>
+                  <a:schemeClr val="tx1"/>
+                </a:solidFill>
+                <a:latin typeface="+mn-lt"/>
+                <a:ea typeface="+mn-ea"/>
+                <a:cs typeface="+mn-cs"/>
+              </a:defRPr>
+            </a:lvl6pPr>
+            <a:lvl7pPr marL="2971800" indent="-228600" algn="l" defTabSz="914400" rtl="0" eaLnBrk="1" latinLnBrk="0" hangingPunct="1">
+              <a:spcBef>
+                <a:spcPct val="20000"/>
+              </a:spcBef>
+              <a:buFont typeface="Arial" pitchFamily="34" charset="0"/>
+              <a:buChar char="•"/>
+              <a:defRPr sz="2000" kern="1200">
+                <a:solidFill>
+                  <a:schemeClr val="tx1"/>
+                </a:solidFill>
+                <a:latin typeface="+mn-lt"/>
+                <a:ea typeface="+mn-ea"/>
+                <a:cs typeface="+mn-cs"/>
+              </a:defRPr>
+            </a:lvl7pPr>
+            <a:lvl8pPr marL="3429000" indent="-228600" algn="l" defTabSz="914400" rtl="0" eaLnBrk="1" latinLnBrk="0" hangingPunct="1">
+              <a:spcBef>
+                <a:spcPct val="20000"/>
+              </a:spcBef>
+              <a:buFont typeface="Arial" pitchFamily="34" charset="0"/>
+              <a:buChar char="•"/>
+              <a:defRPr sz="2000" kern="1200">
+                <a:solidFill>
+                  <a:schemeClr val="tx1"/>
+                </a:solidFill>
+                <a:latin typeface="+mn-lt"/>
+                <a:ea typeface="+mn-ea"/>
+                <a:cs typeface="+mn-cs"/>
+              </a:defRPr>
+            </a:lvl8pPr>
+            <a:lvl9pPr marL="3886200" indent="-228600" algn="l" defTabSz="914400" rtl="0" eaLnBrk="1" latinLnBrk="0" hangingPunct="1">
+              <a:spcBef>
+                <a:spcPct val="20000"/>
+              </a:spcBef>
+              <a:buFont typeface="Arial" pitchFamily="34" charset="0"/>
+              <a:buChar char="•"/>
+              <a:defRPr sz="2000" kern="1200">
+                <a:solidFill>
+                  <a:schemeClr val="tx1"/>
+                </a:solidFill>
+                <a:latin typeface="+mn-lt"/>
+                <a:ea typeface="+mn-ea"/>
+                <a:cs typeface="+mn-cs"/>
+              </a:defRPr>
+            </a:lvl9pPr>
+          </a:lstStyle>
+          <a:p>
+            <a:pPr marL="0" indent="0">
+              <a:buFont typeface="Arial" pitchFamily="34" charset="0"/>
+              <a:buNone/>
+            </a:pPr>
+            <a:r>
+              <a:rPr lang="en-GB" sz="1200" dirty="0" smtClean="0">
+                <a:solidFill>
+                  <a:prstClr val="black"/>
+                </a:solidFill>
+              </a:rPr>
+              <a:t>Third party names are the property of their owners.</a:t>
+            </a:r>
+            <a:endParaRPr lang="en-GB" sz="1200" dirty="0">
+              <a:solidFill>
+                <a:prstClr val="black"/>
+              </a:solidFill>
+            </a:endParaRPr>
+          </a:p>
+        </p:txBody>
+      </p:sp>
+    </p:spTree>
+    <p:extLst>
+      <p:ext uri="{BB962C8B-B14F-4D97-AF65-F5344CB8AC3E}">
+        <p14:creationId xmlns:p14="http://schemas.microsoft.com/office/powerpoint/2010/main" val="2104821692"/>
+      </p:ext>
+    </p:extLst>
+  </p:cSld>
+  <p:clrMapOvr>
+    <a:masterClrMapping/>
+  </p:clrMapOvr>
+  <mc:AlternateContent xmlns:mc="http://schemas.openxmlformats.org/markup-compatibility/2006">
+    <mc:Choice xmlns:p14="http://schemas.microsoft.com/office/powerpoint/2010/main" Requires="p14">
+      <p:transition spd="slow" p14:dur="2000"/>
+    </mc:Choice>
+    <mc:Fallback>
+      <p:transition xmlns:p14="http://schemas.microsoft.com/office/powerpoint/2010/main" spd="slow"/>
+    </mc:Fallback>
+  </mc:AlternateContent>
+  <p:timing>
+    <p:tnLst>
+      <p:par>
+        <p:cTn xmlns:p14="http://schemas.microsoft.com/office/powerpoint/2010/main" id="1" dur="indefinite" restart="never" nodeType="tmRoot"/>
+      </p:par>
+    </p:tnLst>
+  </p:timing>
+</p:sld>
+</file>
+
+<file path=ppt/slides/slide31.xml><?xml version="1.0" encoding="utf-8"?>
+<p:sld xmlns:a="http://schemas.openxmlformats.org/drawingml/2006/main" xmlns:r="http://schemas.openxmlformats.org/officeDocument/2006/relationships" xmlns:p="http://schemas.openxmlformats.org/presentationml/2006/main">
+  <p:cSld>
+    <p:spTree>
+      <p:nvGrpSpPr>
+        <p:cNvPr id="1" name=""/>
+        <p:cNvGrpSpPr/>
+        <p:nvPr/>
+      </p:nvGrpSpPr>
+      <p:grpSpPr>
+        <a:xfrm>
+          <a:off x="0" y="0"/>
+          <a:ext cx="0" cy="0"/>
+          <a:chOff x="0" y="0"/>
+          <a:chExt cx="0" cy="0"/>
+        </a:xfrm>
+      </p:grpSpPr>
+      <p:sp>
+        <p:nvSpPr>
+          <p:cNvPr id="2" name="Title 1"/>
+          <p:cNvSpPr>
+            <a:spLocks noGrp="1"/>
+          </p:cNvSpPr>
+          <p:nvPr>
+            <p:ph type="title"/>
+          </p:nvPr>
+        </p:nvSpPr>
+        <p:spPr/>
+        <p:txBody>
+          <a:bodyPr/>
+          <a:lstStyle/>
+          <a:p>
+            <a:r>
+              <a:rPr lang="en-GB" dirty="0" smtClean="0"/>
+              <a:t>Using GDB with AMD®</a:t>
+            </a:r>
+            <a:endParaRPr lang="en-GB" dirty="0"/>
+          </a:p>
+        </p:txBody>
+      </p:sp>
+      <p:sp>
+        <p:nvSpPr>
+          <p:cNvPr id="3" name="Content Placeholder 2"/>
+          <p:cNvSpPr>
+            <a:spLocks noGrp="1"/>
+          </p:cNvSpPr>
+          <p:nvPr>
+            <p:ph idx="1"/>
+          </p:nvPr>
+        </p:nvSpPr>
+        <p:spPr>
+          <a:xfrm>
+            <a:off x="457200" y="1600200"/>
+            <a:ext cx="8229600" cy="4925144"/>
+          </a:xfrm>
+        </p:spPr>
+        <p:txBody>
+          <a:bodyPr>
+            <a:normAutofit fontScale="77500" lnSpcReduction="20000"/>
+          </a:bodyPr>
+          <a:lstStyle/>
+          <a:p>
+            <a:pPr>
+              <a:lnSpc>
+                <a:spcPct val="120000"/>
+              </a:lnSpc>
+            </a:pPr>
+            <a:r>
+              <a:rPr lang="en-GB" dirty="0" smtClean="0"/>
+              <a:t>Ensure you select the CPU device from the AMD® platform</a:t>
+            </a:r>
+          </a:p>
+          <a:p>
+            <a:pPr>
+              <a:lnSpc>
+                <a:spcPct val="120000"/>
+              </a:lnSpc>
+            </a:pPr>
+            <a:r>
+              <a:rPr lang="en-GB" dirty="0" smtClean="0"/>
+              <a:t>Enable debugging symbols and turn off all optimizations </a:t>
+            </a:r>
+            <a:r>
+              <a:rPr lang="en-GB" dirty="0"/>
+              <a:t>when building the </a:t>
+            </a:r>
+            <a:r>
+              <a:rPr lang="en-GB" dirty="0" smtClean="0"/>
+              <a:t>kernels:</a:t>
+            </a:r>
+          </a:p>
+          <a:p>
+            <a:pPr marL="457200" lvl="1" indent="0">
+              <a:lnSpc>
+                <a:spcPct val="120000"/>
+              </a:lnSpc>
+              <a:buNone/>
+            </a:pPr>
+            <a:r>
+              <a:rPr lang="en-GB" b="1" dirty="0" err="1" smtClean="0">
+                <a:solidFill>
+                  <a:srgbClr val="3366FF"/>
+                </a:solidFill>
+                <a:latin typeface="Courier New"/>
+                <a:cs typeface="Courier New"/>
+              </a:rPr>
+              <a:t>clBuildProgram</a:t>
+            </a:r>
+            <a:r>
+              <a:rPr lang="en-GB" b="1" dirty="0" smtClean="0">
+                <a:solidFill>
+                  <a:srgbClr val="3366FF"/>
+                </a:solidFill>
+                <a:latin typeface="Courier New"/>
+                <a:cs typeface="Courier New"/>
+              </a:rPr>
+              <a:t>(… </a:t>
+            </a:r>
+            <a:r>
+              <a:rPr lang="en-GB" b="1" dirty="0">
+                <a:solidFill>
+                  <a:srgbClr val="3366FF"/>
+                </a:solidFill>
+                <a:latin typeface="Courier New"/>
+                <a:cs typeface="Courier New"/>
+              </a:rPr>
+              <a:t>"–</a:t>
+            </a:r>
+            <a:r>
+              <a:rPr lang="en-GB" b="1" dirty="0" smtClean="0">
+                <a:solidFill>
+                  <a:srgbClr val="3366FF"/>
+                </a:solidFill>
+                <a:latin typeface="Courier New"/>
+                <a:cs typeface="Courier New"/>
+              </a:rPr>
+              <a:t>g –O0" …);</a:t>
+            </a:r>
+            <a:endParaRPr lang="en-GB" dirty="0" smtClean="0"/>
+          </a:p>
+          <a:p>
+            <a:pPr>
+              <a:lnSpc>
+                <a:spcPct val="120000"/>
+              </a:lnSpc>
+            </a:pPr>
+            <a:r>
+              <a:rPr lang="en-GB" dirty="0" smtClean="0"/>
+              <a:t>The </a:t>
+            </a:r>
+            <a:r>
+              <a:rPr lang="en-GB" dirty="0"/>
+              <a:t>symbolic name of a kernel function </a:t>
+            </a:r>
+            <a:r>
+              <a:rPr lang="en-GB" dirty="0" smtClean="0"/>
+              <a:t>‘</a:t>
+            </a:r>
+            <a:r>
+              <a:rPr lang="en-GB" b="1" dirty="0" smtClean="0">
+                <a:solidFill>
+                  <a:srgbClr val="3366FF"/>
+                </a:solidFill>
+                <a:latin typeface="Courier New"/>
+                <a:cs typeface="Courier New"/>
+              </a:rPr>
+              <a:t>kernel </a:t>
+            </a:r>
+            <a:r>
+              <a:rPr lang="en-GB" b="1" dirty="0">
+                <a:solidFill>
+                  <a:srgbClr val="3366FF"/>
+                </a:solidFill>
+                <a:latin typeface="Courier New"/>
+                <a:cs typeface="Courier New"/>
+              </a:rPr>
+              <a:t>void </a:t>
+            </a:r>
+            <a:r>
+              <a:rPr lang="en-GB" b="1" dirty="0" smtClean="0">
+                <a:solidFill>
+                  <a:srgbClr val="3366FF"/>
+                </a:solidFill>
+                <a:latin typeface="Courier New"/>
+                <a:cs typeface="Courier New"/>
+              </a:rPr>
+              <a:t>foo(</a:t>
+            </a:r>
+            <a:r>
+              <a:rPr lang="en-GB" b="1" dirty="0" err="1">
+                <a:solidFill>
+                  <a:srgbClr val="3366FF"/>
+                </a:solidFill>
+                <a:latin typeface="Courier New"/>
+                <a:cs typeface="Courier New"/>
+              </a:rPr>
+              <a:t>args</a:t>
+            </a:r>
+            <a:r>
+              <a:rPr lang="en-GB" b="1" dirty="0" smtClean="0">
+                <a:solidFill>
+                  <a:srgbClr val="3366FF"/>
+                </a:solidFill>
+                <a:latin typeface="Courier New"/>
+                <a:cs typeface="Courier New"/>
+              </a:rPr>
+              <a:t>)</a:t>
+            </a:r>
+            <a:r>
+              <a:rPr lang="en-GB" b="1" dirty="0" smtClean="0"/>
+              <a:t>’</a:t>
+            </a:r>
+            <a:r>
+              <a:rPr lang="en-GB" dirty="0" smtClean="0"/>
+              <a:t> will be </a:t>
+            </a:r>
+            <a:r>
+              <a:rPr lang="en-GB" b="1" dirty="0" smtClean="0">
+                <a:solidFill>
+                  <a:srgbClr val="3366FF"/>
+                </a:solidFill>
+                <a:latin typeface="Courier New"/>
+                <a:cs typeface="Courier New"/>
+              </a:rPr>
+              <a:t>__</a:t>
+            </a:r>
+            <a:r>
+              <a:rPr lang="en-GB" b="1" dirty="0" err="1" smtClean="0">
+                <a:solidFill>
+                  <a:srgbClr val="3366FF"/>
+                </a:solidFill>
+                <a:latin typeface="Courier New"/>
+                <a:cs typeface="Courier New"/>
+              </a:rPr>
+              <a:t>OpenCL_foo_kernel</a:t>
+            </a:r>
+            <a:endParaRPr lang="en-GB" dirty="0" smtClean="0"/>
+          </a:p>
+          <a:p>
+            <a:pPr lvl="1">
+              <a:lnSpc>
+                <a:spcPct val="110000"/>
+              </a:lnSpc>
+            </a:pPr>
+            <a:r>
+              <a:rPr lang="en-GB" dirty="0" smtClean="0"/>
+              <a:t>To </a:t>
+            </a:r>
+            <a:r>
+              <a:rPr lang="en-GB" dirty="0"/>
+              <a:t>set a breakpoint on kernel entry enter at the GDB </a:t>
+            </a:r>
+            <a:r>
+              <a:rPr lang="en-GB" dirty="0" smtClean="0"/>
+              <a:t>prompt:</a:t>
+            </a:r>
+          </a:p>
+          <a:p>
+            <a:pPr marL="857250" lvl="2" indent="0">
+              <a:lnSpc>
+                <a:spcPct val="110000"/>
+              </a:lnSpc>
+              <a:buNone/>
+            </a:pPr>
+            <a:r>
+              <a:rPr lang="en-GB" b="1" dirty="0">
+                <a:solidFill>
+                  <a:srgbClr val="3366FF"/>
+                </a:solidFill>
+                <a:latin typeface="Courier New Bold"/>
+              </a:rPr>
+              <a:t>break </a:t>
+            </a:r>
+            <a:r>
+              <a:rPr lang="en-GB" b="1" dirty="0" smtClean="0">
+                <a:solidFill>
+                  <a:srgbClr val="3366FF"/>
+                </a:solidFill>
+                <a:latin typeface="Courier New Bold"/>
+              </a:rPr>
+              <a:t>__</a:t>
+            </a:r>
+            <a:r>
+              <a:rPr lang="en-GB" b="1" dirty="0" err="1" smtClean="0">
+                <a:solidFill>
+                  <a:srgbClr val="3366FF"/>
+                </a:solidFill>
+                <a:latin typeface="Courier New Bold"/>
+              </a:rPr>
+              <a:t>OpenCL_foo_kernel</a:t>
+            </a:r>
+            <a:endParaRPr lang="en-GB" dirty="0" smtClean="0"/>
+          </a:p>
+          <a:p>
+            <a:pPr lvl="1">
+              <a:lnSpc>
+                <a:spcPct val="110000"/>
+              </a:lnSpc>
+            </a:pPr>
+            <a:r>
+              <a:rPr lang="en-GB" dirty="0" smtClean="0"/>
+              <a:t>This can only be done </a:t>
+            </a:r>
+            <a:r>
+              <a:rPr lang="en-GB" i="1" dirty="0" smtClean="0"/>
+              <a:t>after</a:t>
+            </a:r>
+            <a:r>
+              <a:rPr lang="en-GB" dirty="0" smtClean="0"/>
+              <a:t> the kernels have been built 	</a:t>
+            </a:r>
+            <a:endParaRPr lang="en-GB" b="1" dirty="0" smtClean="0">
+              <a:solidFill>
+                <a:srgbClr val="3366FF"/>
+              </a:solidFill>
+              <a:latin typeface="Courier New Bold"/>
+            </a:endParaRPr>
+          </a:p>
+          <a:p>
+            <a:pPr>
+              <a:lnSpc>
+                <a:spcPct val="120000"/>
+              </a:lnSpc>
+            </a:pPr>
+            <a:r>
+              <a:rPr lang="en-GB" dirty="0" smtClean="0"/>
+              <a:t>AMD® recommend setting the environment variable </a:t>
+            </a:r>
+            <a:r>
+              <a:rPr lang="en-GB" b="1" dirty="0" smtClean="0">
+                <a:solidFill>
+                  <a:srgbClr val="3366FF"/>
+                </a:solidFill>
+                <a:latin typeface="Courier New Bold"/>
+              </a:rPr>
+              <a:t>CPU_MAX_COMPUTE_UNITS=1</a:t>
+            </a:r>
+            <a:r>
+              <a:rPr lang="en-GB" dirty="0" smtClean="0"/>
+              <a:t> to ensure deterministic kernel behaviour</a:t>
+            </a:r>
+          </a:p>
+        </p:txBody>
+      </p:sp>
+      <p:sp>
+        <p:nvSpPr>
+          <p:cNvPr id="4" name="Content Placeholder 7"/>
+          <p:cNvSpPr txBox="1">
+            <a:spLocks/>
+          </p:cNvSpPr>
+          <p:nvPr/>
+        </p:nvSpPr>
+        <p:spPr>
+          <a:xfrm>
+            <a:off x="107504" y="6453337"/>
+            <a:ext cx="4861484" cy="404664"/>
+          </a:xfrm>
+          <a:prstGeom prst="rect">
+            <a:avLst/>
+          </a:prstGeom>
+        </p:spPr>
+        <p:txBody>
+          <a:bodyPr vert="horz" lIns="91440" tIns="45720" rIns="91440" bIns="45720" rtlCol="0">
+            <a:normAutofit/>
+          </a:bodyPr>
+          <a:lstStyle>
+            <a:lvl1pPr marL="342900" indent="-342900" algn="l" defTabSz="914400" rtl="0" eaLnBrk="1" latinLnBrk="0" hangingPunct="1">
+              <a:spcBef>
+                <a:spcPct val="20000"/>
+              </a:spcBef>
+              <a:buFont typeface="Arial" pitchFamily="34" charset="0"/>
+              <a:buChar char="•"/>
+              <a:defRPr sz="3200" kern="1200">
+                <a:solidFill>
+                  <a:schemeClr val="tx1"/>
+                </a:solidFill>
+                <a:latin typeface="+mn-lt"/>
+                <a:ea typeface="+mn-ea"/>
+                <a:cs typeface="+mn-cs"/>
+              </a:defRPr>
+            </a:lvl1pPr>
+            <a:lvl2pPr marL="742950" indent="-285750" algn="l" defTabSz="914400" rtl="0" eaLnBrk="1" latinLnBrk="0" hangingPunct="1">
+              <a:spcBef>
+                <a:spcPct val="20000"/>
+              </a:spcBef>
+              <a:buFont typeface="Arial" pitchFamily="34" charset="0"/>
+              <a:buChar char="–"/>
+              <a:defRPr sz="2800" kern="1200">
+                <a:solidFill>
+                  <a:schemeClr val="tx1"/>
+                </a:solidFill>
+                <a:latin typeface="+mn-lt"/>
+                <a:ea typeface="+mn-ea"/>
+                <a:cs typeface="+mn-cs"/>
+              </a:defRPr>
+            </a:lvl2pPr>
+            <a:lvl3pPr marL="1143000" indent="-228600" algn="l" defTabSz="914400" rtl="0" eaLnBrk="1" latinLnBrk="0" hangingPunct="1">
+              <a:spcBef>
+                <a:spcPct val="20000"/>
+              </a:spcBef>
+              <a:buFont typeface="Arial" pitchFamily="34" charset="0"/>
+              <a:buChar char="•"/>
+              <a:defRPr sz="2400" kern="1200">
+                <a:solidFill>
+                  <a:schemeClr val="tx1"/>
+                </a:solidFill>
+                <a:latin typeface="+mn-lt"/>
+                <a:ea typeface="+mn-ea"/>
+                <a:cs typeface="+mn-cs"/>
+              </a:defRPr>
+            </a:lvl3pPr>
+            <a:lvl4pPr marL="1600200" indent="-228600" algn="l" defTabSz="914400" rtl="0" eaLnBrk="1" latinLnBrk="0" hangingPunct="1">
+              <a:spcBef>
+                <a:spcPct val="20000"/>
+              </a:spcBef>
+              <a:buFont typeface="Arial" pitchFamily="34" charset="0"/>
+              <a:buChar char="–"/>
+              <a:defRPr sz="2000" kern="1200">
+                <a:solidFill>
+                  <a:schemeClr val="tx1"/>
+                </a:solidFill>
+                <a:latin typeface="+mn-lt"/>
+                <a:ea typeface="+mn-ea"/>
+                <a:cs typeface="+mn-cs"/>
+              </a:defRPr>
+            </a:lvl4pPr>
+            <a:lvl5pPr marL="2057400" indent="-228600" algn="l" defTabSz="914400" rtl="0" eaLnBrk="1" latinLnBrk="0" hangingPunct="1">
+              <a:spcBef>
+                <a:spcPct val="20000"/>
+              </a:spcBef>
+              <a:buFont typeface="Arial" pitchFamily="34" charset="0"/>
+              <a:buChar char="»"/>
+              <a:defRPr sz="2000" kern="1200">
+                <a:solidFill>
+                  <a:schemeClr val="tx1"/>
+                </a:solidFill>
+                <a:latin typeface="+mn-lt"/>
+                <a:ea typeface="+mn-ea"/>
+                <a:cs typeface="+mn-cs"/>
+              </a:defRPr>
+            </a:lvl5pPr>
+            <a:lvl6pPr marL="2514600" indent="-228600" algn="l" defTabSz="914400" rtl="0" eaLnBrk="1" latinLnBrk="0" hangingPunct="1">
+              <a:spcBef>
+                <a:spcPct val="20000"/>
+              </a:spcBef>
+              <a:buFont typeface="Arial" pitchFamily="34" charset="0"/>
+              <a:buChar char="•"/>
+              <a:defRPr sz="2000" kern="1200">
+                <a:solidFill>
+                  <a:schemeClr val="tx1"/>
+                </a:solidFill>
+                <a:latin typeface="+mn-lt"/>
+                <a:ea typeface="+mn-ea"/>
+                <a:cs typeface="+mn-cs"/>
+              </a:defRPr>
+            </a:lvl6pPr>
+            <a:lvl7pPr marL="2971800" indent="-228600" algn="l" defTabSz="914400" rtl="0" eaLnBrk="1" latinLnBrk="0" hangingPunct="1">
+              <a:spcBef>
+                <a:spcPct val="20000"/>
+              </a:spcBef>
+              <a:buFont typeface="Arial" pitchFamily="34" charset="0"/>
+              <a:buChar char="•"/>
+              <a:defRPr sz="2000" kern="1200">
+                <a:solidFill>
+                  <a:schemeClr val="tx1"/>
+                </a:solidFill>
+                <a:latin typeface="+mn-lt"/>
+                <a:ea typeface="+mn-ea"/>
+                <a:cs typeface="+mn-cs"/>
+              </a:defRPr>
+            </a:lvl7pPr>
+            <a:lvl8pPr marL="3429000" indent="-228600" algn="l" defTabSz="914400" rtl="0" eaLnBrk="1" latinLnBrk="0" hangingPunct="1">
+              <a:spcBef>
+                <a:spcPct val="20000"/>
+              </a:spcBef>
+              <a:buFont typeface="Arial" pitchFamily="34" charset="0"/>
+              <a:buChar char="•"/>
+              <a:defRPr sz="2000" kern="1200">
+                <a:solidFill>
+                  <a:schemeClr val="tx1"/>
+                </a:solidFill>
+                <a:latin typeface="+mn-lt"/>
+                <a:ea typeface="+mn-ea"/>
+                <a:cs typeface="+mn-cs"/>
+              </a:defRPr>
+            </a:lvl8pPr>
+            <a:lvl9pPr marL="3886200" indent="-228600" algn="l" defTabSz="914400" rtl="0" eaLnBrk="1" latinLnBrk="0" hangingPunct="1">
+              <a:spcBef>
+                <a:spcPct val="20000"/>
+              </a:spcBef>
+              <a:buFont typeface="Arial" pitchFamily="34" charset="0"/>
+              <a:buChar char="•"/>
+              <a:defRPr sz="2000" kern="1200">
+                <a:solidFill>
+                  <a:schemeClr val="tx1"/>
+                </a:solidFill>
+                <a:latin typeface="+mn-lt"/>
+                <a:ea typeface="+mn-ea"/>
+                <a:cs typeface="+mn-cs"/>
+              </a:defRPr>
+            </a:lvl9pPr>
+          </a:lstStyle>
+          <a:p>
+            <a:pPr marL="0" indent="0">
+              <a:buFont typeface="Arial" pitchFamily="34" charset="0"/>
+              <a:buNone/>
+            </a:pPr>
+            <a:r>
+              <a:rPr lang="en-GB" sz="1200" dirty="0" smtClean="0">
+                <a:solidFill>
+                  <a:prstClr val="black"/>
+                </a:solidFill>
+              </a:rPr>
+              <a:t>Third party names are the property of their owners.</a:t>
+            </a:r>
+            <a:endParaRPr lang="en-GB" sz="1200" dirty="0">
+              <a:solidFill>
+                <a:prstClr val="black"/>
+              </a:solidFill>
+            </a:endParaRPr>
+          </a:p>
+        </p:txBody>
+      </p:sp>
+    </p:spTree>
+    <p:extLst>
+      <p:ext uri="{BB962C8B-B14F-4D97-AF65-F5344CB8AC3E}">
+        <p14:creationId xmlns:p14="http://schemas.microsoft.com/office/powerpoint/2010/main" val="2102093488"/>
+      </p:ext>
+    </p:extLst>
+  </p:cSld>
+  <p:clrMapOvr>
+    <a:masterClrMapping/>
+  </p:clrMapOvr>
+  <mc:AlternateContent xmlns:mc="http://schemas.openxmlformats.org/markup-compatibility/2006">
+    <mc:Choice xmlns:p14="http://schemas.microsoft.com/office/powerpoint/2010/main" Requires="p14">
+      <p:transition spd="slow" p14:dur="2000"/>
+    </mc:Choice>
+    <mc:Fallback>
+      <p:transition xmlns:p14="http://schemas.microsoft.com/office/powerpoint/2010/main" spd="slow"/>
+    </mc:Fallback>
+  </mc:AlternateContent>
+  <p:timing>
+    <p:tnLst>
+      <p:par>
+        <p:cTn xmlns:p14="http://schemas.microsoft.com/office/powerpoint/2010/main" id="1" dur="indefinite" restart="never" nodeType="tmRoot"/>
+      </p:par>
+    </p:tnLst>
+  </p:timing>
+</p:sld>
+</file>
+
+<file path=ppt/slides/slide32.xml><?xml version="1.0" encoding="utf-8"?>
 <p:sld xmlns:a="http://schemas.openxmlformats.org/drawingml/2006/main" xmlns:r="http://schemas.openxmlformats.org/officeDocument/2006/relationships" xmlns:p="http://schemas.openxmlformats.org/presentationml/2006/main" show="0">
   <p:cSld>
     <p:spTree>
@@ -11662,10 +12744,10 @@
           <a:lstStyle/>
           <a:p>
             <a:r>
-              <a:rPr lang="en-GB" dirty="0" smtClean="0"/>
-              <a:t>Using GDB with Intel®</a:t>
-            </a:r>
-            <a:endParaRPr lang="en-GB" dirty="0"/>
+              <a:rPr lang="en-US" dirty="0" smtClean="0"/>
+              <a:t>Debugging Tools</a:t>
+            </a:r>
+            <a:endParaRPr lang="en-US" dirty="0"/>
           </a:p>
         </p:txBody>
       </p:sp>
@@ -11679,474 +12761,106 @@
             <p:ph idx="1"/>
           </p:nvPr>
         </p:nvSpPr>
-        <p:spPr>
-          <a:xfrm>
-            <a:off x="457200" y="1340768"/>
-            <a:ext cx="8686800" cy="5400600"/>
-          </a:xfrm>
-        </p:spPr>
-        <p:txBody>
-          <a:bodyPr>
-            <a:normAutofit fontScale="85000" lnSpcReduction="20000"/>
-          </a:bodyPr>
+        <p:spPr/>
+        <p:txBody>
+          <a:bodyPr/>
           <a:lstStyle/>
           <a:p>
-            <a:pPr>
-              <a:lnSpc>
-                <a:spcPct val="120000"/>
-              </a:lnSpc>
-            </a:pPr>
-            <a:r>
-              <a:rPr lang="en-GB" dirty="0" smtClean="0"/>
-              <a:t>Ensure you select the CPU device from the Intel® platform</a:t>
-            </a:r>
-          </a:p>
-          <a:p>
-            <a:pPr>
-              <a:lnSpc>
-                <a:spcPct val="120000"/>
-              </a:lnSpc>
-            </a:pPr>
-            <a:r>
-              <a:rPr lang="en-GB" dirty="0" smtClean="0"/>
-              <a:t>Enable debugging symbols and add the absolute path to the kernel source code when building the kernels:</a:t>
-            </a:r>
-            <a:endParaRPr lang="en-GB" dirty="0"/>
-          </a:p>
-          <a:p>
-            <a:pPr marL="457200" lvl="1" indent="0">
-              <a:lnSpc>
-                <a:spcPct val="120000"/>
-              </a:lnSpc>
-              <a:buNone/>
-            </a:pPr>
-            <a:r>
-              <a:rPr lang="en-GB" b="1" dirty="0" err="1" smtClean="0">
+            <a:r>
+              <a:rPr lang="en-US" dirty="0" smtClean="0"/>
+              <a:t>AMD </a:t>
+            </a:r>
+            <a:r>
+              <a:rPr lang="en-US" dirty="0" err="1" smtClean="0"/>
+              <a:t>CodeXL</a:t>
+            </a:r>
+            <a:endParaRPr lang="en-US" dirty="0" smtClean="0"/>
+          </a:p>
+          <a:p>
+            <a:r>
+              <a:rPr lang="en-US" dirty="0" smtClean="0"/>
+              <a:t>Intel SDK (Visual Studio plugin)</a:t>
+            </a:r>
+          </a:p>
+          <a:p>
+            <a:r>
+              <a:rPr lang="en-US" dirty="0" smtClean="0"/>
+              <a:t>GDB (CPU platforms)</a:t>
+            </a:r>
+          </a:p>
+          <a:p>
+            <a:r>
+              <a:rPr lang="en-US" dirty="0" err="1" smtClean="0"/>
+              <a:t>Oclgrind</a:t>
+            </a:r>
+            <a:endParaRPr lang="en-US" dirty="0" smtClean="0"/>
+          </a:p>
+          <a:p>
+            <a:r>
+              <a:rPr lang="en-US" dirty="0" err="1" smtClean="0"/>
+              <a:t>GPUVerify</a:t>
+            </a:r>
+            <a:endParaRPr lang="en-US" dirty="0" smtClean="0"/>
+          </a:p>
+          <a:p>
+            <a:r>
+              <a:rPr lang="en-US" b="1" dirty="0" err="1" smtClean="0">
                 <a:solidFill>
                   <a:srgbClr val="3366FF"/>
                 </a:solidFill>
                 <a:latin typeface="Courier New"/>
                 <a:cs typeface="Courier New"/>
               </a:rPr>
-              <a:t>clBuildProgram</a:t>
-            </a:r>
-            <a:r>
-              <a:rPr lang="en-GB" b="1" dirty="0" smtClean="0">
+              <a:t>printf</a:t>
+            </a:r>
+            <a:r>
+              <a:rPr lang="en-US" b="1" dirty="0" smtClean="0">
                 <a:solidFill>
                   <a:srgbClr val="3366FF"/>
                 </a:solidFill>
                 <a:latin typeface="Courier New"/>
                 <a:cs typeface="Courier New"/>
               </a:rPr>
-              <a:t>(… </a:t>
-            </a:r>
-            <a:r>
-              <a:rPr lang="en-GB" b="1" dirty="0">
-                <a:solidFill>
-                  <a:srgbClr val="3366FF"/>
-                </a:solidFill>
-                <a:latin typeface="Courier New"/>
-                <a:cs typeface="Courier New"/>
-              </a:rPr>
-              <a:t>"–</a:t>
-            </a:r>
-            <a:r>
-              <a:rPr lang="en-GB" b="1" dirty="0" smtClean="0">
-                <a:solidFill>
-                  <a:srgbClr val="3366FF"/>
-                </a:solidFill>
-                <a:latin typeface="Courier New"/>
-                <a:cs typeface="Courier New"/>
-              </a:rPr>
-              <a:t>g –s /path/to/</a:t>
-            </a:r>
-            <a:r>
-              <a:rPr lang="en-GB" b="1" dirty="0" err="1" smtClean="0">
-                <a:solidFill>
-                  <a:srgbClr val="3366FF"/>
-                </a:solidFill>
-                <a:latin typeface="Courier New"/>
-                <a:cs typeface="Courier New"/>
-              </a:rPr>
-              <a:t>kernel.cl</a:t>
-            </a:r>
-            <a:r>
-              <a:rPr lang="en-GB" b="1" dirty="0" smtClean="0">
-                <a:solidFill>
-                  <a:srgbClr val="3366FF"/>
-                </a:solidFill>
-                <a:latin typeface="Courier New"/>
-                <a:cs typeface="Courier New"/>
-              </a:rPr>
-              <a:t>" …);</a:t>
-            </a:r>
-            <a:endParaRPr lang="en-GB" dirty="0" smtClean="0"/>
-          </a:p>
-          <a:p>
-            <a:pPr>
-              <a:lnSpc>
-                <a:spcPct val="120000"/>
-              </a:lnSpc>
-            </a:pPr>
-            <a:r>
-              <a:rPr lang="en-GB" dirty="0" smtClean="0"/>
-              <a:t>The </a:t>
-            </a:r>
-            <a:r>
-              <a:rPr lang="en-GB" dirty="0"/>
-              <a:t>symbolic name of a kernel function </a:t>
-            </a:r>
-            <a:r>
-              <a:rPr lang="en-GB" dirty="0" smtClean="0"/>
-              <a:t>‘</a:t>
-            </a:r>
-            <a:r>
-              <a:rPr lang="en-GB" b="1" dirty="0" smtClean="0">
-                <a:solidFill>
-                  <a:srgbClr val="3366FF"/>
-                </a:solidFill>
-                <a:latin typeface="Courier New"/>
-                <a:cs typeface="Courier New"/>
-              </a:rPr>
-              <a:t>kernel </a:t>
-            </a:r>
-            <a:r>
-              <a:rPr lang="en-GB" b="1" dirty="0">
-                <a:solidFill>
-                  <a:srgbClr val="3366FF"/>
-                </a:solidFill>
-                <a:latin typeface="Courier New"/>
-                <a:cs typeface="Courier New"/>
-              </a:rPr>
-              <a:t>void </a:t>
-            </a:r>
-            <a:r>
-              <a:rPr lang="en-GB" b="1" dirty="0" smtClean="0">
-                <a:solidFill>
-                  <a:srgbClr val="3366FF"/>
-                </a:solidFill>
-                <a:latin typeface="Courier New"/>
-                <a:cs typeface="Courier New"/>
-              </a:rPr>
-              <a:t>foo(</a:t>
-            </a:r>
-            <a:r>
-              <a:rPr lang="en-GB" b="1" dirty="0" err="1">
-                <a:solidFill>
-                  <a:srgbClr val="3366FF"/>
-                </a:solidFill>
-                <a:latin typeface="Courier New"/>
-                <a:cs typeface="Courier New"/>
-              </a:rPr>
-              <a:t>args</a:t>
-            </a:r>
-            <a:r>
-              <a:rPr lang="en-GB" b="1" dirty="0" smtClean="0">
-                <a:solidFill>
-                  <a:srgbClr val="3366FF"/>
-                </a:solidFill>
-                <a:latin typeface="Courier New"/>
-                <a:cs typeface="Courier New"/>
-              </a:rPr>
-              <a:t>)</a:t>
-            </a:r>
-            <a:r>
-              <a:rPr lang="en-GB" b="1" dirty="0" smtClean="0"/>
-              <a:t>’</a:t>
-            </a:r>
-            <a:r>
-              <a:rPr lang="en-GB" dirty="0" smtClean="0"/>
-              <a:t> will just be </a:t>
-            </a:r>
-            <a:r>
-              <a:rPr lang="en-GB" b="1" dirty="0" smtClean="0">
-                <a:solidFill>
-                  <a:srgbClr val="3366FF"/>
-                </a:solidFill>
-                <a:latin typeface="Courier New"/>
-                <a:cs typeface="Courier New"/>
-              </a:rPr>
-              <a:t>foo</a:t>
-            </a:r>
-            <a:endParaRPr lang="en-GB" dirty="0" smtClean="0"/>
-          </a:p>
-          <a:p>
-            <a:pPr lvl="1">
-              <a:lnSpc>
-                <a:spcPct val="110000"/>
-              </a:lnSpc>
-            </a:pPr>
-            <a:r>
-              <a:rPr lang="en-GB" dirty="0" smtClean="0"/>
-              <a:t>To </a:t>
-            </a:r>
-            <a:r>
-              <a:rPr lang="en-GB" dirty="0"/>
-              <a:t>set a breakpoint on kernel entry enter at the GDB </a:t>
-            </a:r>
-            <a:r>
-              <a:rPr lang="en-GB" dirty="0" smtClean="0"/>
-              <a:t>prompt:</a:t>
-            </a:r>
-          </a:p>
-          <a:p>
-            <a:pPr marL="857250" lvl="2" indent="0">
-              <a:lnSpc>
-                <a:spcPct val="110000"/>
-              </a:lnSpc>
-              <a:buNone/>
-            </a:pPr>
-            <a:r>
-              <a:rPr lang="en-GB" sz="2600" b="1" dirty="0">
-                <a:solidFill>
-                  <a:srgbClr val="3366FF"/>
-                </a:solidFill>
-                <a:latin typeface="Courier New"/>
-                <a:cs typeface="Courier New"/>
-              </a:rPr>
-              <a:t>break </a:t>
-            </a:r>
-            <a:r>
-              <a:rPr lang="en-GB" sz="2600" b="1" dirty="0" smtClean="0">
-                <a:solidFill>
-                  <a:srgbClr val="3366FF"/>
-                </a:solidFill>
-                <a:latin typeface="Courier New"/>
-                <a:cs typeface="Courier New"/>
-              </a:rPr>
-              <a:t>foo</a:t>
-            </a:r>
-            <a:endParaRPr lang="en-GB" sz="2600" dirty="0" smtClean="0">
-              <a:latin typeface="Courier New"/>
-              <a:cs typeface="Courier New"/>
+              <a:t> </a:t>
+            </a:r>
+            <a:r>
+              <a:rPr lang="en-US" dirty="0" smtClean="0">
+                <a:latin typeface="Calibri"/>
+                <a:cs typeface="Calibri"/>
+              </a:rPr>
+              <a:t>( from OpenCL 1.2 onwards )</a:t>
+            </a:r>
+            <a:endParaRPr lang="en-US" b="1" dirty="0" smtClean="0">
+              <a:solidFill>
+                <a:srgbClr val="3366FF"/>
+              </a:solidFill>
+              <a:latin typeface="Calibri"/>
+              <a:cs typeface="Calibri"/>
             </a:endParaRPr>
           </a:p>
           <a:p>
-            <a:pPr lvl="1">
-              <a:lnSpc>
-                <a:spcPct val="110000"/>
-              </a:lnSpc>
-            </a:pPr>
-            <a:r>
-              <a:rPr lang="en-GB" dirty="0" smtClean="0"/>
-              <a:t>This can only be done </a:t>
-            </a:r>
-            <a:r>
-              <a:rPr lang="en-GB" i="1" dirty="0" smtClean="0"/>
-              <a:t>after</a:t>
-            </a:r>
-            <a:r>
-              <a:rPr lang="en-GB" dirty="0" smtClean="0"/>
-              <a:t> the kernels have been built</a:t>
-            </a:r>
-          </a:p>
-          <a:p>
-            <a:pPr>
-              <a:lnSpc>
-                <a:spcPct val="110000"/>
-              </a:lnSpc>
-            </a:pPr>
-            <a:r>
-              <a:rPr lang="en-GB" dirty="0" smtClean="0"/>
-              <a:t>On Windows, this functionality is provided via a graphical user interface inside Visual Studio</a:t>
-            </a:r>
-          </a:p>
-        </p:txBody>
-      </p:sp>
-      <p:sp>
-        <p:nvSpPr>
-          <p:cNvPr id="4" name="Content Placeholder 7"/>
-          <p:cNvSpPr txBox="1">
-            <a:spLocks/>
-          </p:cNvSpPr>
-          <p:nvPr/>
-        </p:nvSpPr>
-        <p:spPr>
-          <a:xfrm>
-            <a:off x="107504" y="6453337"/>
-            <a:ext cx="4861484" cy="404664"/>
-          </a:xfrm>
-          <a:prstGeom prst="rect">
-            <a:avLst/>
-          </a:prstGeom>
-        </p:spPr>
-        <p:txBody>
-          <a:bodyPr vert="horz" lIns="91440" tIns="45720" rIns="91440" bIns="45720" rtlCol="0">
-            <a:normAutofit/>
-          </a:bodyPr>
-          <a:lstStyle>
-            <a:lvl1pPr marL="342900" indent="-342900" algn="l" defTabSz="914400" rtl="0" eaLnBrk="1" latinLnBrk="0" hangingPunct="1">
-              <a:spcBef>
-                <a:spcPct val="20000"/>
-              </a:spcBef>
-              <a:buFont typeface="Arial" pitchFamily="34" charset="0"/>
-              <a:buChar char="•"/>
-              <a:defRPr sz="3200" kern="1200">
-                <a:solidFill>
-                  <a:schemeClr val="tx1"/>
-                </a:solidFill>
-                <a:latin typeface="+mn-lt"/>
-                <a:ea typeface="+mn-ea"/>
-                <a:cs typeface="+mn-cs"/>
-              </a:defRPr>
-            </a:lvl1pPr>
-            <a:lvl2pPr marL="742950" indent="-285750" algn="l" defTabSz="914400" rtl="0" eaLnBrk="1" latinLnBrk="0" hangingPunct="1">
-              <a:spcBef>
-                <a:spcPct val="20000"/>
-              </a:spcBef>
-              <a:buFont typeface="Arial" pitchFamily="34" charset="0"/>
-              <a:buChar char="–"/>
-              <a:defRPr sz="2800" kern="1200">
-                <a:solidFill>
-                  <a:schemeClr val="tx1"/>
-                </a:solidFill>
-                <a:latin typeface="+mn-lt"/>
-                <a:ea typeface="+mn-ea"/>
-                <a:cs typeface="+mn-cs"/>
-              </a:defRPr>
-            </a:lvl2pPr>
-            <a:lvl3pPr marL="1143000" indent="-228600" algn="l" defTabSz="914400" rtl="0" eaLnBrk="1" latinLnBrk="0" hangingPunct="1">
-              <a:spcBef>
-                <a:spcPct val="20000"/>
-              </a:spcBef>
-              <a:buFont typeface="Arial" pitchFamily="34" charset="0"/>
-              <a:buChar char="•"/>
-              <a:defRPr sz="2400" kern="1200">
-                <a:solidFill>
-                  <a:schemeClr val="tx1"/>
-                </a:solidFill>
-                <a:latin typeface="+mn-lt"/>
-                <a:ea typeface="+mn-ea"/>
-                <a:cs typeface="+mn-cs"/>
-              </a:defRPr>
-            </a:lvl3pPr>
-            <a:lvl4pPr marL="1600200" indent="-228600" algn="l" defTabSz="914400" rtl="0" eaLnBrk="1" latinLnBrk="0" hangingPunct="1">
-              <a:spcBef>
-                <a:spcPct val="20000"/>
-              </a:spcBef>
-              <a:buFont typeface="Arial" pitchFamily="34" charset="0"/>
-              <a:buChar char="–"/>
-              <a:defRPr sz="2000" kern="1200">
-                <a:solidFill>
-                  <a:schemeClr val="tx1"/>
-                </a:solidFill>
-                <a:latin typeface="+mn-lt"/>
-                <a:ea typeface="+mn-ea"/>
-                <a:cs typeface="+mn-cs"/>
-              </a:defRPr>
-            </a:lvl4pPr>
-            <a:lvl5pPr marL="2057400" indent="-228600" algn="l" defTabSz="914400" rtl="0" eaLnBrk="1" latinLnBrk="0" hangingPunct="1">
-              <a:spcBef>
-                <a:spcPct val="20000"/>
-              </a:spcBef>
-              <a:buFont typeface="Arial" pitchFamily="34" charset="0"/>
-              <a:buChar char="»"/>
-              <a:defRPr sz="2000" kern="1200">
-                <a:solidFill>
-                  <a:schemeClr val="tx1"/>
-                </a:solidFill>
-                <a:latin typeface="+mn-lt"/>
-                <a:ea typeface="+mn-ea"/>
-                <a:cs typeface="+mn-cs"/>
-              </a:defRPr>
-            </a:lvl5pPr>
-            <a:lvl6pPr marL="2514600" indent="-228600" algn="l" defTabSz="914400" rtl="0" eaLnBrk="1" latinLnBrk="0" hangingPunct="1">
-              <a:spcBef>
-                <a:spcPct val="20000"/>
-              </a:spcBef>
-              <a:buFont typeface="Arial" pitchFamily="34" charset="0"/>
-              <a:buChar char="•"/>
-              <a:defRPr sz="2000" kern="1200">
-                <a:solidFill>
-                  <a:schemeClr val="tx1"/>
-                </a:solidFill>
-                <a:latin typeface="+mn-lt"/>
-                <a:ea typeface="+mn-ea"/>
-                <a:cs typeface="+mn-cs"/>
-              </a:defRPr>
-            </a:lvl6pPr>
-            <a:lvl7pPr marL="2971800" indent="-228600" algn="l" defTabSz="914400" rtl="0" eaLnBrk="1" latinLnBrk="0" hangingPunct="1">
-              <a:spcBef>
-                <a:spcPct val="20000"/>
-              </a:spcBef>
-              <a:buFont typeface="Arial" pitchFamily="34" charset="0"/>
-              <a:buChar char="•"/>
-              <a:defRPr sz="2000" kern="1200">
-                <a:solidFill>
-                  <a:schemeClr val="tx1"/>
-                </a:solidFill>
-                <a:latin typeface="+mn-lt"/>
-                <a:ea typeface="+mn-ea"/>
-                <a:cs typeface="+mn-cs"/>
-              </a:defRPr>
-            </a:lvl7pPr>
-            <a:lvl8pPr marL="3429000" indent="-228600" algn="l" defTabSz="914400" rtl="0" eaLnBrk="1" latinLnBrk="0" hangingPunct="1">
-              <a:spcBef>
-                <a:spcPct val="20000"/>
-              </a:spcBef>
-              <a:buFont typeface="Arial" pitchFamily="34" charset="0"/>
-              <a:buChar char="•"/>
-              <a:defRPr sz="2000" kern="1200">
-                <a:solidFill>
-                  <a:schemeClr val="tx1"/>
-                </a:solidFill>
-                <a:latin typeface="+mn-lt"/>
-                <a:ea typeface="+mn-ea"/>
-                <a:cs typeface="+mn-cs"/>
-              </a:defRPr>
-            </a:lvl8pPr>
-            <a:lvl9pPr marL="3886200" indent="-228600" algn="l" defTabSz="914400" rtl="0" eaLnBrk="1" latinLnBrk="0" hangingPunct="1">
-              <a:spcBef>
-                <a:spcPct val="20000"/>
-              </a:spcBef>
-              <a:buFont typeface="Arial" pitchFamily="34" charset="0"/>
-              <a:buChar char="•"/>
-              <a:defRPr sz="2000" kern="1200">
-                <a:solidFill>
-                  <a:schemeClr val="tx1"/>
-                </a:solidFill>
-                <a:latin typeface="+mn-lt"/>
-                <a:ea typeface="+mn-ea"/>
-                <a:cs typeface="+mn-cs"/>
-              </a:defRPr>
-            </a:lvl9pPr>
-          </a:lstStyle>
-          <a:p>
-            <a:pPr marL="0" indent="0">
-              <a:buFont typeface="Arial" pitchFamily="34" charset="0"/>
-              <a:buNone/>
-            </a:pPr>
-            <a:r>
-              <a:rPr lang="en-GB" sz="1200" dirty="0" smtClean="0">
-                <a:solidFill>
-                  <a:prstClr val="black"/>
-                </a:solidFill>
-              </a:rPr>
-              <a:t>Third party names are the property of their owners.</a:t>
-            </a:r>
-            <a:endParaRPr lang="en-GB" sz="1200" dirty="0">
-              <a:solidFill>
-                <a:prstClr val="black"/>
-              </a:solidFill>
-            </a:endParaRPr>
+            <a:endParaRPr lang="en-US" dirty="0" smtClean="0"/>
+          </a:p>
+          <a:p>
+            <a:endParaRPr lang="en-US" dirty="0"/>
           </a:p>
         </p:txBody>
       </p:sp>
     </p:spTree>
     <p:extLst>
       <p:ext uri="{BB962C8B-B14F-4D97-AF65-F5344CB8AC3E}">
-        <p14:creationId xmlns:p14="http://schemas.microsoft.com/office/powerpoint/2010/main" val="2104821692"/>
+        <p14:creationId xmlns:p14="http://schemas.microsoft.com/office/powerpoint/2010/main" val="1605154899"/>
       </p:ext>
     </p:extLst>
   </p:cSld>
   <p:clrMapOvr>
     <a:masterClrMapping/>
   </p:clrMapOvr>
-  <mc:AlternateContent xmlns:mc="http://schemas.openxmlformats.org/markup-compatibility/2006" xmlns:p14="http://schemas.microsoft.com/office/powerpoint/2010/main">
-    <mc:Choice Requires="p14">
+  <mc:AlternateContent xmlns:mc="http://schemas.openxmlformats.org/markup-compatibility/2006">
+    <mc:Choice xmlns:p14="http://schemas.microsoft.com/office/powerpoint/2010/main" Requires="p14">
       <p:transition spd="slow" p14:dur="2000"/>
     </mc:Choice>
-    <mc:Fallback xmlns="">
+    <mc:Fallback>
       <p:transition xmlns:p14="http://schemas.microsoft.com/office/powerpoint/2010/main" spd="slow"/>
     </mc:Fallback>
   </mc:AlternateContent>
@@ -12160,558 +12874,7 @@
 </p:sld>
 </file>
 
-<file path=ppt/slides/slide31.xml><?xml version="1.0" encoding="utf-8"?>
-<p:sld xmlns:a="http://schemas.openxmlformats.org/drawingml/2006/main" xmlns:r="http://schemas.openxmlformats.org/officeDocument/2006/relationships" xmlns:p="http://schemas.openxmlformats.org/presentationml/2006/main" show="0">
-  <p:cSld>
-    <p:spTree>
-      <p:nvGrpSpPr>
-        <p:cNvPr id="1" name=""/>
-        <p:cNvGrpSpPr/>
-        <p:nvPr/>
-      </p:nvGrpSpPr>
-      <p:grpSpPr>
-        <a:xfrm>
-          <a:off x="0" y="0"/>
-          <a:ext cx="0" cy="0"/>
-          <a:chOff x="0" y="0"/>
-          <a:chExt cx="0" cy="0"/>
-        </a:xfrm>
-      </p:grpSpPr>
-      <p:sp>
-        <p:nvSpPr>
-          <p:cNvPr id="2" name="Title 1"/>
-          <p:cNvSpPr>
-            <a:spLocks noGrp="1"/>
-          </p:cNvSpPr>
-          <p:nvPr>
-            <p:ph type="title"/>
-          </p:nvPr>
-        </p:nvSpPr>
-        <p:spPr/>
-        <p:txBody>
-          <a:bodyPr/>
-          <a:lstStyle/>
-          <a:p>
-            <a:r>
-              <a:rPr lang="en-GB" dirty="0" smtClean="0"/>
-              <a:t>Using GDB with AMD®</a:t>
-            </a:r>
-            <a:endParaRPr lang="en-GB" dirty="0"/>
-          </a:p>
-        </p:txBody>
-      </p:sp>
-      <p:sp>
-        <p:nvSpPr>
-          <p:cNvPr id="3" name="Content Placeholder 2"/>
-          <p:cNvSpPr>
-            <a:spLocks noGrp="1"/>
-          </p:cNvSpPr>
-          <p:nvPr>
-            <p:ph idx="1"/>
-          </p:nvPr>
-        </p:nvSpPr>
-        <p:spPr>
-          <a:xfrm>
-            <a:off x="457200" y="1600200"/>
-            <a:ext cx="8229600" cy="4925144"/>
-          </a:xfrm>
-        </p:spPr>
-        <p:txBody>
-          <a:bodyPr>
-            <a:normAutofit fontScale="77500" lnSpcReduction="20000"/>
-          </a:bodyPr>
-          <a:lstStyle/>
-          <a:p>
-            <a:pPr>
-              <a:lnSpc>
-                <a:spcPct val="120000"/>
-              </a:lnSpc>
-            </a:pPr>
-            <a:r>
-              <a:rPr lang="en-GB" dirty="0" smtClean="0"/>
-              <a:t>Ensure you select the CPU device from the AMD® platform</a:t>
-            </a:r>
-          </a:p>
-          <a:p>
-            <a:pPr>
-              <a:lnSpc>
-                <a:spcPct val="120000"/>
-              </a:lnSpc>
-            </a:pPr>
-            <a:r>
-              <a:rPr lang="en-GB" dirty="0" smtClean="0"/>
-              <a:t>Enable debugging symbols and turn off all optimizations </a:t>
-            </a:r>
-            <a:r>
-              <a:rPr lang="en-GB" dirty="0"/>
-              <a:t>when building the </a:t>
-            </a:r>
-            <a:r>
-              <a:rPr lang="en-GB" dirty="0" smtClean="0"/>
-              <a:t>kernels:</a:t>
-            </a:r>
-          </a:p>
-          <a:p>
-            <a:pPr marL="457200" lvl="1" indent="0">
-              <a:lnSpc>
-                <a:spcPct val="120000"/>
-              </a:lnSpc>
-              <a:buNone/>
-            </a:pPr>
-            <a:r>
-              <a:rPr lang="en-GB" b="1" dirty="0" err="1" smtClean="0">
-                <a:solidFill>
-                  <a:srgbClr val="3366FF"/>
-                </a:solidFill>
-                <a:latin typeface="Courier New"/>
-                <a:cs typeface="Courier New"/>
-              </a:rPr>
-              <a:t>clBuildProgram</a:t>
-            </a:r>
-            <a:r>
-              <a:rPr lang="en-GB" b="1" dirty="0" smtClean="0">
-                <a:solidFill>
-                  <a:srgbClr val="3366FF"/>
-                </a:solidFill>
-                <a:latin typeface="Courier New"/>
-                <a:cs typeface="Courier New"/>
-              </a:rPr>
-              <a:t>(… </a:t>
-            </a:r>
-            <a:r>
-              <a:rPr lang="en-GB" b="1" dirty="0">
-                <a:solidFill>
-                  <a:srgbClr val="3366FF"/>
-                </a:solidFill>
-                <a:latin typeface="Courier New"/>
-                <a:cs typeface="Courier New"/>
-              </a:rPr>
-              <a:t>"–</a:t>
-            </a:r>
-            <a:r>
-              <a:rPr lang="en-GB" b="1" dirty="0" smtClean="0">
-                <a:solidFill>
-                  <a:srgbClr val="3366FF"/>
-                </a:solidFill>
-                <a:latin typeface="Courier New"/>
-                <a:cs typeface="Courier New"/>
-              </a:rPr>
-              <a:t>g –O0" …);</a:t>
-            </a:r>
-            <a:endParaRPr lang="en-GB" dirty="0" smtClean="0"/>
-          </a:p>
-          <a:p>
-            <a:pPr>
-              <a:lnSpc>
-                <a:spcPct val="120000"/>
-              </a:lnSpc>
-            </a:pPr>
-            <a:r>
-              <a:rPr lang="en-GB" dirty="0" smtClean="0"/>
-              <a:t>The </a:t>
-            </a:r>
-            <a:r>
-              <a:rPr lang="en-GB" dirty="0"/>
-              <a:t>symbolic name of a kernel function </a:t>
-            </a:r>
-            <a:r>
-              <a:rPr lang="en-GB" dirty="0" smtClean="0"/>
-              <a:t>‘</a:t>
-            </a:r>
-            <a:r>
-              <a:rPr lang="en-GB" b="1" dirty="0" smtClean="0">
-                <a:solidFill>
-                  <a:srgbClr val="3366FF"/>
-                </a:solidFill>
-                <a:latin typeface="Courier New"/>
-                <a:cs typeface="Courier New"/>
-              </a:rPr>
-              <a:t>kernel </a:t>
-            </a:r>
-            <a:r>
-              <a:rPr lang="en-GB" b="1" dirty="0">
-                <a:solidFill>
-                  <a:srgbClr val="3366FF"/>
-                </a:solidFill>
-                <a:latin typeface="Courier New"/>
-                <a:cs typeface="Courier New"/>
-              </a:rPr>
-              <a:t>void </a:t>
-            </a:r>
-            <a:r>
-              <a:rPr lang="en-GB" b="1" dirty="0" smtClean="0">
-                <a:solidFill>
-                  <a:srgbClr val="3366FF"/>
-                </a:solidFill>
-                <a:latin typeface="Courier New"/>
-                <a:cs typeface="Courier New"/>
-              </a:rPr>
-              <a:t>foo(</a:t>
-            </a:r>
-            <a:r>
-              <a:rPr lang="en-GB" b="1" dirty="0" err="1">
-                <a:solidFill>
-                  <a:srgbClr val="3366FF"/>
-                </a:solidFill>
-                <a:latin typeface="Courier New"/>
-                <a:cs typeface="Courier New"/>
-              </a:rPr>
-              <a:t>args</a:t>
-            </a:r>
-            <a:r>
-              <a:rPr lang="en-GB" b="1" dirty="0" smtClean="0">
-                <a:solidFill>
-                  <a:srgbClr val="3366FF"/>
-                </a:solidFill>
-                <a:latin typeface="Courier New"/>
-                <a:cs typeface="Courier New"/>
-              </a:rPr>
-              <a:t>)</a:t>
-            </a:r>
-            <a:r>
-              <a:rPr lang="en-GB" b="1" dirty="0" smtClean="0"/>
-              <a:t>’</a:t>
-            </a:r>
-            <a:r>
-              <a:rPr lang="en-GB" dirty="0" smtClean="0"/>
-              <a:t> will be </a:t>
-            </a:r>
-            <a:r>
-              <a:rPr lang="en-GB" b="1" dirty="0" smtClean="0">
-                <a:solidFill>
-                  <a:srgbClr val="3366FF"/>
-                </a:solidFill>
-                <a:latin typeface="Courier New"/>
-                <a:cs typeface="Courier New"/>
-              </a:rPr>
-              <a:t>__</a:t>
-            </a:r>
-            <a:r>
-              <a:rPr lang="en-GB" b="1" dirty="0" err="1" smtClean="0">
-                <a:solidFill>
-                  <a:srgbClr val="3366FF"/>
-                </a:solidFill>
-                <a:latin typeface="Courier New"/>
-                <a:cs typeface="Courier New"/>
-              </a:rPr>
-              <a:t>OpenCL_foo_kernel</a:t>
-            </a:r>
-            <a:endParaRPr lang="en-GB" dirty="0" smtClean="0"/>
-          </a:p>
-          <a:p>
-            <a:pPr lvl="1">
-              <a:lnSpc>
-                <a:spcPct val="110000"/>
-              </a:lnSpc>
-            </a:pPr>
-            <a:r>
-              <a:rPr lang="en-GB" dirty="0" smtClean="0"/>
-              <a:t>To </a:t>
-            </a:r>
-            <a:r>
-              <a:rPr lang="en-GB" dirty="0"/>
-              <a:t>set a breakpoint on kernel entry enter at the GDB </a:t>
-            </a:r>
-            <a:r>
-              <a:rPr lang="en-GB" dirty="0" smtClean="0"/>
-              <a:t>prompt:</a:t>
-            </a:r>
-          </a:p>
-          <a:p>
-            <a:pPr marL="857250" lvl="2" indent="0">
-              <a:lnSpc>
-                <a:spcPct val="110000"/>
-              </a:lnSpc>
-              <a:buNone/>
-            </a:pPr>
-            <a:r>
-              <a:rPr lang="en-GB" b="1" dirty="0">
-                <a:solidFill>
-                  <a:srgbClr val="3366FF"/>
-                </a:solidFill>
-                <a:latin typeface="Courier New Bold"/>
-              </a:rPr>
-              <a:t>break </a:t>
-            </a:r>
-            <a:r>
-              <a:rPr lang="en-GB" b="1" dirty="0" smtClean="0">
-                <a:solidFill>
-                  <a:srgbClr val="3366FF"/>
-                </a:solidFill>
-                <a:latin typeface="Courier New Bold"/>
-              </a:rPr>
-              <a:t>__</a:t>
-            </a:r>
-            <a:r>
-              <a:rPr lang="en-GB" b="1" dirty="0" err="1" smtClean="0">
-                <a:solidFill>
-                  <a:srgbClr val="3366FF"/>
-                </a:solidFill>
-                <a:latin typeface="Courier New Bold"/>
-              </a:rPr>
-              <a:t>OpenCL_foo_kernel</a:t>
-            </a:r>
-            <a:endParaRPr lang="en-GB" dirty="0" smtClean="0"/>
-          </a:p>
-          <a:p>
-            <a:pPr lvl="1">
-              <a:lnSpc>
-                <a:spcPct val="110000"/>
-              </a:lnSpc>
-            </a:pPr>
-            <a:r>
-              <a:rPr lang="en-GB" dirty="0" smtClean="0"/>
-              <a:t>This can only be done </a:t>
-            </a:r>
-            <a:r>
-              <a:rPr lang="en-GB" i="1" dirty="0" smtClean="0"/>
-              <a:t>after</a:t>
-            </a:r>
-            <a:r>
-              <a:rPr lang="en-GB" dirty="0" smtClean="0"/>
-              <a:t> the kernels have been built 	</a:t>
-            </a:r>
-            <a:endParaRPr lang="en-GB" b="1" dirty="0" smtClean="0">
-              <a:solidFill>
-                <a:srgbClr val="3366FF"/>
-              </a:solidFill>
-              <a:latin typeface="Courier New Bold"/>
-            </a:endParaRPr>
-          </a:p>
-          <a:p>
-            <a:pPr>
-              <a:lnSpc>
-                <a:spcPct val="120000"/>
-              </a:lnSpc>
-            </a:pPr>
-            <a:r>
-              <a:rPr lang="en-GB" dirty="0" smtClean="0"/>
-              <a:t>AMD® recommend setting the environment variable </a:t>
-            </a:r>
-            <a:r>
-              <a:rPr lang="en-GB" b="1" dirty="0" smtClean="0">
-                <a:solidFill>
-                  <a:srgbClr val="3366FF"/>
-                </a:solidFill>
-                <a:latin typeface="Courier New Bold"/>
-              </a:rPr>
-              <a:t>CPU_MAX_COMPUTE_UNITS=1</a:t>
-            </a:r>
-            <a:r>
-              <a:rPr lang="en-GB" dirty="0" smtClean="0"/>
-              <a:t> to ensure deterministic kernel behaviour</a:t>
-            </a:r>
-          </a:p>
-        </p:txBody>
-      </p:sp>
-      <p:sp>
-        <p:nvSpPr>
-          <p:cNvPr id="4" name="Content Placeholder 7"/>
-          <p:cNvSpPr txBox="1">
-            <a:spLocks/>
-          </p:cNvSpPr>
-          <p:nvPr/>
-        </p:nvSpPr>
-        <p:spPr>
-          <a:xfrm>
-            <a:off x="107504" y="6453337"/>
-            <a:ext cx="4861484" cy="404664"/>
-          </a:xfrm>
-          <a:prstGeom prst="rect">
-            <a:avLst/>
-          </a:prstGeom>
-        </p:spPr>
-        <p:txBody>
-          <a:bodyPr vert="horz" lIns="91440" tIns="45720" rIns="91440" bIns="45720" rtlCol="0">
-            <a:normAutofit/>
-          </a:bodyPr>
-          <a:lstStyle>
-            <a:lvl1pPr marL="342900" indent="-342900" algn="l" defTabSz="914400" rtl="0" eaLnBrk="1" latinLnBrk="0" hangingPunct="1">
-              <a:spcBef>
-                <a:spcPct val="20000"/>
-              </a:spcBef>
-              <a:buFont typeface="Arial" pitchFamily="34" charset="0"/>
-              <a:buChar char="•"/>
-              <a:defRPr sz="3200" kern="1200">
-                <a:solidFill>
-                  <a:schemeClr val="tx1"/>
-                </a:solidFill>
-                <a:latin typeface="+mn-lt"/>
-                <a:ea typeface="+mn-ea"/>
-                <a:cs typeface="+mn-cs"/>
-              </a:defRPr>
-            </a:lvl1pPr>
-            <a:lvl2pPr marL="742950" indent="-285750" algn="l" defTabSz="914400" rtl="0" eaLnBrk="1" latinLnBrk="0" hangingPunct="1">
-              <a:spcBef>
-                <a:spcPct val="20000"/>
-              </a:spcBef>
-              <a:buFont typeface="Arial" pitchFamily="34" charset="0"/>
-              <a:buChar char="–"/>
-              <a:defRPr sz="2800" kern="1200">
-                <a:solidFill>
-                  <a:schemeClr val="tx1"/>
-                </a:solidFill>
-                <a:latin typeface="+mn-lt"/>
-                <a:ea typeface="+mn-ea"/>
-                <a:cs typeface="+mn-cs"/>
-              </a:defRPr>
-            </a:lvl2pPr>
-            <a:lvl3pPr marL="1143000" indent="-228600" algn="l" defTabSz="914400" rtl="0" eaLnBrk="1" latinLnBrk="0" hangingPunct="1">
-              <a:spcBef>
-                <a:spcPct val="20000"/>
-              </a:spcBef>
-              <a:buFont typeface="Arial" pitchFamily="34" charset="0"/>
-              <a:buChar char="•"/>
-              <a:defRPr sz="2400" kern="1200">
-                <a:solidFill>
-                  <a:schemeClr val="tx1"/>
-                </a:solidFill>
-                <a:latin typeface="+mn-lt"/>
-                <a:ea typeface="+mn-ea"/>
-                <a:cs typeface="+mn-cs"/>
-              </a:defRPr>
-            </a:lvl3pPr>
-            <a:lvl4pPr marL="1600200" indent="-228600" algn="l" defTabSz="914400" rtl="0" eaLnBrk="1" latinLnBrk="0" hangingPunct="1">
-              <a:spcBef>
-                <a:spcPct val="20000"/>
-              </a:spcBef>
-              <a:buFont typeface="Arial" pitchFamily="34" charset="0"/>
-              <a:buChar char="–"/>
-              <a:defRPr sz="2000" kern="1200">
-                <a:solidFill>
-                  <a:schemeClr val="tx1"/>
-                </a:solidFill>
-                <a:latin typeface="+mn-lt"/>
-                <a:ea typeface="+mn-ea"/>
-                <a:cs typeface="+mn-cs"/>
-              </a:defRPr>
-            </a:lvl4pPr>
-            <a:lvl5pPr marL="2057400" indent="-228600" algn="l" defTabSz="914400" rtl="0" eaLnBrk="1" latinLnBrk="0" hangingPunct="1">
-              <a:spcBef>
-                <a:spcPct val="20000"/>
-              </a:spcBef>
-              <a:buFont typeface="Arial" pitchFamily="34" charset="0"/>
-              <a:buChar char="»"/>
-              <a:defRPr sz="2000" kern="1200">
-                <a:solidFill>
-                  <a:schemeClr val="tx1"/>
-                </a:solidFill>
-                <a:latin typeface="+mn-lt"/>
-                <a:ea typeface="+mn-ea"/>
-                <a:cs typeface="+mn-cs"/>
-              </a:defRPr>
-            </a:lvl5pPr>
-            <a:lvl6pPr marL="2514600" indent="-228600" algn="l" defTabSz="914400" rtl="0" eaLnBrk="1" latinLnBrk="0" hangingPunct="1">
-              <a:spcBef>
-                <a:spcPct val="20000"/>
-              </a:spcBef>
-              <a:buFont typeface="Arial" pitchFamily="34" charset="0"/>
-              <a:buChar char="•"/>
-              <a:defRPr sz="2000" kern="1200">
-                <a:solidFill>
-                  <a:schemeClr val="tx1"/>
-                </a:solidFill>
-                <a:latin typeface="+mn-lt"/>
-                <a:ea typeface="+mn-ea"/>
-                <a:cs typeface="+mn-cs"/>
-              </a:defRPr>
-            </a:lvl6pPr>
-            <a:lvl7pPr marL="2971800" indent="-228600" algn="l" defTabSz="914400" rtl="0" eaLnBrk="1" latinLnBrk="0" hangingPunct="1">
-              <a:spcBef>
-                <a:spcPct val="20000"/>
-              </a:spcBef>
-              <a:buFont typeface="Arial" pitchFamily="34" charset="0"/>
-              <a:buChar char="•"/>
-              <a:defRPr sz="2000" kern="1200">
-                <a:solidFill>
-                  <a:schemeClr val="tx1"/>
-                </a:solidFill>
-                <a:latin typeface="+mn-lt"/>
-                <a:ea typeface="+mn-ea"/>
-                <a:cs typeface="+mn-cs"/>
-              </a:defRPr>
-            </a:lvl7pPr>
-            <a:lvl8pPr marL="3429000" indent="-228600" algn="l" defTabSz="914400" rtl="0" eaLnBrk="1" latinLnBrk="0" hangingPunct="1">
-              <a:spcBef>
-                <a:spcPct val="20000"/>
-              </a:spcBef>
-              <a:buFont typeface="Arial" pitchFamily="34" charset="0"/>
-              <a:buChar char="•"/>
-              <a:defRPr sz="2000" kern="1200">
-                <a:solidFill>
-                  <a:schemeClr val="tx1"/>
-                </a:solidFill>
-                <a:latin typeface="+mn-lt"/>
-                <a:ea typeface="+mn-ea"/>
-                <a:cs typeface="+mn-cs"/>
-              </a:defRPr>
-            </a:lvl8pPr>
-            <a:lvl9pPr marL="3886200" indent="-228600" algn="l" defTabSz="914400" rtl="0" eaLnBrk="1" latinLnBrk="0" hangingPunct="1">
-              <a:spcBef>
-                <a:spcPct val="20000"/>
-              </a:spcBef>
-              <a:buFont typeface="Arial" pitchFamily="34" charset="0"/>
-              <a:buChar char="•"/>
-              <a:defRPr sz="2000" kern="1200">
-                <a:solidFill>
-                  <a:schemeClr val="tx1"/>
-                </a:solidFill>
-                <a:latin typeface="+mn-lt"/>
-                <a:ea typeface="+mn-ea"/>
-                <a:cs typeface="+mn-cs"/>
-              </a:defRPr>
-            </a:lvl9pPr>
-          </a:lstStyle>
-          <a:p>
-            <a:pPr marL="0" indent="0">
-              <a:buFont typeface="Arial" pitchFamily="34" charset="0"/>
-              <a:buNone/>
-            </a:pPr>
-            <a:r>
-              <a:rPr lang="en-GB" sz="1200" dirty="0" smtClean="0">
-                <a:solidFill>
-                  <a:prstClr val="black"/>
-                </a:solidFill>
-              </a:rPr>
-              <a:t>Third party names are the property of their owners.</a:t>
-            </a:r>
-            <a:endParaRPr lang="en-GB" sz="1200" dirty="0">
-              <a:solidFill>
-                <a:prstClr val="black"/>
-              </a:solidFill>
-            </a:endParaRPr>
-          </a:p>
-        </p:txBody>
-      </p:sp>
-    </p:spTree>
-    <p:extLst>
-      <p:ext uri="{BB962C8B-B14F-4D97-AF65-F5344CB8AC3E}">
-        <p14:creationId xmlns:p14="http://schemas.microsoft.com/office/powerpoint/2010/main" val="2102093488"/>
-      </p:ext>
-    </p:extLst>
-  </p:cSld>
-  <p:clrMapOvr>
-    <a:masterClrMapping/>
-  </p:clrMapOvr>
-  <mc:AlternateContent xmlns:mc="http://schemas.openxmlformats.org/markup-compatibility/2006" xmlns:p14="http://schemas.microsoft.com/office/powerpoint/2010/main">
-    <mc:Choice Requires="p14">
-      <p:transition spd="slow" p14:dur="2000"/>
-    </mc:Choice>
-    <mc:Fallback xmlns="">
-      <p:transition xmlns:p14="http://schemas.microsoft.com/office/powerpoint/2010/main" spd="slow"/>
-    </mc:Fallback>
-  </mc:AlternateContent>
-  <p:timing>
-    <p:tnLst>
-      <p:par>
-        <p:cTn xmlns:p14="http://schemas.microsoft.com/office/powerpoint/2010/main" id="1" dur="indefinite" restart="never" nodeType="tmRoot"/>
-      </p:par>
-    </p:tnLst>
-  </p:timing>
-</p:sld>
-</file>
-
-<file path=ppt/slides/slide32.xml><?xml version="1.0" encoding="utf-8"?>
+<file path=ppt/slides/slide33.xml><?xml version="1.0" encoding="utf-8"?>
 <p:sld xmlns:a="http://schemas.openxmlformats.org/drawingml/2006/main" xmlns:r="http://schemas.openxmlformats.org/officeDocument/2006/relationships" xmlns:p="http://schemas.openxmlformats.org/presentationml/2006/main">
   <p:cSld>
     <p:spTree>
@@ -12744,161 +12907,6 @@
           <a:lstStyle/>
           <a:p>
             <a:r>
-              <a:rPr lang="en-US" dirty="0" smtClean="0"/>
-              <a:t>Debugging Tools</a:t>
-            </a:r>
-            <a:endParaRPr lang="en-US" dirty="0"/>
-          </a:p>
-        </p:txBody>
-      </p:sp>
-      <p:sp>
-        <p:nvSpPr>
-          <p:cNvPr id="3" name="Content Placeholder 2"/>
-          <p:cNvSpPr>
-            <a:spLocks noGrp="1"/>
-          </p:cNvSpPr>
-          <p:nvPr>
-            <p:ph idx="1"/>
-          </p:nvPr>
-        </p:nvSpPr>
-        <p:spPr/>
-        <p:txBody>
-          <a:bodyPr/>
-          <a:lstStyle/>
-          <a:p>
-            <a:r>
-              <a:rPr lang="en-US" dirty="0" smtClean="0"/>
-              <a:t>AMD </a:t>
-            </a:r>
-            <a:r>
-              <a:rPr lang="en-US" dirty="0" err="1" smtClean="0"/>
-              <a:t>CodeXL</a:t>
-            </a:r>
-            <a:endParaRPr lang="en-US" dirty="0" smtClean="0"/>
-          </a:p>
-          <a:p>
-            <a:r>
-              <a:rPr lang="en-US" dirty="0" smtClean="0"/>
-              <a:t>Intel SDK (Visual Studio plugin)</a:t>
-            </a:r>
-          </a:p>
-          <a:p>
-            <a:r>
-              <a:rPr lang="en-US" dirty="0" smtClean="0"/>
-              <a:t>GDB (CPU platforms)</a:t>
-            </a:r>
-          </a:p>
-          <a:p>
-            <a:r>
-              <a:rPr lang="en-US" dirty="0" err="1" smtClean="0"/>
-              <a:t>Oclgrind</a:t>
-            </a:r>
-            <a:endParaRPr lang="en-US" dirty="0" smtClean="0"/>
-          </a:p>
-          <a:p>
-            <a:r>
-              <a:rPr lang="en-US" dirty="0" err="1" smtClean="0"/>
-              <a:t>GPUVerify</a:t>
-            </a:r>
-            <a:endParaRPr lang="en-US" dirty="0" smtClean="0"/>
-          </a:p>
-          <a:p>
-            <a:r>
-              <a:rPr lang="en-US" b="1" dirty="0" err="1" smtClean="0">
-                <a:solidFill>
-                  <a:srgbClr val="3366FF"/>
-                </a:solidFill>
-                <a:latin typeface="Courier New"/>
-                <a:cs typeface="Courier New"/>
-              </a:rPr>
-              <a:t>printf</a:t>
-            </a:r>
-            <a:r>
-              <a:rPr lang="en-US" b="1" dirty="0" smtClean="0">
-                <a:solidFill>
-                  <a:srgbClr val="3366FF"/>
-                </a:solidFill>
-                <a:latin typeface="Courier New"/>
-                <a:cs typeface="Courier New"/>
-              </a:rPr>
-              <a:t> </a:t>
-            </a:r>
-            <a:r>
-              <a:rPr lang="en-US" dirty="0" smtClean="0">
-                <a:latin typeface="Calibri"/>
-                <a:cs typeface="Calibri"/>
-              </a:rPr>
-              <a:t>( from OpenCL 1.2 onwards )</a:t>
-            </a:r>
-            <a:endParaRPr lang="en-US" b="1" dirty="0" smtClean="0">
-              <a:solidFill>
-                <a:srgbClr val="3366FF"/>
-              </a:solidFill>
-              <a:latin typeface="Calibri"/>
-              <a:cs typeface="Calibri"/>
-            </a:endParaRPr>
-          </a:p>
-          <a:p>
-            <a:endParaRPr lang="en-US" dirty="0" smtClean="0"/>
-          </a:p>
-          <a:p>
-            <a:endParaRPr lang="en-US" dirty="0"/>
-          </a:p>
-        </p:txBody>
-      </p:sp>
-    </p:spTree>
-    <p:extLst>
-      <p:ext uri="{BB962C8B-B14F-4D97-AF65-F5344CB8AC3E}">
-        <p14:creationId xmlns:p14="http://schemas.microsoft.com/office/powerpoint/2010/main" val="1605154899"/>
-      </p:ext>
-    </p:extLst>
-  </p:cSld>
-  <p:clrMapOvr>
-    <a:masterClrMapping/>
-  </p:clrMapOvr>
-  <p:timing>
-    <p:tnLst>
-      <p:par>
-        <p:cTn xmlns:p14="http://schemas.microsoft.com/office/powerpoint/2010/main" id="1" dur="indefinite" restart="never" nodeType="tmRoot"/>
-      </p:par>
-    </p:tnLst>
-  </p:timing>
-</p:sld>
-</file>
-
-<file path=ppt/slides/slide33.xml><?xml version="1.0" encoding="utf-8"?>
-<p:sld xmlns:a="http://schemas.openxmlformats.org/drawingml/2006/main" xmlns:r="http://schemas.openxmlformats.org/officeDocument/2006/relationships" xmlns:p="http://schemas.openxmlformats.org/presentationml/2006/main" show="0">
-  <p:cSld>
-    <p:spTree>
-      <p:nvGrpSpPr>
-        <p:cNvPr id="1" name=""/>
-        <p:cNvGrpSpPr/>
-        <p:nvPr/>
-      </p:nvGrpSpPr>
-      <p:grpSpPr>
-        <a:xfrm>
-          <a:off x="0" y="0"/>
-          <a:ext cx="0" cy="0"/>
-          <a:chOff x="0" y="0"/>
-          <a:chExt cx="0" cy="0"/>
-        </a:xfrm>
-      </p:grpSpPr>
-      <p:sp>
-        <p:nvSpPr>
-          <p:cNvPr id="2" name="Title 1"/>
-          <p:cNvSpPr>
-            <a:spLocks noGrp="1"/>
-          </p:cNvSpPr>
-          <p:nvPr>
-            <p:ph type="title"/>
-          </p:nvPr>
-        </p:nvSpPr>
-        <p:spPr/>
-        <p:txBody>
-          <a:bodyPr/>
-          <a:lstStyle/>
-          <a:p>
-            <a:r>
               <a:rPr lang="en-GB" dirty="0" err="1" smtClean="0"/>
               <a:t>CodeXL</a:t>
             </a:r>
@@ -12973,11 +12981,11 @@
   <p:clrMapOvr>
     <a:masterClrMapping/>
   </p:clrMapOvr>
-  <mc:AlternateContent xmlns:mc="http://schemas.openxmlformats.org/markup-compatibility/2006" xmlns:p14="http://schemas.microsoft.com/office/powerpoint/2010/main">
-    <mc:Choice Requires="p14">
+  <mc:AlternateContent xmlns:mc="http://schemas.openxmlformats.org/markup-compatibility/2006">
+    <mc:Choice xmlns:p14="http://schemas.microsoft.com/office/powerpoint/2010/main" Requires="p14">
       <p:transition spd="slow" p14:dur="2000"/>
     </mc:Choice>
-    <mc:Fallback xmlns="">
+    <mc:Fallback>
       <p:transition xmlns:p14="http://schemas.microsoft.com/office/powerpoint/2010/main" spd="slow"/>
     </mc:Fallback>
   </mc:AlternateContent>
@@ -13120,7 +13128,7 @@
 </file>
 
 <file path=ppt/slides/slide35.xml><?xml version="1.0" encoding="utf-8"?>
-<p:sld xmlns:a="http://schemas.openxmlformats.org/drawingml/2006/main" xmlns:r="http://schemas.openxmlformats.org/officeDocument/2006/relationships" xmlns:p="http://schemas.openxmlformats.org/presentationml/2006/main" show="0">
+<p:sld xmlns:a="http://schemas.openxmlformats.org/drawingml/2006/main" xmlns:r="http://schemas.openxmlformats.org/officeDocument/2006/relationships" xmlns:p="http://schemas.openxmlformats.org/presentationml/2006/main">
   <p:cSld>
     <p:spTree>
       <p:nvGrpSpPr>
@@ -13337,11 +13345,11 @@
   <p:clrMapOvr>
     <a:masterClrMapping/>
   </p:clrMapOvr>
-  <mc:AlternateContent xmlns:mc="http://schemas.openxmlformats.org/markup-compatibility/2006" xmlns:p14="http://schemas.microsoft.com/office/powerpoint/2010/main">
-    <mc:Choice Requires="p14">
+  <mc:AlternateContent xmlns:mc="http://schemas.openxmlformats.org/markup-compatibility/2006">
+    <mc:Choice xmlns:p14="http://schemas.microsoft.com/office/powerpoint/2010/main" Requires="p14">
       <p:transition spd="slow" p14:dur="2000"/>
     </mc:Choice>
-    <mc:Fallback xmlns="">
+    <mc:Fallback>
       <p:transition xmlns:p14="http://schemas.microsoft.com/office/powerpoint/2010/main" spd="slow"/>
     </mc:Fallback>
   </mc:AlternateContent>
@@ -13665,7 +13673,7 @@
 </file>
 
 <file path=ppt/slides/slide37.xml><?xml version="1.0" encoding="utf-8"?>
-<p:sld xmlns:a="http://schemas.openxmlformats.org/drawingml/2006/main" xmlns:r="http://schemas.openxmlformats.org/officeDocument/2006/relationships" xmlns:p="http://schemas.openxmlformats.org/presentationml/2006/main" show="0">
+<p:sld xmlns:a="http://schemas.openxmlformats.org/drawingml/2006/main" xmlns:r="http://schemas.openxmlformats.org/officeDocument/2006/relationships" xmlns:p="http://schemas.openxmlformats.org/presentationml/2006/main">
   <p:cSld>
     <p:spTree>
       <p:nvGrpSpPr>
@@ -13880,11 +13888,11 @@
   <p:clrMapOvr>
     <a:masterClrMapping/>
   </p:clrMapOvr>
-  <mc:AlternateContent xmlns:mc="http://schemas.openxmlformats.org/markup-compatibility/2006" xmlns:p14="http://schemas.microsoft.com/office/powerpoint/2010/main">
-    <mc:Choice Requires="p14">
+  <mc:AlternateContent xmlns:mc="http://schemas.openxmlformats.org/markup-compatibility/2006">
+    <mc:Choice xmlns:p14="http://schemas.microsoft.com/office/powerpoint/2010/main" Requires="p14">
       <p:transition spd="slow" p14:dur="2000"/>
     </mc:Choice>
-    <mc:Fallback xmlns="">
+    <mc:Fallback>
       <p:transition xmlns:p14="http://schemas.microsoft.com/office/powerpoint/2010/main" spd="slow"/>
     </mc:Fallback>
   </mc:AlternateContent>
@@ -13899,7 +13907,7 @@
 </file>
 
 <file path=ppt/slides/slide38.xml><?xml version="1.0" encoding="utf-8"?>
-<p:sld xmlns:a="http://schemas.openxmlformats.org/drawingml/2006/main" xmlns:r="http://schemas.openxmlformats.org/officeDocument/2006/relationships" xmlns:p="http://schemas.openxmlformats.org/presentationml/2006/main" show="0">
+<p:sld xmlns:a="http://schemas.openxmlformats.org/drawingml/2006/main" xmlns:r="http://schemas.openxmlformats.org/officeDocument/2006/relationships" xmlns:p="http://schemas.openxmlformats.org/presentationml/2006/main">
   <p:cSld>
     <p:spTree>
       <p:nvGrpSpPr>
@@ -13979,11 +13987,11 @@
   <p:clrMapOvr>
     <a:masterClrMapping/>
   </p:clrMapOvr>
-  <mc:AlternateContent xmlns:mc="http://schemas.openxmlformats.org/markup-compatibility/2006" xmlns:p14="http://schemas.microsoft.com/office/powerpoint/2010/main">
-    <mc:Choice Requires="p14">
+  <mc:AlternateContent xmlns:mc="http://schemas.openxmlformats.org/markup-compatibility/2006">
+    <mc:Choice xmlns:p14="http://schemas.microsoft.com/office/powerpoint/2010/main" Requires="p14">
       <p:transition spd="slow" p14:dur="2000"/>
     </mc:Choice>
-    <mc:Fallback xmlns="">
+    <mc:Fallback>
       <p:transition xmlns:p14="http://schemas.microsoft.com/office/powerpoint/2010/main" spd="slow"/>
     </mc:Fallback>
   </mc:AlternateContent>
@@ -14133,7 +14141,7 @@
 </file>
 
 <file path=ppt/slides/slide4.xml><?xml version="1.0" encoding="utf-8"?>
-<p:sld xmlns:a="http://schemas.openxmlformats.org/drawingml/2006/main" xmlns:r="http://schemas.openxmlformats.org/officeDocument/2006/relationships" xmlns:p="http://schemas.openxmlformats.org/presentationml/2006/main">
+<p:sld xmlns:a="http://schemas.openxmlformats.org/drawingml/2006/main" xmlns:r="http://schemas.openxmlformats.org/officeDocument/2006/relationships" xmlns:p="http://schemas.openxmlformats.org/presentationml/2006/main" show="0">
   <p:cSld>
     <p:spTree>
       <p:nvGrpSpPr>
@@ -14286,6 +14294,14 @@
   <p:clrMapOvr>
     <a:masterClrMapping/>
   </p:clrMapOvr>
+  <mc:AlternateContent xmlns:mc="http://schemas.openxmlformats.org/markup-compatibility/2006">
+    <mc:Choice xmlns:p14="http://schemas.microsoft.com/office/powerpoint/2010/main" Requires="p14">
+      <p:transition spd="slow" p14:dur="2000"/>
+    </mc:Choice>
+    <mc:Fallback>
+      <p:transition xmlns:p14="http://schemas.microsoft.com/office/powerpoint/2010/main" spd="slow"/>
+    </mc:Fallback>
+  </mc:AlternateContent>
   <p:timing>
     <p:tnLst>
       <p:par>

</xml_diff>

<commit_message>
Add speaker notes about powr/pown
</commit_message>
<xml_diff>
--- a/slides/advanced_part3.pptx
+++ b/slides/advanced_part3.pptx
@@ -277,7 +277,7 @@
           <a:p>
             <a:fld id="{154B9960-65DD-7948-AAE5-CA021B06E14D}" type="datetimeFigureOut">
               <a:rPr lang="en-US" smtClean="0"/>
-              <a:t>22/07/16</a:t>
+              <a:t>23/07/16</a:t>
             </a:fld>
             <a:endParaRPr lang="en-GB"/>
           </a:p>
@@ -1458,8 +1458,63 @@
             </a:r>
             <a:r>
               <a:rPr lang="en-GB" baseline="0" dirty="0" smtClean="0"/>
-              <a:t> to be careful</a:t>
-            </a:r>
+              <a:t> to be </a:t>
+            </a:r>
+            <a:r>
+              <a:rPr lang="en-GB" baseline="0" dirty="0" smtClean="0"/>
+              <a:t>careful</a:t>
+            </a:r>
+          </a:p>
+          <a:p>
+            <a:endParaRPr lang="en-GB" baseline="0" dirty="0" smtClean="0"/>
+          </a:p>
+          <a:p>
+            <a:r>
+              <a:rPr lang="en-GB" baseline="0" dirty="0" smtClean="0"/>
+              <a:t>there are also some special case functions that can give big performance improvements:</a:t>
+            </a:r>
+          </a:p>
+          <a:p>
+            <a:pPr marL="171450" indent="-171450">
+              <a:buFontTx/>
+              <a:buChar char="-"/>
+            </a:pPr>
+            <a:r>
+              <a:rPr lang="en-GB" baseline="0" dirty="0" err="1" smtClean="0"/>
+              <a:t>powr</a:t>
+            </a:r>
+            <a:r>
+              <a:rPr lang="en-GB" baseline="0" dirty="0" smtClean="0"/>
+              <a:t>(x, y) </a:t>
+            </a:r>
+            <a:r>
+              <a:rPr lang="en-GB" baseline="0" smtClean="0"/>
+              <a:t>where x </a:t>
+            </a:r>
+            <a:r>
+              <a:rPr lang="en-GB" baseline="0" dirty="0" smtClean="0"/>
+              <a:t>is &gt;=0</a:t>
+            </a:r>
+          </a:p>
+          <a:p>
+            <a:pPr marL="171450" indent="-171450">
+              <a:buFontTx/>
+              <a:buChar char="-"/>
+            </a:pPr>
+            <a:r>
+              <a:rPr lang="en-GB" baseline="0" dirty="0" err="1" smtClean="0"/>
+              <a:t>pown</a:t>
+            </a:r>
+            <a:r>
+              <a:rPr lang="en-GB" baseline="0" dirty="0" smtClean="0"/>
+              <a:t>(x, y) where y is an integer</a:t>
+            </a:r>
+          </a:p>
+          <a:p>
+            <a:pPr marL="0" indent="0">
+              <a:buFontTx/>
+              <a:buNone/>
+            </a:pPr>
             <a:endParaRPr lang="en-GB" dirty="0"/>
           </a:p>
         </p:txBody>
@@ -3286,7 +3341,7 @@
           <a:p>
             <a:fld id="{D96F9273-1B51-1D4D-B007-2EA617412104}" type="datetimeFigureOut">
               <a:rPr lang="en-US" smtClean="0"/>
-              <a:t>22/07/16</a:t>
+              <a:t>23/07/16</a:t>
             </a:fld>
             <a:endParaRPr lang="en-GB"/>
           </a:p>
@@ -3456,7 +3511,7 @@
           <a:p>
             <a:fld id="{D96F9273-1B51-1D4D-B007-2EA617412104}" type="datetimeFigureOut">
               <a:rPr lang="en-US" smtClean="0"/>
-              <a:t>22/07/16</a:t>
+              <a:t>23/07/16</a:t>
             </a:fld>
             <a:endParaRPr lang="en-GB"/>
           </a:p>
@@ -3636,7 +3691,7 @@
           <a:p>
             <a:fld id="{D96F9273-1B51-1D4D-B007-2EA617412104}" type="datetimeFigureOut">
               <a:rPr lang="en-US" smtClean="0"/>
-              <a:t>22/07/16</a:t>
+              <a:t>23/07/16</a:t>
             </a:fld>
             <a:endParaRPr lang="en-GB"/>
           </a:p>
@@ -3806,7 +3861,7 @@
           <a:p>
             <a:fld id="{D96F9273-1B51-1D4D-B007-2EA617412104}" type="datetimeFigureOut">
               <a:rPr lang="en-US" smtClean="0"/>
-              <a:t>22/07/16</a:t>
+              <a:t>23/07/16</a:t>
             </a:fld>
             <a:endParaRPr lang="en-GB"/>
           </a:p>
@@ -4052,7 +4107,7 @@
           <a:p>
             <a:fld id="{D96F9273-1B51-1D4D-B007-2EA617412104}" type="datetimeFigureOut">
               <a:rPr lang="en-US" smtClean="0"/>
-              <a:t>22/07/16</a:t>
+              <a:t>23/07/16</a:t>
             </a:fld>
             <a:endParaRPr lang="en-GB"/>
           </a:p>
@@ -4340,7 +4395,7 @@
           <a:p>
             <a:fld id="{D96F9273-1B51-1D4D-B007-2EA617412104}" type="datetimeFigureOut">
               <a:rPr lang="en-US" smtClean="0"/>
-              <a:t>22/07/16</a:t>
+              <a:t>23/07/16</a:t>
             </a:fld>
             <a:endParaRPr lang="en-GB"/>
           </a:p>
@@ -4762,7 +4817,7 @@
           <a:p>
             <a:fld id="{D96F9273-1B51-1D4D-B007-2EA617412104}" type="datetimeFigureOut">
               <a:rPr lang="en-US" smtClean="0"/>
-              <a:t>22/07/16</a:t>
+              <a:t>23/07/16</a:t>
             </a:fld>
             <a:endParaRPr lang="en-GB"/>
           </a:p>
@@ -4880,7 +4935,7 @@
           <a:p>
             <a:fld id="{D96F9273-1B51-1D4D-B007-2EA617412104}" type="datetimeFigureOut">
               <a:rPr lang="en-US" smtClean="0"/>
-              <a:t>22/07/16</a:t>
+              <a:t>23/07/16</a:t>
             </a:fld>
             <a:endParaRPr lang="en-GB"/>
           </a:p>
@@ -4975,7 +5030,7 @@
           <a:p>
             <a:fld id="{D96F9273-1B51-1D4D-B007-2EA617412104}" type="datetimeFigureOut">
               <a:rPr lang="en-US" smtClean="0"/>
-              <a:t>22/07/16</a:t>
+              <a:t>23/07/16</a:t>
             </a:fld>
             <a:endParaRPr lang="en-GB"/>
           </a:p>
@@ -5252,7 +5307,7 @@
           <a:p>
             <a:fld id="{D96F9273-1B51-1D4D-B007-2EA617412104}" type="datetimeFigureOut">
               <a:rPr lang="en-US" smtClean="0"/>
-              <a:t>22/07/16</a:t>
+              <a:t>23/07/16</a:t>
             </a:fld>
             <a:endParaRPr lang="en-GB"/>
           </a:p>
@@ -5505,7 +5560,7 @@
           <a:p>
             <a:fld id="{D96F9273-1B51-1D4D-B007-2EA617412104}" type="datetimeFigureOut">
               <a:rPr lang="en-US" smtClean="0"/>
-              <a:t>22/07/16</a:t>
+              <a:t>23/07/16</a:t>
             </a:fld>
             <a:endParaRPr lang="en-GB"/>
           </a:p>
@@ -5718,7 +5773,7 @@
           <a:p>
             <a:fld id="{D96F9273-1B51-1D4D-B007-2EA617412104}" type="datetimeFigureOut">
               <a:rPr lang="en-US" smtClean="0"/>
-              <a:t>22/07/16</a:t>
+              <a:t>23/07/16</a:t>
             </a:fld>
             <a:endParaRPr lang="en-GB"/>
           </a:p>
@@ -41428,14 +41483,6 @@
               </a:rPr>
               <a:t>// Get pointer to start of this work-group’s histogram</a:t>
             </a:r>
-            <a:endParaRPr lang="en-GB" sz="1400" b="1" dirty="0" smtClean="0">
-              <a:solidFill>
-                <a:srgbClr val="008000"/>
-              </a:solidFill>
-              <a:latin typeface="Courier New"/>
-              <a:cs typeface="Courier New"/>
-              <a:sym typeface="Menlo Regular"/>
-            </a:endParaRPr>
           </a:p>
           <a:p>
             <a:pPr defTabSz="410751">
@@ -41547,11 +41594,6 @@
               </a:rPr>
               <a:t>;</a:t>
             </a:r>
-            <a:endParaRPr lang="en-GB" sz="1400" b="1" dirty="0" smtClean="0">
-              <a:latin typeface="Courier New"/>
-              <a:cs typeface="Courier New"/>
-              <a:sym typeface="Menlo Regular"/>
-            </a:endParaRPr>
           </a:p>
           <a:p>
             <a:pPr defTabSz="410751">
@@ -41688,14 +41730,6 @@
               </a:rPr>
               <a:t>// Increment corresponding bucket in histogram</a:t>
             </a:r>
-            <a:endParaRPr lang="en-GB" sz="1400" b="1" dirty="0" smtClean="0">
-              <a:solidFill>
-                <a:srgbClr val="008000"/>
-              </a:solidFill>
-              <a:latin typeface="Courier New"/>
-              <a:cs typeface="Courier New"/>
-              <a:sym typeface="Menlo Regular"/>
-            </a:endParaRPr>
           </a:p>
           <a:p>
             <a:pPr defTabSz="410751">
@@ -41748,15 +41782,7 @@
                 <a:cs typeface="Courier New"/>
                 <a:sym typeface="Menlo Regular"/>
               </a:rPr>
-              <a:t>group_</a:t>
-            </a:r>
-            <a:r>
-              <a:rPr lang="en-GB" sz="1400" b="1" dirty="0" err="1" smtClean="0">
-                <a:latin typeface="Courier New"/>
-                <a:cs typeface="Courier New"/>
-                <a:sym typeface="Menlo Regular"/>
-              </a:rPr>
-              <a:t>histogram</a:t>
+              <a:t>group_histogram</a:t>
             </a:r>
             <a:r>
               <a:rPr lang="en-GB" sz="1400" b="1" dirty="0" smtClean="0">
@@ -46623,39 +46649,7 @@
             </a:pPr>
             <a:r>
               <a:rPr lang="en-GB" sz="2800" dirty="0" smtClean="0"/>
-              <a:t>Results from </a:t>
-            </a:r>
-            <a:r>
-              <a:rPr lang="en-GB" sz="2800" dirty="0" smtClean="0"/>
-              <a:t>3 </a:t>
-            </a:r>
-            <a:r>
-              <a:rPr lang="en-GB" sz="2800" dirty="0" smtClean="0"/>
-              <a:t>different versions </a:t>
-            </a:r>
-            <a:r>
-              <a:rPr lang="en-GB" sz="2800" dirty="0" smtClean="0"/>
-              <a:t>(original, meta </a:t>
-            </a:r>
-            <a:r>
-              <a:rPr lang="en-GB" sz="2800" dirty="0" smtClean="0"/>
-              <a:t>programming, </a:t>
-            </a:r>
-            <a:r>
-              <a:rPr lang="en-GB" sz="2800" dirty="0" smtClean="0"/>
-              <a:t>and optimised) </a:t>
-            </a:r>
-            <a:r>
-              <a:rPr lang="en-GB" sz="2800" dirty="0" smtClean="0"/>
-              <a:t>on an </a:t>
-            </a:r>
-            <a:r>
-              <a:rPr lang="en-GB" sz="2800" dirty="0" smtClean="0"/>
-              <a:t>NVIDIA K40</a:t>
-            </a:r>
-            <a:r>
-              <a:rPr lang="en-GB" sz="2800" dirty="0" smtClean="0"/>
-              <a:t>:</a:t>
+              <a:t>Results from 3 different versions (original, meta programming, and optimised) on an NVIDIA K40:</a:t>
             </a:r>
           </a:p>
           <a:p>
@@ -52635,35 +52629,7 @@
             </a:r>
             <a:r>
               <a:rPr lang="en-GB" dirty="0" smtClean="0"/>
-              <a:t> </a:t>
-            </a:r>
-            <a:r>
-              <a:rPr lang="en-GB" dirty="0" smtClean="0"/>
-              <a:t>different versions </a:t>
-            </a:r>
-            <a:r>
-              <a:rPr lang="en-GB" dirty="0" smtClean="0"/>
-              <a:t>(original, meta </a:t>
-            </a:r>
-            <a:r>
-              <a:rPr lang="en-GB" dirty="0" smtClean="0"/>
-              <a:t>programming, </a:t>
-            </a:r>
-            <a:r>
-              <a:rPr lang="en-GB" dirty="0" smtClean="0"/>
-              <a:t>optimised, </a:t>
-            </a:r>
-            <a:r>
-              <a:rPr lang="en-GB" dirty="0" smtClean="0"/>
-              <a:t>and images) on an </a:t>
-            </a:r>
-            <a:r>
-              <a:rPr lang="en-GB" dirty="0" smtClean="0"/>
-              <a:t>NVIDIA K40</a:t>
-            </a:r>
-            <a:r>
-              <a:rPr lang="en-GB" dirty="0" smtClean="0"/>
-              <a:t>:</a:t>
+              <a:t> different versions (original, meta programming, optimised, and images) on an NVIDIA K40:</a:t>
             </a:r>
           </a:p>
           <a:p>

</xml_diff>

<commit_message>
Last minute tweaks to part3
</commit_message>
<xml_diff>
--- a/slides/advanced_part3.pptx
+++ b/slides/advanced_part3.pptx
@@ -278,7 +278,7 @@
           <a:p>
             <a:fld id="{154B9960-65DD-7948-AAE5-CA021B06E14D}" type="datetimeFigureOut">
               <a:rPr lang="en-US" smtClean="0"/>
-              <a:t>25/07/16</a:t>
+              <a:t>26/07/16</a:t>
             </a:fld>
             <a:endParaRPr lang="en-GB"/>
           </a:p>
@@ -3338,7 +3338,7 @@
           <a:p>
             <a:fld id="{D96F9273-1B51-1D4D-B007-2EA617412104}" type="datetimeFigureOut">
               <a:rPr lang="en-US" smtClean="0"/>
-              <a:t>25/07/16</a:t>
+              <a:t>26/07/16</a:t>
             </a:fld>
             <a:endParaRPr lang="en-GB"/>
           </a:p>
@@ -3508,7 +3508,7 @@
           <a:p>
             <a:fld id="{D96F9273-1B51-1D4D-B007-2EA617412104}" type="datetimeFigureOut">
               <a:rPr lang="en-US" smtClean="0"/>
-              <a:t>25/07/16</a:t>
+              <a:t>26/07/16</a:t>
             </a:fld>
             <a:endParaRPr lang="en-GB"/>
           </a:p>
@@ -3688,7 +3688,7 @@
           <a:p>
             <a:fld id="{D96F9273-1B51-1D4D-B007-2EA617412104}" type="datetimeFigureOut">
               <a:rPr lang="en-US" smtClean="0"/>
-              <a:t>25/07/16</a:t>
+              <a:t>26/07/16</a:t>
             </a:fld>
             <a:endParaRPr lang="en-GB"/>
           </a:p>
@@ -3858,7 +3858,7 @@
           <a:p>
             <a:fld id="{D96F9273-1B51-1D4D-B007-2EA617412104}" type="datetimeFigureOut">
               <a:rPr lang="en-US" smtClean="0"/>
-              <a:t>25/07/16</a:t>
+              <a:t>26/07/16</a:t>
             </a:fld>
             <a:endParaRPr lang="en-GB"/>
           </a:p>
@@ -4104,7 +4104,7 @@
           <a:p>
             <a:fld id="{D96F9273-1B51-1D4D-B007-2EA617412104}" type="datetimeFigureOut">
               <a:rPr lang="en-US" smtClean="0"/>
-              <a:t>25/07/16</a:t>
+              <a:t>26/07/16</a:t>
             </a:fld>
             <a:endParaRPr lang="en-GB"/>
           </a:p>
@@ -4392,7 +4392,7 @@
           <a:p>
             <a:fld id="{D96F9273-1B51-1D4D-B007-2EA617412104}" type="datetimeFigureOut">
               <a:rPr lang="en-US" smtClean="0"/>
-              <a:t>25/07/16</a:t>
+              <a:t>26/07/16</a:t>
             </a:fld>
             <a:endParaRPr lang="en-GB"/>
           </a:p>
@@ -4814,7 +4814,7 @@
           <a:p>
             <a:fld id="{D96F9273-1B51-1D4D-B007-2EA617412104}" type="datetimeFigureOut">
               <a:rPr lang="en-US" smtClean="0"/>
-              <a:t>25/07/16</a:t>
+              <a:t>26/07/16</a:t>
             </a:fld>
             <a:endParaRPr lang="en-GB"/>
           </a:p>
@@ -4932,7 +4932,7 @@
           <a:p>
             <a:fld id="{D96F9273-1B51-1D4D-B007-2EA617412104}" type="datetimeFigureOut">
               <a:rPr lang="en-US" smtClean="0"/>
-              <a:t>25/07/16</a:t>
+              <a:t>26/07/16</a:t>
             </a:fld>
             <a:endParaRPr lang="en-GB"/>
           </a:p>
@@ -5027,7 +5027,7 @@
           <a:p>
             <a:fld id="{D96F9273-1B51-1D4D-B007-2EA617412104}" type="datetimeFigureOut">
               <a:rPr lang="en-US" smtClean="0"/>
-              <a:t>25/07/16</a:t>
+              <a:t>26/07/16</a:t>
             </a:fld>
             <a:endParaRPr lang="en-GB"/>
           </a:p>
@@ -5304,7 +5304,7 @@
           <a:p>
             <a:fld id="{D96F9273-1B51-1D4D-B007-2EA617412104}" type="datetimeFigureOut">
               <a:rPr lang="en-US" smtClean="0"/>
-              <a:t>25/07/16</a:t>
+              <a:t>26/07/16</a:t>
             </a:fld>
             <a:endParaRPr lang="en-GB"/>
           </a:p>
@@ -5557,7 +5557,7 @@
           <a:p>
             <a:fld id="{D96F9273-1B51-1D4D-B007-2EA617412104}" type="datetimeFigureOut">
               <a:rPr lang="en-US" smtClean="0"/>
-              <a:t>25/07/16</a:t>
+              <a:t>26/07/16</a:t>
             </a:fld>
             <a:endParaRPr lang="en-GB"/>
           </a:p>
@@ -5770,7 +5770,7 @@
           <a:p>
             <a:fld id="{D96F9273-1B51-1D4D-B007-2EA617412104}" type="datetimeFigureOut">
               <a:rPr lang="en-US" smtClean="0"/>
-              <a:t>25/07/16</a:t>
+              <a:t>26/07/16</a:t>
             </a:fld>
             <a:endParaRPr lang="en-GB"/>
           </a:p>
@@ -14386,8 +14386,12 @@
           <a:lstStyle/>
           <a:p>
             <a:r>
+              <a:rPr lang="en-GB" sz="3600" smtClean="0"/>
+              <a:t>Exercise: </a:t>
+            </a:r>
+            <a:r>
               <a:rPr lang="en-GB" sz="3600" dirty="0" smtClean="0"/>
-              <a:t>Exercise 10: Profiling and Debugging</a:t>
+              <a:t>Profiling and Debugging</a:t>
             </a:r>
             <a:br>
               <a:rPr lang="en-GB" sz="3600" dirty="0" smtClean="0"/>
@@ -14635,14 +14639,6 @@
           <a:bodyPr/>
           <a:lstStyle/>
           <a:p>
-            <a:r>
-              <a:rPr lang="en-GB" dirty="0" smtClean="0">
-                <a:solidFill>
-                  <a:schemeClr val="tx1"/>
-                </a:solidFill>
-              </a:rPr>
-              <a:t>Lecture 12</a:t>
-            </a:r>
             <a:endParaRPr lang="en-GB" dirty="0">
               <a:solidFill>
                 <a:schemeClr val="tx1"/>

</xml_diff>

<commit_message>
Update image origin/region syntax in slides for cl2.hpp
</commit_message>
<xml_diff>
--- a/slides/advanced_part3.pptx
+++ b/slides/advanced_part3.pptx
@@ -278,7 +278,7 @@
           <a:p>
             <a:fld id="{154B9960-65DD-7948-AAE5-CA021B06E14D}" type="datetimeFigureOut">
               <a:rPr lang="en-US" smtClean="0"/>
-              <a:t>26/07/16</a:t>
+              <a:t>27/07/16</a:t>
             </a:fld>
             <a:endParaRPr lang="en-GB"/>
           </a:p>
@@ -3338,7 +3338,7 @@
           <a:p>
             <a:fld id="{D96F9273-1B51-1D4D-B007-2EA617412104}" type="datetimeFigureOut">
               <a:rPr lang="en-US" smtClean="0"/>
-              <a:t>26/07/16</a:t>
+              <a:t>27/07/16</a:t>
             </a:fld>
             <a:endParaRPr lang="en-GB"/>
           </a:p>
@@ -3508,7 +3508,7 @@
           <a:p>
             <a:fld id="{D96F9273-1B51-1D4D-B007-2EA617412104}" type="datetimeFigureOut">
               <a:rPr lang="en-US" smtClean="0"/>
-              <a:t>26/07/16</a:t>
+              <a:t>27/07/16</a:t>
             </a:fld>
             <a:endParaRPr lang="en-GB"/>
           </a:p>
@@ -3688,7 +3688,7 @@
           <a:p>
             <a:fld id="{D96F9273-1B51-1D4D-B007-2EA617412104}" type="datetimeFigureOut">
               <a:rPr lang="en-US" smtClean="0"/>
-              <a:t>26/07/16</a:t>
+              <a:t>27/07/16</a:t>
             </a:fld>
             <a:endParaRPr lang="en-GB"/>
           </a:p>
@@ -3858,7 +3858,7 @@
           <a:p>
             <a:fld id="{D96F9273-1B51-1D4D-B007-2EA617412104}" type="datetimeFigureOut">
               <a:rPr lang="en-US" smtClean="0"/>
-              <a:t>26/07/16</a:t>
+              <a:t>27/07/16</a:t>
             </a:fld>
             <a:endParaRPr lang="en-GB"/>
           </a:p>
@@ -4104,7 +4104,7 @@
           <a:p>
             <a:fld id="{D96F9273-1B51-1D4D-B007-2EA617412104}" type="datetimeFigureOut">
               <a:rPr lang="en-US" smtClean="0"/>
-              <a:t>26/07/16</a:t>
+              <a:t>27/07/16</a:t>
             </a:fld>
             <a:endParaRPr lang="en-GB"/>
           </a:p>
@@ -4392,7 +4392,7 @@
           <a:p>
             <a:fld id="{D96F9273-1B51-1D4D-B007-2EA617412104}" type="datetimeFigureOut">
               <a:rPr lang="en-US" smtClean="0"/>
-              <a:t>26/07/16</a:t>
+              <a:t>27/07/16</a:t>
             </a:fld>
             <a:endParaRPr lang="en-GB"/>
           </a:p>
@@ -4814,7 +4814,7 @@
           <a:p>
             <a:fld id="{D96F9273-1B51-1D4D-B007-2EA617412104}" type="datetimeFigureOut">
               <a:rPr lang="en-US" smtClean="0"/>
-              <a:t>26/07/16</a:t>
+              <a:t>27/07/16</a:t>
             </a:fld>
             <a:endParaRPr lang="en-GB"/>
           </a:p>
@@ -4932,7 +4932,7 @@
           <a:p>
             <a:fld id="{D96F9273-1B51-1D4D-B007-2EA617412104}" type="datetimeFigureOut">
               <a:rPr lang="en-US" smtClean="0"/>
-              <a:t>26/07/16</a:t>
+              <a:t>27/07/16</a:t>
             </a:fld>
             <a:endParaRPr lang="en-GB"/>
           </a:p>
@@ -5027,7 +5027,7 @@
           <a:p>
             <a:fld id="{D96F9273-1B51-1D4D-B007-2EA617412104}" type="datetimeFigureOut">
               <a:rPr lang="en-US" smtClean="0"/>
-              <a:t>26/07/16</a:t>
+              <a:t>27/07/16</a:t>
             </a:fld>
             <a:endParaRPr lang="en-GB"/>
           </a:p>
@@ -5304,7 +5304,7 @@
           <a:p>
             <a:fld id="{D96F9273-1B51-1D4D-B007-2EA617412104}" type="datetimeFigureOut">
               <a:rPr lang="en-US" smtClean="0"/>
-              <a:t>26/07/16</a:t>
+              <a:t>27/07/16</a:t>
             </a:fld>
             <a:endParaRPr lang="en-GB"/>
           </a:p>
@@ -5557,7 +5557,7 @@
           <a:p>
             <a:fld id="{D96F9273-1B51-1D4D-B007-2EA617412104}" type="datetimeFigureOut">
               <a:rPr lang="en-US" smtClean="0"/>
-              <a:t>26/07/16</a:t>
+              <a:t>27/07/16</a:t>
             </a:fld>
             <a:endParaRPr lang="en-GB"/>
           </a:p>
@@ -5770,7 +5770,7 @@
           <a:p>
             <a:fld id="{D96F9273-1B51-1D4D-B007-2EA617412104}" type="datetimeFigureOut">
               <a:rPr lang="en-US" smtClean="0"/>
-              <a:t>26/07/16</a:t>
+              <a:t>27/07/16</a:t>
             </a:fld>
             <a:endParaRPr lang="en-GB"/>
           </a:p>
@@ -49128,10 +49128,17 @@
                 <a:latin typeface="Courier New"/>
                 <a:cs typeface="Courier New"/>
               </a:rPr>
-              <a:t>cl::size_t&lt;</a:t>
-            </a:r>
-            <a:r>
-              <a:rPr lang="hr-HR" b="1" dirty="0">
+              <a:t>cl:</a:t>
+            </a:r>
+            <a:r>
+              <a:rPr lang="hr-HR" b="1" dirty="0" smtClean="0">
+                <a:latin typeface="Courier New"/>
+                <a:cs typeface="Courier New"/>
+              </a:rPr>
+              <a:t>:array&lt;size_type, </a:t>
+            </a:r>
+            <a:r>
+              <a:rPr lang="hr-HR" b="1" dirty="0" smtClean="0">
                 <a:solidFill>
                   <a:srgbClr val="FF00FF"/>
                 </a:solidFill>
@@ -49237,10 +49244,24 @@
                 <a:latin typeface="Courier New"/>
                 <a:cs typeface="Courier New"/>
               </a:rPr>
-              <a:t>cl::size_t&lt;</a:t>
-            </a:r>
-            <a:r>
-              <a:rPr lang="hr-HR" b="1" dirty="0">
+              <a:t>cl</a:t>
+            </a:r>
+            <a:r>
+              <a:rPr lang="hr-HR" b="1">
+                <a:latin typeface="Courier New"/>
+                <a:cs typeface="Courier New"/>
+              </a:rPr>
+              <a:t>:</a:t>
+            </a:r>
+            <a:r>
+              <a:rPr lang="hr-HR" b="1" smtClean="0">
+                <a:latin typeface="Courier New"/>
+                <a:cs typeface="Courier New"/>
+              </a:rPr>
+              <a:t>:array&lt;size_type, </a:t>
+            </a:r>
+            <a:r>
+              <a:rPr lang="hr-HR" b="1" smtClean="0">
                 <a:solidFill>
                   <a:srgbClr val="FF00FF"/>
                 </a:solidFill>

</xml_diff>